<commit_message>
correcting presentation: phase 1 completion
</commit_message>
<xml_diff>
--- a/Final Presentation.pptx
+++ b/Final Presentation.pptx
@@ -5,7 +5,7 @@
     <p:sldMasterId id="2147483660" r:id="rId1"/>
   </p:sldMasterIdLst>
   <p:notesMasterIdLst>
-    <p:notesMasterId r:id="rId25"/>
+    <p:notesMasterId r:id="rId27"/>
   </p:notesMasterIdLst>
   <p:sldIdLst>
     <p:sldId id="256" r:id="rId2"/>
@@ -24,13 +24,15 @@
     <p:sldId id="279" r:id="rId15"/>
     <p:sldId id="273" r:id="rId16"/>
     <p:sldId id="280" r:id="rId17"/>
-    <p:sldId id="267" r:id="rId18"/>
-    <p:sldId id="271" r:id="rId19"/>
-    <p:sldId id="281" r:id="rId20"/>
-    <p:sldId id="274" r:id="rId21"/>
-    <p:sldId id="268" r:id="rId22"/>
-    <p:sldId id="282" r:id="rId23"/>
-    <p:sldId id="269" r:id="rId24"/>
+    <p:sldId id="284" r:id="rId18"/>
+    <p:sldId id="267" r:id="rId19"/>
+    <p:sldId id="271" r:id="rId20"/>
+    <p:sldId id="281" r:id="rId21"/>
+    <p:sldId id="283" r:id="rId22"/>
+    <p:sldId id="274" r:id="rId23"/>
+    <p:sldId id="268" r:id="rId24"/>
+    <p:sldId id="282" r:id="rId25"/>
+    <p:sldId id="269" r:id="rId26"/>
   </p:sldIdLst>
   <p:sldSz cx="12192000" cy="6858000"/>
   <p:notesSz cx="6858000" cy="9144000"/>
@@ -219,7 +221,7 @@
           <a:p>
             <a:fld id="{5DBA33B5-1111-431E-95E6-1CD0EC93978C}" type="datetimeFigureOut">
               <a:rPr lang="en-US" smtClean="0"/>
-              <a:t>11/23/2025</a:t>
+              <a:t>11/24/2025</a:t>
             </a:fld>
             <a:endParaRPr lang="en-US"/>
           </a:p>
@@ -785,7 +787,7 @@
           <a:p>
             <a:fld id="{B83AB89D-57C3-4E72-B309-F3497A4DE701}" type="datetime1">
               <a:rPr lang="en-US" smtClean="0"/>
-              <a:t>11/23/2025</a:t>
+              <a:t>11/24/2025</a:t>
             </a:fld>
             <a:endParaRPr lang="en-US"/>
           </a:p>
@@ -958,7 +960,7 @@
           <a:p>
             <a:fld id="{EB882134-595F-452E-B7C5-AD73B8A84D48}" type="datetime1">
               <a:rPr lang="en-US" smtClean="0"/>
-              <a:t>11/23/2025</a:t>
+              <a:t>11/24/2025</a:t>
             </a:fld>
             <a:endParaRPr lang="en-US"/>
           </a:p>
@@ -1141,7 +1143,7 @@
           <a:p>
             <a:fld id="{1E1F26DA-1DDA-4076-89A5-57BC415E51EE}" type="datetime1">
               <a:rPr lang="en-US" smtClean="0"/>
-              <a:t>11/23/2025</a:t>
+              <a:t>11/24/2025</a:t>
             </a:fld>
             <a:endParaRPr lang="en-US"/>
           </a:p>
@@ -1314,7 +1316,7 @@
           <a:p>
             <a:fld id="{B8ADA9AE-1E4E-4CF6-B35A-04249EFC3058}" type="datetime1">
               <a:rPr lang="en-US" smtClean="0"/>
-              <a:t>11/23/2025</a:t>
+              <a:t>11/24/2025</a:t>
             </a:fld>
             <a:endParaRPr lang="en-US"/>
           </a:p>
@@ -1563,7 +1565,7 @@
           <a:p>
             <a:fld id="{274E6D01-CC9E-46A0-BA2B-3BDD6F9E96A3}" type="datetime1">
               <a:rPr lang="en-US" smtClean="0"/>
-              <a:t>11/23/2025</a:t>
+              <a:t>11/24/2025</a:t>
             </a:fld>
             <a:endParaRPr lang="en-US"/>
           </a:p>
@@ -1798,7 +1800,7 @@
           <a:p>
             <a:fld id="{9431EC22-26CF-4980-836F-5A832F42D43A}" type="datetime1">
               <a:rPr lang="en-US" smtClean="0"/>
-              <a:t>11/23/2025</a:t>
+              <a:t>11/24/2025</a:t>
             </a:fld>
             <a:endParaRPr lang="en-US"/>
           </a:p>
@@ -2168,7 +2170,7 @@
           <a:p>
             <a:fld id="{985F2D8C-D7CA-4D24-840B-6108995923DC}" type="datetime1">
               <a:rPr lang="en-US" smtClean="0"/>
-              <a:t>11/23/2025</a:t>
+              <a:t>11/24/2025</a:t>
             </a:fld>
             <a:endParaRPr lang="en-US"/>
           </a:p>
@@ -2289,7 +2291,7 @@
           <a:p>
             <a:fld id="{45DC69B9-81AF-4D6F-9B89-AD543E69A99F}" type="datetime1">
               <a:rPr lang="en-US" smtClean="0"/>
-              <a:t>11/23/2025</a:t>
+              <a:t>11/24/2025</a:t>
             </a:fld>
             <a:endParaRPr lang="en-US"/>
           </a:p>
@@ -2387,7 +2389,7 @@
           <a:p>
             <a:fld id="{C8297DA5-715C-472F-A49F-FFBCB32E9725}" type="datetime1">
               <a:rPr lang="en-US" smtClean="0"/>
-              <a:t>11/23/2025</a:t>
+              <a:t>11/24/2025</a:t>
             </a:fld>
             <a:endParaRPr lang="en-US"/>
           </a:p>
@@ -2667,7 +2669,7 @@
           <a:p>
             <a:fld id="{C60163C0-6A53-46B2-B924-0F90AACA1367}" type="datetime1">
               <a:rPr lang="en-US" smtClean="0"/>
-              <a:t>11/23/2025</a:t>
+              <a:t>11/24/2025</a:t>
             </a:fld>
             <a:endParaRPr lang="en-US"/>
           </a:p>
@@ -2927,7 +2929,7 @@
           <a:p>
             <a:fld id="{DF275CE9-64D9-4AF6-B2A8-CEAE19C2F2C6}" type="datetime1">
               <a:rPr lang="en-US" smtClean="0"/>
-              <a:t>11/23/2025</a:t>
+              <a:t>11/24/2025</a:t>
             </a:fld>
             <a:endParaRPr lang="en-US"/>
           </a:p>
@@ -3143,7 +3145,7 @@
           <a:p>
             <a:fld id="{BCFE1BC6-1B75-4BF5-8267-724BE6A69557}" type="datetime1">
               <a:rPr lang="en-US" smtClean="0"/>
-              <a:t>11/23/2025</a:t>
+              <a:t>11/24/2025</a:t>
             </a:fld>
             <a:endParaRPr lang="en-US"/>
           </a:p>
@@ -3719,7 +3721,7 @@
                   <a:schemeClr val="tx1"/>
                 </a:solidFill>
               </a:rPr>
-              <a:t>11/23/2025</a:t>
+              <a:t>11/24/2025</a:t>
             </a:fld>
             <a:endParaRPr lang="en-US" sz="1600" dirty="0">
               <a:solidFill>
@@ -3899,7 +3901,7 @@
                   <a:schemeClr val="tx1"/>
                 </a:solidFill>
               </a:rPr>
-              <a:t>11/23/2025</a:t>
+              <a:t>11/24/2025</a:t>
             </a:fld>
             <a:endParaRPr lang="en-US" sz="1600" dirty="0">
               <a:solidFill>
@@ -4751,7 +4753,7 @@
                   <a:schemeClr val="tx1"/>
                 </a:solidFill>
               </a:rPr>
-              <a:t>11/23/2025</a:t>
+              <a:t>11/24/2025</a:t>
             </a:fld>
             <a:endParaRPr lang="en-US" sz="1600" dirty="0">
               <a:solidFill>
@@ -5596,7 +5598,7 @@
                   <a:schemeClr val="tx1"/>
                 </a:solidFill>
               </a:rPr>
-              <a:t>11/23/2025</a:t>
+              <a:t>11/24/2025</a:t>
             </a:fld>
             <a:endParaRPr lang="en-US" sz="1600" dirty="0">
               <a:solidFill>
@@ -5675,8 +5677,8 @@
           </a:p>
         </p:txBody>
       </p:sp>
-      <mc:AlternateContent xmlns:mc="http://schemas.openxmlformats.org/markup-compatibility/2006">
-        <mc:Choice xmlns:a14="http://schemas.microsoft.com/office/drawing/2010/main" Requires="a14">
+      <mc:AlternateContent xmlns:mc="http://schemas.openxmlformats.org/markup-compatibility/2006" xmlns:a14="http://schemas.microsoft.com/office/drawing/2010/main">
+        <mc:Choice Requires="a14">
           <p:graphicFrame>
             <p:nvGraphicFramePr>
               <p:cNvPr id="8" name="Table 7">
@@ -5826,6 +5828,7 @@
                         <a:bodyPr/>
                         <a:lstStyle/>
                         <a:p>
+                          <a:pPr/>
                           <a14:m>
                             <m:oMathPara xmlns:m="http://schemas.openxmlformats.org/officeDocument/2006/math">
                               <m:oMathParaPr>
@@ -5928,6 +5931,7 @@
                         <a:bodyPr/>
                         <a:lstStyle/>
                         <a:p>
+                          <a:pPr/>
                           <a14:m>
                             <m:oMathPara xmlns:m="http://schemas.openxmlformats.org/officeDocument/2006/math">
                               <m:oMathParaPr>
@@ -7526,7 +7530,7 @@
             </a:graphic>
           </p:graphicFrame>
         </mc:Choice>
-        <mc:Fallback>
+        <mc:Fallback xmlns="">
           <p:graphicFrame>
             <p:nvGraphicFramePr>
               <p:cNvPr id="8" name="Table 7">
@@ -8064,8 +8068,8 @@
           </a:p>
         </p:txBody>
       </p:sp>
-      <mc:AlternateContent xmlns:mc="http://schemas.openxmlformats.org/markup-compatibility/2006">
-        <mc:Choice xmlns:a14="http://schemas.microsoft.com/office/drawing/2010/main" Requires="a14">
+      <mc:AlternateContent xmlns:mc="http://schemas.openxmlformats.org/markup-compatibility/2006" xmlns:a14="http://schemas.microsoft.com/office/drawing/2010/main">
+        <mc:Choice Requires="a14">
           <p:sp>
             <p:nvSpPr>
               <p:cNvPr id="19" name="TextBox 18">
@@ -8209,7 +8213,7 @@
             </p:txBody>
           </p:sp>
         </mc:Choice>
-        <mc:Fallback>
+        <mc:Fallback xmlns="">
           <p:sp>
             <p:nvSpPr>
               <p:cNvPr id="19" name="TextBox 18">
@@ -8402,7 +8406,7 @@
                   <a:schemeClr val="tx1"/>
                 </a:solidFill>
               </a:rPr>
-              <a:t>11/23/2025</a:t>
+              <a:t>11/24/2025</a:t>
             </a:fld>
             <a:endParaRPr lang="en-US" sz="1600" dirty="0">
               <a:solidFill>
@@ -8679,238 +8683,8 @@
           </a:fontRef>
         </p:style>
       </p:cxnSp>
-      <mc:AlternateContent xmlns:mc="http://schemas.openxmlformats.org/markup-compatibility/2006">
-        <mc:Choice xmlns:a14="http://schemas.microsoft.com/office/drawing/2010/main" Requires="a14">
-          <p:sp>
-            <p:nvSpPr>
-              <p:cNvPr id="12" name="TextBox 11">
-                <a:extLst>
-                  <a:ext uri="{FF2B5EF4-FFF2-40B4-BE49-F238E27FC236}">
-                    <a16:creationId xmlns:a16="http://schemas.microsoft.com/office/drawing/2014/main" id="{FDA63F08-1151-E1A1-A8C0-60965483D2D7}"/>
-                  </a:ext>
-                </a:extLst>
-              </p:cNvPr>
-              <p:cNvSpPr txBox="1"/>
-              <p:nvPr/>
-            </p:nvSpPr>
-            <p:spPr>
-              <a:xfrm>
-                <a:off x="3354307" y="2231877"/>
-                <a:ext cx="479713" cy="369332"/>
-              </a:xfrm>
-              <a:prstGeom prst="rect">
-                <a:avLst/>
-              </a:prstGeom>
-              <a:noFill/>
-            </p:spPr>
-            <p:txBody>
-              <a:bodyPr wrap="square" rtlCol="0">
-                <a:spAutoFit/>
-              </a:bodyPr>
-              <a:lstStyle/>
-              <a:p>
-                <a:pPr/>
-                <a14:m>
-                  <m:oMathPara xmlns:m="http://schemas.openxmlformats.org/officeDocument/2006/math">
-                    <m:oMathParaPr>
-                      <m:jc m:val="centerGroup"/>
-                    </m:oMathParaPr>
-                    <m:oMath xmlns:m="http://schemas.openxmlformats.org/officeDocument/2006/math">
-                      <m:sSub>
-                        <m:sSubPr>
-                          <m:ctrlPr>
-                            <a:rPr lang="en-US" b="0" i="1" smtClean="0">
-                              <a:latin typeface="Cambria Math" panose="02040503050406030204" pitchFamily="18" charset="0"/>
-                            </a:rPr>
-                          </m:ctrlPr>
-                        </m:sSubPr>
-                        <m:e>
-                          <m:r>
-                            <a:rPr lang="en-US" b="0" i="1" smtClean="0">
-                              <a:latin typeface="Cambria Math" panose="02040503050406030204" pitchFamily="18" charset="0"/>
-                            </a:rPr>
-                            <m:t>𝑤</m:t>
-                          </m:r>
-                        </m:e>
-                        <m:sub>
-                          <m:r>
-                            <a:rPr lang="en-US" b="0" i="1" smtClean="0">
-                              <a:latin typeface="Cambria Math" panose="02040503050406030204" pitchFamily="18" charset="0"/>
-                            </a:rPr>
-                            <m:t>1</m:t>
-                          </m:r>
-                        </m:sub>
-                      </m:sSub>
-                    </m:oMath>
-                  </m:oMathPara>
-                </a14:m>
-                <a:endParaRPr lang="en-US" dirty="0"/>
-              </a:p>
-            </p:txBody>
-          </p:sp>
-        </mc:Choice>
-        <mc:Fallback>
-          <p:sp>
-            <p:nvSpPr>
-              <p:cNvPr id="12" name="TextBox 11">
-                <a:extLst>
-                  <a:ext uri="{FF2B5EF4-FFF2-40B4-BE49-F238E27FC236}">
-                    <a16:creationId xmlns:a16="http://schemas.microsoft.com/office/drawing/2014/main" id="{FDA63F08-1151-E1A1-A8C0-60965483D2D7}"/>
-                  </a:ext>
-                </a:extLst>
-              </p:cNvPr>
-              <p:cNvSpPr txBox="1">
-                <a:spLocks noRot="1" noChangeAspect="1" noMove="1" noResize="1" noEditPoints="1" noAdjustHandles="1" noChangeArrowheads="1" noChangeShapeType="1" noTextEdit="1"/>
-              </p:cNvSpPr>
-              <p:nvPr/>
-            </p:nvSpPr>
-            <p:spPr>
-              <a:xfrm>
-                <a:off x="3354307" y="2231877"/>
-                <a:ext cx="479713" cy="369332"/>
-              </a:xfrm>
-              <a:prstGeom prst="rect">
-                <a:avLst/>
-              </a:prstGeom>
-              <a:blipFill>
-                <a:blip r:embed="rId2"/>
-                <a:stretch>
-                  <a:fillRect/>
-                </a:stretch>
-              </a:blipFill>
-            </p:spPr>
-            <p:txBody>
-              <a:bodyPr/>
-              <a:lstStyle/>
-              <a:p>
-                <a:r>
-                  <a:rPr lang="en-US">
-                    <a:noFill/>
-                  </a:rPr>
-                  <a:t> </a:t>
-                </a:r>
-              </a:p>
-            </p:txBody>
-          </p:sp>
-        </mc:Fallback>
-      </mc:AlternateContent>
-      <mc:AlternateContent xmlns:mc="http://schemas.openxmlformats.org/markup-compatibility/2006">
-        <mc:Choice xmlns:a14="http://schemas.microsoft.com/office/drawing/2010/main" Requires="a14">
-          <p:sp>
-            <p:nvSpPr>
-              <p:cNvPr id="13" name="TextBox 12">
-                <a:extLst>
-                  <a:ext uri="{FF2B5EF4-FFF2-40B4-BE49-F238E27FC236}">
-                    <a16:creationId xmlns:a16="http://schemas.microsoft.com/office/drawing/2014/main" id="{EEF1E6A6-D151-830D-D681-D330CCE2C056}"/>
-                  </a:ext>
-                </a:extLst>
-              </p:cNvPr>
-              <p:cNvSpPr txBox="1"/>
-              <p:nvPr/>
-            </p:nvSpPr>
-            <p:spPr>
-              <a:xfrm>
-                <a:off x="3354306" y="3676825"/>
-                <a:ext cx="479713" cy="369332"/>
-              </a:xfrm>
-              <a:prstGeom prst="rect">
-                <a:avLst/>
-              </a:prstGeom>
-              <a:noFill/>
-            </p:spPr>
-            <p:txBody>
-              <a:bodyPr wrap="square" rtlCol="0">
-                <a:spAutoFit/>
-              </a:bodyPr>
-              <a:lstStyle/>
-              <a:p>
-                <a:pPr/>
-                <a14:m>
-                  <m:oMathPara xmlns:m="http://schemas.openxmlformats.org/officeDocument/2006/math">
-                    <m:oMathParaPr>
-                      <m:jc m:val="centerGroup"/>
-                    </m:oMathParaPr>
-                    <m:oMath xmlns:m="http://schemas.openxmlformats.org/officeDocument/2006/math">
-                      <m:sSub>
-                        <m:sSubPr>
-                          <m:ctrlPr>
-                            <a:rPr lang="en-US" b="0" i="1" smtClean="0">
-                              <a:latin typeface="Cambria Math" panose="02040503050406030204" pitchFamily="18" charset="0"/>
-                            </a:rPr>
-                          </m:ctrlPr>
-                        </m:sSubPr>
-                        <m:e>
-                          <m:r>
-                            <a:rPr lang="en-US" b="0" i="1" smtClean="0">
-                              <a:latin typeface="Cambria Math" panose="02040503050406030204" pitchFamily="18" charset="0"/>
-                            </a:rPr>
-                            <m:t>𝑤</m:t>
-                          </m:r>
-                        </m:e>
-                        <m:sub>
-                          <m:r>
-                            <a:rPr lang="en-US" b="0" i="1" smtClean="0">
-                              <a:latin typeface="Cambria Math" panose="02040503050406030204" pitchFamily="18" charset="0"/>
-                            </a:rPr>
-                            <m:t>2</m:t>
-                          </m:r>
-                        </m:sub>
-                      </m:sSub>
-                    </m:oMath>
-                  </m:oMathPara>
-                </a14:m>
-                <a:endParaRPr lang="en-US" dirty="0"/>
-              </a:p>
-            </p:txBody>
-          </p:sp>
-        </mc:Choice>
-        <mc:Fallback>
-          <p:sp>
-            <p:nvSpPr>
-              <p:cNvPr id="13" name="TextBox 12">
-                <a:extLst>
-                  <a:ext uri="{FF2B5EF4-FFF2-40B4-BE49-F238E27FC236}">
-                    <a16:creationId xmlns:a16="http://schemas.microsoft.com/office/drawing/2014/main" id="{EEF1E6A6-D151-830D-D681-D330CCE2C056}"/>
-                  </a:ext>
-                </a:extLst>
-              </p:cNvPr>
-              <p:cNvSpPr txBox="1">
-                <a:spLocks noRot="1" noChangeAspect="1" noMove="1" noResize="1" noEditPoints="1" noAdjustHandles="1" noChangeArrowheads="1" noChangeShapeType="1" noTextEdit="1"/>
-              </p:cNvSpPr>
-              <p:nvPr/>
-            </p:nvSpPr>
-            <p:spPr>
-              <a:xfrm>
-                <a:off x="3354306" y="3676825"/>
-                <a:ext cx="479713" cy="369332"/>
-              </a:xfrm>
-              <a:prstGeom prst="rect">
-                <a:avLst/>
-              </a:prstGeom>
-              <a:blipFill>
-                <a:blip r:embed="rId3"/>
-                <a:stretch>
-                  <a:fillRect/>
-                </a:stretch>
-              </a:blipFill>
-            </p:spPr>
-            <p:txBody>
-              <a:bodyPr/>
-              <a:lstStyle/>
-              <a:p>
-                <a:r>
-                  <a:rPr lang="en-US">
-                    <a:noFill/>
-                  </a:rPr>
-                  <a:t> </a:t>
-                </a:r>
-              </a:p>
-            </p:txBody>
-          </p:sp>
-        </mc:Fallback>
-      </mc:AlternateContent>
-      <mc:AlternateContent xmlns:mc="http://schemas.openxmlformats.org/markup-compatibility/2006">
-        <mc:Choice xmlns:a14="http://schemas.microsoft.com/office/drawing/2010/main" Requires="a14">
+      <mc:AlternateContent xmlns:mc="http://schemas.openxmlformats.org/markup-compatibility/2006" xmlns:a14="http://schemas.microsoft.com/office/drawing/2010/main">
+        <mc:Choice Requires="a14">
           <p:sp>
             <p:nvSpPr>
               <p:cNvPr id="16" name="TextBox 15">
@@ -8979,7 +8753,7 @@
             </p:txBody>
           </p:sp>
         </mc:Choice>
-        <mc:Fallback>
+        <mc:Fallback xmlns="">
           <p:sp>
             <p:nvSpPr>
               <p:cNvPr id="16" name="TextBox 15">
@@ -9036,7 +8810,6 @@
           <p:cNvCxnSpPr>
             <a:cxnSpLocks/>
             <a:stCxn id="16" idx="3"/>
-            <a:endCxn id="28" idx="2"/>
           </p:cNvCxnSpPr>
           <p:nvPr/>
         </p:nvCxnSpPr>
@@ -9079,7 +8852,6 @@
           <p:cNvCxnSpPr>
             <a:cxnSpLocks/>
             <a:stCxn id="3" idx="3"/>
-            <a:endCxn id="28" idx="2"/>
           </p:cNvCxnSpPr>
           <p:nvPr/>
         </p:nvCxnSpPr>
@@ -9110,67 +8882,8 @@
           </a:fontRef>
         </p:style>
       </p:cxnSp>
-      <p:sp>
-        <p:nvSpPr>
-          <p:cNvPr id="28" name="Oval 27">
-            <a:extLst>
-              <a:ext uri="{FF2B5EF4-FFF2-40B4-BE49-F238E27FC236}">
-                <a16:creationId xmlns:a16="http://schemas.microsoft.com/office/drawing/2014/main" id="{B04E1D68-A44D-8641-AF98-45E147C17715}"/>
-              </a:ext>
-            </a:extLst>
-          </p:cNvPr>
-          <p:cNvSpPr/>
-          <p:nvPr/>
-        </p:nvSpPr>
-        <p:spPr>
-          <a:xfrm>
-            <a:off x="5533375" y="3208223"/>
-            <a:ext cx="1381989" cy="446809"/>
-          </a:xfrm>
-          <a:prstGeom prst="ellipse">
-            <a:avLst/>
-          </a:prstGeom>
-        </p:spPr>
-        <p:style>
-          <a:lnRef idx="2">
-            <a:schemeClr val="accent1">
-              <a:shade val="15000"/>
-            </a:schemeClr>
-          </a:lnRef>
-          <a:fillRef idx="1">
-            <a:schemeClr val="accent1"/>
-          </a:fillRef>
-          <a:effectRef idx="0">
-            <a:schemeClr val="accent1"/>
-          </a:effectRef>
-          <a:fontRef idx="minor">
-            <a:schemeClr val="lt1"/>
-          </a:fontRef>
-        </p:style>
-        <p:txBody>
-          <a:bodyPr rtlCol="0" anchor="ctr"/>
-          <a:lstStyle/>
-          <a:p>
-            <a:pPr algn="ctr"/>
-            <a:r>
-              <a:rPr lang="en-US" b="1" dirty="0">
-                <a:effectLst>
-                  <a:outerShdw blurRad="38100" dist="38100" dir="2700000" algn="tl">
-                    <a:srgbClr val="000000">
-                      <a:alpha val="43137"/>
-                    </a:srgbClr>
-                  </a:outerShdw>
-                </a:effectLst>
-                <a:latin typeface="Times New Roman" panose="02020603050405020304" pitchFamily="18" charset="0"/>
-                <a:cs typeface="Times New Roman" panose="02020603050405020304" pitchFamily="18" charset="0"/>
-              </a:rPr>
-              <a:t>Server</a:t>
-            </a:r>
-          </a:p>
-        </p:txBody>
-      </p:sp>
-      <mc:AlternateContent xmlns:mc="http://schemas.openxmlformats.org/markup-compatibility/2006">
-        <mc:Choice xmlns:a14="http://schemas.microsoft.com/office/drawing/2010/main" Requires="a14">
+      <mc:AlternateContent xmlns:mc="http://schemas.openxmlformats.org/markup-compatibility/2006" xmlns:a14="http://schemas.microsoft.com/office/drawing/2010/main">
+        <mc:Choice Requires="a14">
           <p:sp>
             <p:nvSpPr>
               <p:cNvPr id="3" name="TextBox 2">
@@ -9239,7 +8952,7 @@
             </p:txBody>
           </p:sp>
         </mc:Choice>
-        <mc:Fallback>
+        <mc:Fallback xmlns="">
           <p:sp>
             <p:nvSpPr>
               <p:cNvPr id="3" name="TextBox 2">
@@ -9294,14 +9007,14 @@
             </a:extLst>
           </p:cNvPr>
           <p:cNvCxnSpPr>
-            <a:stCxn id="28" idx="6"/>
+            <a:cxnSpLocks/>
           </p:cNvCxnSpPr>
           <p:nvPr/>
         </p:nvCxnSpPr>
         <p:spPr>
-          <a:xfrm flipV="1">
-            <a:off x="6915364" y="3431627"/>
-            <a:ext cx="779980" cy="1"/>
+          <a:xfrm>
+            <a:off x="8006576" y="3429000"/>
+            <a:ext cx="986735" cy="0"/>
           </a:xfrm>
           <a:prstGeom prst="straightConnector1">
             <a:avLst/>
@@ -9341,7 +9054,7 @@
             </p:nvSpPr>
             <p:spPr>
               <a:xfrm>
-                <a:off x="7460011" y="3240805"/>
+                <a:off x="8882396" y="3226357"/>
                 <a:ext cx="1879315" cy="381643"/>
               </a:xfrm>
               <a:prstGeom prst="rect">
@@ -9467,7 +9180,7 @@
             </p:nvSpPr>
             <p:spPr>
               <a:xfrm>
-                <a:off x="7460011" y="3240805"/>
+                <a:off x="8882396" y="3226357"/>
                 <a:ext cx="1879315" cy="381643"/>
               </a:xfrm>
               <a:prstGeom prst="rect">
@@ -9476,7 +9189,7 @@
               <a:blipFill>
                 <a:blip r:embed="rId6"/>
                 <a:stretch>
-                  <a:fillRect t="-4839"/>
+                  <a:fillRect t="-4762"/>
                 </a:stretch>
               </a:blipFill>
             </p:spPr>
@@ -9509,8 +9222,8 @@
         </p:nvSpPr>
         <p:spPr>
           <a:xfrm>
-            <a:off x="7695344" y="3622448"/>
-            <a:ext cx="2958957" cy="369332"/>
+            <a:off x="5610889" y="3232513"/>
+            <a:ext cx="2524928" cy="369332"/>
           </a:xfrm>
           <a:prstGeom prst="rect">
             <a:avLst/>
@@ -9530,6 +9243,69 @@
               </a:rPr>
               <a:t>Aggregated public keys</a:t>
             </a:r>
+          </a:p>
+        </p:txBody>
+      </p:sp>
+      <p:sp>
+        <p:nvSpPr>
+          <p:cNvPr id="18" name="TextBox 17">
+            <a:extLst>
+              <a:ext uri="{FF2B5EF4-FFF2-40B4-BE49-F238E27FC236}">
+                <a16:creationId xmlns:a16="http://schemas.microsoft.com/office/drawing/2014/main" id="{043BF024-943A-4901-6AA6-058763E6ECD6}"/>
+              </a:ext>
+            </a:extLst>
+          </p:cNvPr>
+          <p:cNvSpPr txBox="1"/>
+          <p:nvPr/>
+        </p:nvSpPr>
+        <p:spPr>
+          <a:xfrm>
+            <a:off x="3001100" y="4790459"/>
+            <a:ext cx="7113058" cy="400110"/>
+          </a:xfrm>
+          <a:prstGeom prst="rect">
+            <a:avLst/>
+          </a:prstGeom>
+          <a:noFill/>
+        </p:spPr>
+        <p:txBody>
+          <a:bodyPr wrap="square">
+            <a:spAutoFit/>
+          </a:bodyPr>
+          <a:lstStyle/>
+          <a:p>
+            <a:r>
+              <a:rPr lang="en-US" sz="2000" dirty="0">
+                <a:latin typeface="Times New Roman" panose="02020603050405020304" pitchFamily="18" charset="0"/>
+                <a:cs typeface="Times New Roman" panose="02020603050405020304" pitchFamily="18" charset="0"/>
+              </a:rPr>
+              <a:t>All </a:t>
+            </a:r>
+            <a:r>
+              <a:rPr lang="en-US" sz="2000" b="1" dirty="0">
+                <a:effectLst>
+                  <a:outerShdw blurRad="38100" dist="38100" dir="2700000" algn="tl">
+                    <a:srgbClr val="000000">
+                      <a:alpha val="43137"/>
+                    </a:srgbClr>
+                  </a:outerShdw>
+                </a:effectLst>
+                <a:latin typeface="Times New Roman" panose="02020603050405020304" pitchFamily="18" charset="0"/>
+                <a:cs typeface="Times New Roman" panose="02020603050405020304" pitchFamily="18" charset="0"/>
+              </a:rPr>
+              <a:t>public keys </a:t>
+            </a:r>
+            <a:r>
+              <a:rPr lang="en-US" sz="2000" dirty="0">
+                <a:latin typeface="Times New Roman" panose="02020603050405020304" pitchFamily="18" charset="0"/>
+                <a:cs typeface="Times New Roman" panose="02020603050405020304" pitchFamily="18" charset="0"/>
+              </a:rPr>
+              <a:t>from all client are required to encrypt the message. </a:t>
+            </a:r>
+            <a:endParaRPr lang="en-US" sz="2000" b="1" dirty="0">
+              <a:latin typeface="Times New Roman" panose="02020603050405020304" pitchFamily="18" charset="0"/>
+              <a:cs typeface="Times New Roman" panose="02020603050405020304" pitchFamily="18" charset="0"/>
+            </a:endParaRPr>
           </a:p>
         </p:txBody>
       </p:sp>
@@ -9634,7 +9410,7 @@
                   <a:schemeClr val="tx1"/>
                 </a:solidFill>
               </a:rPr>
-              <a:t>11/23/2025</a:t>
+              <a:t>11/24/2025</a:t>
             </a:fld>
             <a:endParaRPr lang="en-US" sz="1600" dirty="0">
               <a:solidFill>
@@ -9911,8 +9687,8 @@
           </a:fontRef>
         </p:style>
       </p:cxnSp>
-      <mc:AlternateContent xmlns:mc="http://schemas.openxmlformats.org/markup-compatibility/2006">
-        <mc:Choice xmlns:a14="http://schemas.microsoft.com/office/drawing/2010/main" Requires="a14">
+      <mc:AlternateContent xmlns:mc="http://schemas.openxmlformats.org/markup-compatibility/2006" xmlns:a14="http://schemas.microsoft.com/office/drawing/2010/main">
+        <mc:Choice Requires="a14">
           <p:sp>
             <p:nvSpPr>
               <p:cNvPr id="24" name="TextBox 23">
@@ -9981,7 +9757,7 @@
             </p:txBody>
           </p:sp>
         </mc:Choice>
-        <mc:Fallback>
+        <mc:Fallback xmlns="">
           <p:sp>
             <p:nvSpPr>
               <p:cNvPr id="24" name="TextBox 23">
@@ -10171,8 +9947,8 @@
           </a:p>
         </p:txBody>
       </p:sp>
-      <mc:AlternateContent xmlns:mc="http://schemas.openxmlformats.org/markup-compatibility/2006">
-        <mc:Choice xmlns:a14="http://schemas.microsoft.com/office/drawing/2010/main" Requires="a14">
+      <mc:AlternateContent xmlns:mc="http://schemas.openxmlformats.org/markup-compatibility/2006" xmlns:a14="http://schemas.microsoft.com/office/drawing/2010/main">
+        <mc:Choice Requires="a14">
           <p:sp>
             <p:nvSpPr>
               <p:cNvPr id="31" name="TextBox 30">
@@ -10241,7 +10017,7 @@
             </p:txBody>
           </p:sp>
         </mc:Choice>
-        <mc:Fallback>
+        <mc:Fallback xmlns="">
           <p:sp>
             <p:nvSpPr>
               <p:cNvPr id="31" name="TextBox 30">
@@ -10327,8 +10103,8 @@
           </a:fontRef>
         </p:style>
       </p:cxnSp>
-      <mc:AlternateContent xmlns:mc="http://schemas.openxmlformats.org/markup-compatibility/2006">
-        <mc:Choice xmlns:a14="http://schemas.microsoft.com/office/drawing/2010/main" Requires="a14">
+      <mc:AlternateContent xmlns:mc="http://schemas.openxmlformats.org/markup-compatibility/2006" xmlns:a14="http://schemas.microsoft.com/office/drawing/2010/main">
+        <mc:Choice Requires="a14">
           <p:sp>
             <p:nvSpPr>
               <p:cNvPr id="33" name="TextBox 32">
@@ -10440,7 +10216,7 @@
             </p:txBody>
           </p:sp>
         </mc:Choice>
-        <mc:Fallback>
+        <mc:Fallback xmlns="">
           <p:sp>
             <p:nvSpPr>
               <p:cNvPr id="33" name="TextBox 32">
@@ -10652,7 +10428,7 @@
                   <a:schemeClr val="tx1"/>
                 </a:solidFill>
               </a:rPr>
-              <a:t>11/23/2025</a:t>
+              <a:t>11/24/2025</a:t>
             </a:fld>
             <a:endParaRPr lang="en-US" sz="1600" dirty="0">
               <a:solidFill>
@@ -12263,8 +12039,8 @@
           </p:sp>
         </mc:Fallback>
       </mc:AlternateContent>
-      <mc:AlternateContent xmlns:mc="http://schemas.openxmlformats.org/markup-compatibility/2006">
-        <mc:Choice xmlns:a14="http://schemas.microsoft.com/office/drawing/2010/main" Requires="a14">
+      <mc:AlternateContent xmlns:mc="http://schemas.openxmlformats.org/markup-compatibility/2006" xmlns:a14="http://schemas.microsoft.com/office/drawing/2010/main">
+        <mc:Choice Requires="a14">
           <p:sp>
             <p:nvSpPr>
               <p:cNvPr id="37" name="TextBox 36">
@@ -12382,7 +12158,7 @@
             </p:txBody>
           </p:sp>
         </mc:Choice>
-        <mc:Fallback>
+        <mc:Fallback xmlns="">
           <p:sp>
             <p:nvSpPr>
               <p:cNvPr id="37" name="TextBox 36">
@@ -13161,7 +12937,7 @@
                   <a:schemeClr val="tx1"/>
                 </a:solidFill>
               </a:rPr>
-              <a:t>11/23/2025</a:t>
+              <a:t>11/24/2025</a:t>
             </a:fld>
             <a:endParaRPr lang="en-US" sz="1600" dirty="0">
               <a:solidFill>
@@ -13643,6 +13419,1076 @@
         <p:cNvPr id="1" name="">
           <a:extLst>
             <a:ext uri="{FF2B5EF4-FFF2-40B4-BE49-F238E27FC236}">
+              <a16:creationId xmlns:a16="http://schemas.microsoft.com/office/drawing/2014/main" id="{71846493-629C-8612-D8C0-6597AA834D0B}"/>
+            </a:ext>
+          </a:extLst>
+        </p:cNvPr>
+        <p:cNvGrpSpPr/>
+        <p:nvPr/>
+      </p:nvGrpSpPr>
+      <p:grpSpPr>
+        <a:xfrm>
+          <a:off x="0" y="0"/>
+          <a:ext cx="0" cy="0"/>
+          <a:chOff x="0" y="0"/>
+          <a:chExt cx="0" cy="0"/>
+        </a:xfrm>
+      </p:grpSpPr>
+      <p:sp>
+        <p:nvSpPr>
+          <p:cNvPr id="2" name="Title 1">
+            <a:extLst>
+              <a:ext uri="{FF2B5EF4-FFF2-40B4-BE49-F238E27FC236}">
+                <a16:creationId xmlns:a16="http://schemas.microsoft.com/office/drawing/2014/main" id="{A930792B-0A69-28EE-F8C5-A917A8233A52}"/>
+              </a:ext>
+            </a:extLst>
+          </p:cNvPr>
+          <p:cNvSpPr>
+            <a:spLocks noGrp="1"/>
+          </p:cNvSpPr>
+          <p:nvPr>
+            <p:ph type="title"/>
+          </p:nvPr>
+        </p:nvSpPr>
+        <p:spPr/>
+        <p:txBody>
+          <a:bodyPr/>
+          <a:lstStyle/>
+          <a:p>
+            <a:r>
+              <a:rPr lang="en-US" b="1" dirty="0">
+                <a:effectLst>
+                  <a:outerShdw blurRad="38100" dist="38100" dir="2700000" algn="tl">
+                    <a:srgbClr val="000000">
+                      <a:alpha val="43137"/>
+                    </a:srgbClr>
+                  </a:outerShdw>
+                </a:effectLst>
+                <a:latin typeface="Times New Roman" panose="02020603050405020304" pitchFamily="18" charset="0"/>
+                <a:cs typeface="Times New Roman" panose="02020603050405020304" pitchFamily="18" charset="0"/>
+              </a:rPr>
+              <a:t>8. DF-KS scheme (security parameters)</a:t>
+            </a:r>
+          </a:p>
+        </p:txBody>
+      </p:sp>
+      <p:sp>
+        <p:nvSpPr>
+          <p:cNvPr id="4" name="Date Placeholder 3">
+            <a:extLst>
+              <a:ext uri="{FF2B5EF4-FFF2-40B4-BE49-F238E27FC236}">
+                <a16:creationId xmlns:a16="http://schemas.microsoft.com/office/drawing/2014/main" id="{0965C7F7-CAB1-F1B6-CD5D-CAFBE980B99C}"/>
+              </a:ext>
+            </a:extLst>
+          </p:cNvPr>
+          <p:cNvSpPr>
+            <a:spLocks noGrp="1"/>
+          </p:cNvSpPr>
+          <p:nvPr>
+            <p:ph type="dt" sz="half" idx="10"/>
+          </p:nvPr>
+        </p:nvSpPr>
+        <p:spPr/>
+        <p:txBody>
+          <a:bodyPr/>
+          <a:lstStyle/>
+          <a:p>
+            <a:fld id="{B8ADA9AE-1E4E-4CF6-B35A-04249EFC3058}" type="datetime1">
+              <a:rPr lang="en-US" sz="1600" smtClean="0">
+                <a:solidFill>
+                  <a:schemeClr val="tx1"/>
+                </a:solidFill>
+              </a:rPr>
+              <a:t>11/24/2025</a:t>
+            </a:fld>
+            <a:endParaRPr lang="en-US" sz="1600" dirty="0">
+              <a:solidFill>
+                <a:schemeClr val="tx1"/>
+              </a:solidFill>
+            </a:endParaRPr>
+          </a:p>
+        </p:txBody>
+      </p:sp>
+      <p:sp>
+        <p:nvSpPr>
+          <p:cNvPr id="5" name="Footer Placeholder 4">
+            <a:extLst>
+              <a:ext uri="{FF2B5EF4-FFF2-40B4-BE49-F238E27FC236}">
+                <a16:creationId xmlns:a16="http://schemas.microsoft.com/office/drawing/2014/main" id="{99157880-9F47-9366-61F8-0C9CDE500144}"/>
+              </a:ext>
+            </a:extLst>
+          </p:cNvPr>
+          <p:cNvSpPr>
+            <a:spLocks noGrp="1"/>
+          </p:cNvSpPr>
+          <p:nvPr>
+            <p:ph type="ftr" sz="quarter" idx="11"/>
+          </p:nvPr>
+        </p:nvSpPr>
+        <p:spPr/>
+        <p:txBody>
+          <a:bodyPr/>
+          <a:lstStyle/>
+          <a:p>
+            <a:r>
+              <a:rPr lang="en-US" sz="1600">
+                <a:solidFill>
+                  <a:schemeClr val="tx1"/>
+                </a:solidFill>
+              </a:rPr>
+              <a:t>Key switchable HE for FL</a:t>
+            </a:r>
+          </a:p>
+        </p:txBody>
+      </p:sp>
+      <p:sp>
+        <p:nvSpPr>
+          <p:cNvPr id="6" name="Slide Number Placeholder 5">
+            <a:extLst>
+              <a:ext uri="{FF2B5EF4-FFF2-40B4-BE49-F238E27FC236}">
+                <a16:creationId xmlns:a16="http://schemas.microsoft.com/office/drawing/2014/main" id="{7E457EBC-DCD4-9F62-C0AF-F8CC3FDF8D8E}"/>
+              </a:ext>
+            </a:extLst>
+          </p:cNvPr>
+          <p:cNvSpPr>
+            <a:spLocks noGrp="1"/>
+          </p:cNvSpPr>
+          <p:nvPr>
+            <p:ph type="sldNum" sz="quarter" idx="12"/>
+          </p:nvPr>
+        </p:nvSpPr>
+        <p:spPr/>
+        <p:txBody>
+          <a:bodyPr/>
+          <a:lstStyle/>
+          <a:p>
+            <a:fld id="{7F59E849-A344-4026-A8F6-1F4993DF7FB9}" type="slidenum">
+              <a:rPr lang="en-US" sz="1400" smtClean="0">
+                <a:solidFill>
+                  <a:schemeClr val="tx1"/>
+                </a:solidFill>
+              </a:rPr>
+              <a:t>17</a:t>
+            </a:fld>
+            <a:endParaRPr lang="en-US" sz="1400" dirty="0">
+              <a:solidFill>
+                <a:schemeClr val="tx1"/>
+              </a:solidFill>
+            </a:endParaRPr>
+          </a:p>
+        </p:txBody>
+      </p:sp>
+      <mc:AlternateContent xmlns:mc="http://schemas.openxmlformats.org/markup-compatibility/2006">
+        <mc:Choice xmlns:a14="http://schemas.microsoft.com/office/drawing/2010/main" Requires="a14">
+          <p:graphicFrame>
+            <p:nvGraphicFramePr>
+              <p:cNvPr id="3" name="Table 2">
+                <a:extLst>
+                  <a:ext uri="{FF2B5EF4-FFF2-40B4-BE49-F238E27FC236}">
+                    <a16:creationId xmlns:a16="http://schemas.microsoft.com/office/drawing/2014/main" id="{0EC969B7-E9FC-BBCC-91C2-B54BF540FC1D}"/>
+                  </a:ext>
+                </a:extLst>
+              </p:cNvPr>
+              <p:cNvGraphicFramePr>
+                <a:graphicFrameLocks noGrp="1"/>
+              </p:cNvGraphicFramePr>
+              <p:nvPr>
+                <p:extLst>
+                  <p:ext uri="{D42A27DB-BD31-4B8C-83A1-F6EECF244321}">
+                    <p14:modId xmlns:p14="http://schemas.microsoft.com/office/powerpoint/2010/main" val="1416986296"/>
+                  </p:ext>
+                </p:extLst>
+              </p:nvPr>
+            </p:nvGraphicFramePr>
+            <p:xfrm>
+              <a:off x="2032000" y="2316480"/>
+              <a:ext cx="8128000" cy="2232787"/>
+            </p:xfrm>
+            <a:graphic>
+              <a:graphicData uri="http://schemas.openxmlformats.org/drawingml/2006/table">
+                <a:tbl>
+                  <a:tblPr firstRow="1" bandRow="1">
+                    <a:tableStyleId>{5C22544A-7EE6-4342-B048-85BDC9FD1C3A}</a:tableStyleId>
+                  </a:tblPr>
+                  <a:tblGrid>
+                    <a:gridCol w="4064000">
+                      <a:extLst>
+                        <a:ext uri="{9D8B030D-6E8A-4147-A177-3AD203B41FA5}">
+                          <a16:colId xmlns:a16="http://schemas.microsoft.com/office/drawing/2014/main" val="1446266223"/>
+                        </a:ext>
+                      </a:extLst>
+                    </a:gridCol>
+                    <a:gridCol w="4064000">
+                      <a:extLst>
+                        <a:ext uri="{9D8B030D-6E8A-4147-A177-3AD203B41FA5}">
+                          <a16:colId xmlns:a16="http://schemas.microsoft.com/office/drawing/2014/main" val="1644755617"/>
+                        </a:ext>
+                      </a:extLst>
+                    </a:gridCol>
+                  </a:tblGrid>
+                  <a:tr h="370840">
+                    <a:tc>
+                      <a:txBody>
+                        <a:bodyPr/>
+                        <a:lstStyle/>
+                        <a:p>
+                          <a:r>
+                            <a:rPr lang="en-US" dirty="0">
+                              <a:effectLst>
+                                <a:outerShdw blurRad="38100" dist="38100" dir="2700000" algn="tl">
+                                  <a:srgbClr val="000000">
+                                    <a:alpha val="43137"/>
+                                  </a:srgbClr>
+                                </a:outerShdw>
+                              </a:effectLst>
+                              <a:latin typeface="Times New Roman" panose="02020603050405020304" pitchFamily="18" charset="0"/>
+                              <a:cs typeface="Times New Roman" panose="02020603050405020304" pitchFamily="18" charset="0"/>
+                            </a:rPr>
+                            <a:t>Security Parameter</a:t>
+                          </a:r>
+                        </a:p>
+                      </a:txBody>
+                      <a:tcPr/>
+                    </a:tc>
+                    <a:tc>
+                      <a:txBody>
+                        <a:bodyPr/>
+                        <a:lstStyle/>
+                        <a:p>
+                          <a:r>
+                            <a:rPr lang="en-US" dirty="0">
+                              <a:effectLst>
+                                <a:outerShdw blurRad="38100" dist="38100" dir="2700000" algn="tl">
+                                  <a:srgbClr val="000000">
+                                    <a:alpha val="43137"/>
+                                  </a:srgbClr>
+                                </a:outerShdw>
+                              </a:effectLst>
+                              <a:latin typeface="Times New Roman" panose="02020603050405020304" pitchFamily="18" charset="0"/>
+                              <a:cs typeface="Times New Roman" panose="02020603050405020304" pitchFamily="18" charset="0"/>
+                            </a:rPr>
+                            <a:t>Symbol</a:t>
+                          </a:r>
+                        </a:p>
+                      </a:txBody>
+                      <a:tcPr/>
+                    </a:tc>
+                    <a:extLst>
+                      <a:ext uri="{0D108BD9-81ED-4DB2-BD59-A6C34878D82A}">
+                        <a16:rowId xmlns:a16="http://schemas.microsoft.com/office/drawing/2014/main" val="1127183632"/>
+                      </a:ext>
+                    </a:extLst>
+                  </a:tr>
+                  <a:tr h="370840">
+                    <a:tc>
+                      <a:txBody>
+                        <a:bodyPr/>
+                        <a:lstStyle/>
+                        <a:p>
+                          <a:pPr marL="0" marR="0" lvl="0" indent="0" algn="l" defTabSz="914400" rtl="0" eaLnBrk="1" fontAlgn="auto" latinLnBrk="0" hangingPunct="1">
+                            <a:lnSpc>
+                              <a:spcPct val="100000"/>
+                            </a:lnSpc>
+                            <a:spcBef>
+                              <a:spcPts val="0"/>
+                            </a:spcBef>
+                            <a:spcAft>
+                              <a:spcPts val="0"/>
+                            </a:spcAft>
+                            <a:buClrTx/>
+                            <a:buSzTx/>
+                            <a:buFontTx/>
+                            <a:buNone/>
+                            <a:tabLst/>
+                            <a:defRPr/>
+                          </a:pPr>
+                          <a:r>
+                            <a:rPr lang="en-US" dirty="0">
+                              <a:latin typeface="Times New Roman" panose="02020603050405020304" pitchFamily="18" charset="0"/>
+                              <a:cs typeface="Times New Roman" panose="02020603050405020304" pitchFamily="18" charset="0"/>
+                            </a:rPr>
+                            <a:t>Security parameter</a:t>
+                          </a:r>
+                        </a:p>
+                      </a:txBody>
+                      <a:tcPr/>
+                    </a:tc>
+                    <a:tc>
+                      <a:txBody>
+                        <a:bodyPr/>
+                        <a:lstStyle/>
+                        <a:p>
+                          <a:pPr/>
+                          <a14:m>
+                            <m:oMathPara xmlns:m="http://schemas.openxmlformats.org/officeDocument/2006/math">
+                              <m:oMathParaPr>
+                                <m:jc m:val="centerGroup"/>
+                              </m:oMathParaPr>
+                              <m:oMath xmlns:m="http://schemas.openxmlformats.org/officeDocument/2006/math">
+                                <m:r>
+                                  <m:rPr>
+                                    <m:sty m:val="p"/>
+                                  </m:rPr>
+                                  <a:rPr lang="el-GR" b="0" i="1" smtClean="0">
+                                    <a:latin typeface="Cambria Math" panose="02040503050406030204" pitchFamily="18" charset="0"/>
+                                  </a:rPr>
+                                  <m:t>λ</m:t>
+                                </m:r>
+                              </m:oMath>
+                            </m:oMathPara>
+                          </a14:m>
+                          <a:endParaRPr lang="en-US" b="0" dirty="0"/>
+                        </a:p>
+                      </a:txBody>
+                      <a:tcPr/>
+                    </a:tc>
+                    <a:extLst>
+                      <a:ext uri="{0D108BD9-81ED-4DB2-BD59-A6C34878D82A}">
+                        <a16:rowId xmlns:a16="http://schemas.microsoft.com/office/drawing/2014/main" val="2291599393"/>
+                      </a:ext>
+                    </a:extLst>
+                  </a:tr>
+                  <a:tr h="370840">
+                    <a:tc>
+                      <a:txBody>
+                        <a:bodyPr/>
+                        <a:lstStyle/>
+                        <a:p>
+                          <a:pPr marL="0" marR="0" lvl="0" indent="0" algn="l" defTabSz="914400" rtl="0" eaLnBrk="1" fontAlgn="auto" latinLnBrk="0" hangingPunct="1">
+                            <a:lnSpc>
+                              <a:spcPct val="100000"/>
+                            </a:lnSpc>
+                            <a:spcBef>
+                              <a:spcPts val="0"/>
+                            </a:spcBef>
+                            <a:spcAft>
+                              <a:spcPts val="0"/>
+                            </a:spcAft>
+                            <a:buClrTx/>
+                            <a:buSzTx/>
+                            <a:buFontTx/>
+                            <a:buNone/>
+                            <a:tabLst/>
+                            <a:defRPr/>
+                          </a:pPr>
+                          <a:r>
+                            <a:rPr lang="en-US" dirty="0">
+                              <a:latin typeface="Times New Roman" panose="02020603050405020304" pitchFamily="18" charset="0"/>
+                              <a:cs typeface="Times New Roman" panose="02020603050405020304" pitchFamily="18" charset="0"/>
+                            </a:rPr>
+                            <a:t>Private modulus</a:t>
+                          </a:r>
+                        </a:p>
+                      </a:txBody>
+                      <a:tcPr/>
+                    </a:tc>
+                    <a:tc>
+                      <a:txBody>
+                        <a:bodyPr/>
+                        <a:lstStyle/>
+                        <a:p>
+                          <a:pPr marL="0" marR="0" lvl="0" indent="0" algn="ctr" defTabSz="914400" rtl="0" eaLnBrk="1" fontAlgn="auto" latinLnBrk="0" hangingPunct="1">
+                            <a:lnSpc>
+                              <a:spcPct val="100000"/>
+                            </a:lnSpc>
+                            <a:spcBef>
+                              <a:spcPts val="0"/>
+                            </a:spcBef>
+                            <a:spcAft>
+                              <a:spcPts val="0"/>
+                            </a:spcAft>
+                            <a:buClrTx/>
+                            <a:buSzTx/>
+                            <a:buFontTx/>
+                            <a:buNone/>
+                            <a:tabLst/>
+                            <a:defRPr/>
+                          </a:pPr>
+                          <a14:m>
+                            <m:oMathPara xmlns:m="http://schemas.openxmlformats.org/officeDocument/2006/math">
+                              <m:oMathParaPr>
+                                <m:jc m:val="centerGroup"/>
+                              </m:oMathParaPr>
+                              <m:oMath xmlns:m="http://schemas.openxmlformats.org/officeDocument/2006/math">
+                                <m:r>
+                                  <a:rPr lang="en-US" b="0" i="1" smtClean="0">
+                                    <a:latin typeface="Cambria Math" panose="02040503050406030204" pitchFamily="18" charset="0"/>
+                                  </a:rPr>
+                                  <m:t>𝑚</m:t>
+                                </m:r>
+                                <m:r>
+                                  <a:rPr lang="en-US" b="0" i="1" smtClean="0">
+                                    <a:latin typeface="Cambria Math" panose="02040503050406030204" pitchFamily="18" charset="0"/>
+                                  </a:rPr>
+                                  <m:t>′</m:t>
+                                </m:r>
+                              </m:oMath>
+                            </m:oMathPara>
+                          </a14:m>
+                          <a:endParaRPr lang="en-US" dirty="0"/>
+                        </a:p>
+                      </a:txBody>
+                      <a:tcPr/>
+                    </a:tc>
+                    <a:extLst>
+                      <a:ext uri="{0D108BD9-81ED-4DB2-BD59-A6C34878D82A}">
+                        <a16:rowId xmlns:a16="http://schemas.microsoft.com/office/drawing/2014/main" val="2014279250"/>
+                      </a:ext>
+                    </a:extLst>
+                  </a:tr>
+                  <a:tr h="370840">
+                    <a:tc>
+                      <a:txBody>
+                        <a:bodyPr/>
+                        <a:lstStyle/>
+                        <a:p>
+                          <a:pPr marL="0" marR="0" lvl="0" indent="0" algn="l" defTabSz="914400" rtl="0" eaLnBrk="1" fontAlgn="auto" latinLnBrk="0" hangingPunct="1">
+                            <a:lnSpc>
+                              <a:spcPct val="100000"/>
+                            </a:lnSpc>
+                            <a:spcBef>
+                              <a:spcPts val="0"/>
+                            </a:spcBef>
+                            <a:spcAft>
+                              <a:spcPts val="0"/>
+                            </a:spcAft>
+                            <a:buClrTx/>
+                            <a:buSzTx/>
+                            <a:buFontTx/>
+                            <a:buNone/>
+                            <a:tabLst/>
+                            <a:defRPr/>
+                          </a:pPr>
+                          <a:r>
+                            <a:rPr lang="en-US" dirty="0">
+                              <a:latin typeface="Times New Roman" panose="02020603050405020304" pitchFamily="18" charset="0"/>
+                              <a:cs typeface="Times New Roman" panose="02020603050405020304" pitchFamily="18" charset="0"/>
+                            </a:rPr>
+                            <a:t>Public modulus</a:t>
+                          </a:r>
+                        </a:p>
+                      </a:txBody>
+                      <a:tcPr/>
+                    </a:tc>
+                    <a:tc>
+                      <a:txBody>
+                        <a:bodyPr/>
+                        <a:lstStyle/>
+                        <a:p>
+                          <a:pPr marL="0" marR="0" lvl="0" indent="0" algn="ctr" defTabSz="914400" rtl="0" eaLnBrk="1" fontAlgn="auto" latinLnBrk="0" hangingPunct="1">
+                            <a:lnSpc>
+                              <a:spcPct val="100000"/>
+                            </a:lnSpc>
+                            <a:spcBef>
+                              <a:spcPts val="0"/>
+                            </a:spcBef>
+                            <a:spcAft>
+                              <a:spcPts val="0"/>
+                            </a:spcAft>
+                            <a:buClrTx/>
+                            <a:buSzTx/>
+                            <a:buFontTx/>
+                            <a:buNone/>
+                            <a:tabLst/>
+                            <a:defRPr/>
+                          </a:pPr>
+                          <a14:m>
+                            <m:oMathPara xmlns:m="http://schemas.openxmlformats.org/officeDocument/2006/math">
+                              <m:oMathParaPr>
+                                <m:jc m:val="centerGroup"/>
+                              </m:oMathParaPr>
+                              <m:oMath xmlns:m="http://schemas.openxmlformats.org/officeDocument/2006/math">
+                                <m:r>
+                                  <a:rPr lang="en-US" b="0" i="1" smtClean="0">
+                                    <a:latin typeface="Cambria Math" panose="02040503050406030204" pitchFamily="18" charset="0"/>
+                                  </a:rPr>
+                                  <m:t>𝑚</m:t>
+                                </m:r>
+                                <m:r>
+                                  <a:rPr lang="en-US" b="0" i="1" smtClean="0">
+                                    <a:latin typeface="Cambria Math" panose="02040503050406030204" pitchFamily="18" charset="0"/>
+                                  </a:rPr>
+                                  <m:t>=</m:t>
+                                </m:r>
+                                <m:sSup>
+                                  <m:sSupPr>
+                                    <m:ctrlPr>
+                                      <a:rPr lang="en-US" b="0" i="1" smtClean="0">
+                                        <a:latin typeface="Cambria Math" panose="02040503050406030204" pitchFamily="18" charset="0"/>
+                                      </a:rPr>
+                                    </m:ctrlPr>
+                                  </m:sSupPr>
+                                  <m:e>
+                                    <m:r>
+                                      <a:rPr lang="en-US" b="0" i="1" smtClean="0">
+                                        <a:latin typeface="Cambria Math" panose="02040503050406030204" pitchFamily="18" charset="0"/>
+                                      </a:rPr>
+                                      <m:t>𝑚</m:t>
+                                    </m:r>
+                                    <m:r>
+                                      <a:rPr lang="en-US" b="0" i="1" smtClean="0">
+                                        <a:latin typeface="Cambria Math" panose="02040503050406030204" pitchFamily="18" charset="0"/>
+                                      </a:rPr>
+                                      <m:t>′</m:t>
+                                    </m:r>
+                                  </m:e>
+                                  <m:sup>
+                                    <m:r>
+                                      <m:rPr>
+                                        <m:sty m:val="p"/>
+                                      </m:rPr>
+                                      <a:rPr lang="el-GR" b="0" i="1" smtClean="0">
+                                        <a:latin typeface="Cambria Math" panose="02040503050406030204" pitchFamily="18" charset="0"/>
+                                      </a:rPr>
+                                      <m:t>λ</m:t>
+                                    </m:r>
+                                  </m:sup>
+                                </m:sSup>
+                              </m:oMath>
+                            </m:oMathPara>
+                          </a14:m>
+                          <a:endParaRPr lang="en-US" dirty="0"/>
+                        </a:p>
+                      </a:txBody>
+                      <a:tcPr/>
+                    </a:tc>
+                    <a:extLst>
+                      <a:ext uri="{0D108BD9-81ED-4DB2-BD59-A6C34878D82A}">
+                        <a16:rowId xmlns:a16="http://schemas.microsoft.com/office/drawing/2014/main" val="2580164137"/>
+                      </a:ext>
+                    </a:extLst>
+                  </a:tr>
+                  <a:tr h="370840">
+                    <a:tc>
+                      <a:txBody>
+                        <a:bodyPr/>
+                        <a:lstStyle/>
+                        <a:p>
+                          <a:pPr marL="0" marR="0" lvl="0" indent="0" algn="l" defTabSz="914400" rtl="0" eaLnBrk="1" fontAlgn="auto" latinLnBrk="0" hangingPunct="1">
+                            <a:lnSpc>
+                              <a:spcPct val="100000"/>
+                            </a:lnSpc>
+                            <a:spcBef>
+                              <a:spcPts val="0"/>
+                            </a:spcBef>
+                            <a:spcAft>
+                              <a:spcPts val="0"/>
+                            </a:spcAft>
+                            <a:buClrTx/>
+                            <a:buSzTx/>
+                            <a:buFontTx/>
+                            <a:buNone/>
+                            <a:tabLst/>
+                            <a:defRPr/>
+                          </a:pPr>
+                          <a:r>
+                            <a:rPr lang="en-US" dirty="0">
+                              <a:latin typeface="Times New Roman" panose="02020603050405020304" pitchFamily="18" charset="0"/>
+                              <a:cs typeface="Times New Roman" panose="02020603050405020304" pitchFamily="18" charset="0"/>
+                            </a:rPr>
+                            <a:t>Ciphertext dimension</a:t>
+                          </a:r>
+                        </a:p>
+                      </a:txBody>
+                      <a:tcPr/>
+                    </a:tc>
+                    <a:tc>
+                      <a:txBody>
+                        <a:bodyPr/>
+                        <a:lstStyle/>
+                        <a:p>
+                          <a:pPr marL="0" marR="0" lvl="0" indent="0" algn="ctr" defTabSz="914400" rtl="0" eaLnBrk="1" fontAlgn="auto" latinLnBrk="0" hangingPunct="1">
+                            <a:lnSpc>
+                              <a:spcPct val="100000"/>
+                            </a:lnSpc>
+                            <a:spcBef>
+                              <a:spcPts val="0"/>
+                            </a:spcBef>
+                            <a:spcAft>
+                              <a:spcPts val="0"/>
+                            </a:spcAft>
+                            <a:buClrTx/>
+                            <a:buSzTx/>
+                            <a:buFontTx/>
+                            <a:buNone/>
+                            <a:tabLst/>
+                            <a:defRPr/>
+                          </a:pPr>
+                          <a14:m>
+                            <m:oMathPara xmlns:m="http://schemas.openxmlformats.org/officeDocument/2006/math">
+                              <m:oMathParaPr>
+                                <m:jc m:val="centerGroup"/>
+                              </m:oMathParaPr>
+                              <m:oMath xmlns:m="http://schemas.openxmlformats.org/officeDocument/2006/math">
+                                <m:r>
+                                  <a:rPr lang="en-US" b="0" i="1" smtClean="0">
+                                    <a:latin typeface="Cambria Math" panose="02040503050406030204" pitchFamily="18" charset="0"/>
+                                  </a:rPr>
+                                  <m:t>𝑑</m:t>
+                                </m:r>
+                              </m:oMath>
+                            </m:oMathPara>
+                          </a14:m>
+                          <a:endParaRPr lang="en-US" dirty="0"/>
+                        </a:p>
+                      </a:txBody>
+                      <a:tcPr/>
+                    </a:tc>
+                    <a:extLst>
+                      <a:ext uri="{0D108BD9-81ED-4DB2-BD59-A6C34878D82A}">
+                        <a16:rowId xmlns:a16="http://schemas.microsoft.com/office/drawing/2014/main" val="1495231358"/>
+                      </a:ext>
+                    </a:extLst>
+                  </a:tr>
+                  <a:tr h="370840">
+                    <a:tc>
+                      <a:txBody>
+                        <a:bodyPr/>
+                        <a:lstStyle/>
+                        <a:p>
+                          <a:r>
+                            <a:rPr lang="en-US" dirty="0">
+                              <a:latin typeface="Times New Roman" panose="02020603050405020304" pitchFamily="18" charset="0"/>
+                              <a:cs typeface="Times New Roman" panose="02020603050405020304" pitchFamily="18" charset="0"/>
+                            </a:rPr>
+                            <a:t>Secret element</a:t>
+                          </a:r>
+                        </a:p>
+                      </a:txBody>
+                      <a:tcPr/>
+                    </a:tc>
+                    <a:tc>
+                      <a:txBody>
+                        <a:bodyPr/>
+                        <a:lstStyle/>
+                        <a:p>
+                          <a:pPr algn="ctr"/>
+                          <a14:m>
+                            <m:oMathPara xmlns:m="http://schemas.openxmlformats.org/officeDocument/2006/math">
+                              <m:oMathParaPr>
+                                <m:jc m:val="centerGroup"/>
+                              </m:oMathParaPr>
+                              <m:oMath xmlns:m="http://schemas.openxmlformats.org/officeDocument/2006/math">
+                                <m:r>
+                                  <a:rPr lang="en-US" b="0" i="1" smtClean="0">
+                                    <a:latin typeface="Cambria Math" panose="02040503050406030204" pitchFamily="18" charset="0"/>
+                                  </a:rPr>
+                                  <m:t>𝑟</m:t>
+                                </m:r>
+                              </m:oMath>
+                            </m:oMathPara>
+                          </a14:m>
+                          <a:endParaRPr lang="en-US" dirty="0"/>
+                        </a:p>
+                      </a:txBody>
+                      <a:tcPr/>
+                    </a:tc>
+                    <a:extLst>
+                      <a:ext uri="{0D108BD9-81ED-4DB2-BD59-A6C34878D82A}">
+                        <a16:rowId xmlns:a16="http://schemas.microsoft.com/office/drawing/2014/main" val="1717777124"/>
+                      </a:ext>
+                    </a:extLst>
+                  </a:tr>
+                </a:tbl>
+              </a:graphicData>
+            </a:graphic>
+          </p:graphicFrame>
+        </mc:Choice>
+        <mc:Fallback>
+          <p:graphicFrame>
+            <p:nvGraphicFramePr>
+              <p:cNvPr id="3" name="Table 2">
+                <a:extLst>
+                  <a:ext uri="{FF2B5EF4-FFF2-40B4-BE49-F238E27FC236}">
+                    <a16:creationId xmlns:a16="http://schemas.microsoft.com/office/drawing/2014/main" id="{0EC969B7-E9FC-BBCC-91C2-B54BF540FC1D}"/>
+                  </a:ext>
+                </a:extLst>
+              </p:cNvPr>
+              <p:cNvGraphicFramePr>
+                <a:graphicFrameLocks noGrp="1"/>
+              </p:cNvGraphicFramePr>
+              <p:nvPr>
+                <p:extLst>
+                  <p:ext uri="{D42A27DB-BD31-4B8C-83A1-F6EECF244321}">
+                    <p14:modId xmlns:p14="http://schemas.microsoft.com/office/powerpoint/2010/main" val="1416986296"/>
+                  </p:ext>
+                </p:extLst>
+              </p:nvPr>
+            </p:nvGraphicFramePr>
+            <p:xfrm>
+              <a:off x="2032000" y="2316480"/>
+              <a:ext cx="8128000" cy="2232787"/>
+            </p:xfrm>
+            <a:graphic>
+              <a:graphicData uri="http://schemas.openxmlformats.org/drawingml/2006/table">
+                <a:tbl>
+                  <a:tblPr firstRow="1" bandRow="1">
+                    <a:tableStyleId>{5C22544A-7EE6-4342-B048-85BDC9FD1C3A}</a:tableStyleId>
+                  </a:tblPr>
+                  <a:tblGrid>
+                    <a:gridCol w="4064000">
+                      <a:extLst>
+                        <a:ext uri="{9D8B030D-6E8A-4147-A177-3AD203B41FA5}">
+                          <a16:colId xmlns:a16="http://schemas.microsoft.com/office/drawing/2014/main" val="1446266223"/>
+                        </a:ext>
+                      </a:extLst>
+                    </a:gridCol>
+                    <a:gridCol w="4064000">
+                      <a:extLst>
+                        <a:ext uri="{9D8B030D-6E8A-4147-A177-3AD203B41FA5}">
+                          <a16:colId xmlns:a16="http://schemas.microsoft.com/office/drawing/2014/main" val="1644755617"/>
+                        </a:ext>
+                      </a:extLst>
+                    </a:gridCol>
+                  </a:tblGrid>
+                  <a:tr h="370840">
+                    <a:tc>
+                      <a:txBody>
+                        <a:bodyPr/>
+                        <a:lstStyle/>
+                        <a:p>
+                          <a:r>
+                            <a:rPr lang="en-US" dirty="0">
+                              <a:effectLst>
+                                <a:outerShdw blurRad="38100" dist="38100" dir="2700000" algn="tl">
+                                  <a:srgbClr val="000000">
+                                    <a:alpha val="43137"/>
+                                  </a:srgbClr>
+                                </a:outerShdw>
+                              </a:effectLst>
+                              <a:latin typeface="Times New Roman" panose="02020603050405020304" pitchFamily="18" charset="0"/>
+                              <a:cs typeface="Times New Roman" panose="02020603050405020304" pitchFamily="18" charset="0"/>
+                            </a:rPr>
+                            <a:t>Security Parameter</a:t>
+                          </a:r>
+                        </a:p>
+                      </a:txBody>
+                      <a:tcPr/>
+                    </a:tc>
+                    <a:tc>
+                      <a:txBody>
+                        <a:bodyPr/>
+                        <a:lstStyle/>
+                        <a:p>
+                          <a:r>
+                            <a:rPr lang="en-US" dirty="0">
+                              <a:effectLst>
+                                <a:outerShdw blurRad="38100" dist="38100" dir="2700000" algn="tl">
+                                  <a:srgbClr val="000000">
+                                    <a:alpha val="43137"/>
+                                  </a:srgbClr>
+                                </a:outerShdw>
+                              </a:effectLst>
+                              <a:latin typeface="Times New Roman" panose="02020603050405020304" pitchFamily="18" charset="0"/>
+                              <a:cs typeface="Times New Roman" panose="02020603050405020304" pitchFamily="18" charset="0"/>
+                            </a:rPr>
+                            <a:t>Symbol</a:t>
+                          </a:r>
+                        </a:p>
+                      </a:txBody>
+                      <a:tcPr/>
+                    </a:tc>
+                    <a:extLst>
+                      <a:ext uri="{0D108BD9-81ED-4DB2-BD59-A6C34878D82A}">
+                        <a16:rowId xmlns:a16="http://schemas.microsoft.com/office/drawing/2014/main" val="1127183632"/>
+                      </a:ext>
+                    </a:extLst>
+                  </a:tr>
+                  <a:tr h="370840">
+                    <a:tc>
+                      <a:txBody>
+                        <a:bodyPr/>
+                        <a:lstStyle/>
+                        <a:p>
+                          <a:pPr marL="0" marR="0" lvl="0" indent="0" algn="l" defTabSz="914400" rtl="0" eaLnBrk="1" fontAlgn="auto" latinLnBrk="0" hangingPunct="1">
+                            <a:lnSpc>
+                              <a:spcPct val="100000"/>
+                            </a:lnSpc>
+                            <a:spcBef>
+                              <a:spcPts val="0"/>
+                            </a:spcBef>
+                            <a:spcAft>
+                              <a:spcPts val="0"/>
+                            </a:spcAft>
+                            <a:buClrTx/>
+                            <a:buSzTx/>
+                            <a:buFontTx/>
+                            <a:buNone/>
+                            <a:tabLst/>
+                            <a:defRPr/>
+                          </a:pPr>
+                          <a:r>
+                            <a:rPr lang="en-US" dirty="0">
+                              <a:latin typeface="Times New Roman" panose="02020603050405020304" pitchFamily="18" charset="0"/>
+                              <a:cs typeface="Times New Roman" panose="02020603050405020304" pitchFamily="18" charset="0"/>
+                            </a:rPr>
+                            <a:t>Security parameter</a:t>
+                          </a:r>
+                        </a:p>
+                      </a:txBody>
+                      <a:tcPr/>
+                    </a:tc>
+                    <a:tc>
+                      <a:txBody>
+                        <a:bodyPr/>
+                        <a:lstStyle/>
+                        <a:p>
+                          <a:endParaRPr lang="en-US"/>
+                        </a:p>
+                      </a:txBody>
+                      <a:tcPr>
+                        <a:blipFill>
+                          <a:blip r:embed="rId2"/>
+                          <a:stretch>
+                            <a:fillRect l="-100150" t="-109836" r="-600" b="-424590"/>
+                          </a:stretch>
+                        </a:blipFill>
+                      </a:tcPr>
+                    </a:tc>
+                    <a:extLst>
+                      <a:ext uri="{0D108BD9-81ED-4DB2-BD59-A6C34878D82A}">
+                        <a16:rowId xmlns:a16="http://schemas.microsoft.com/office/drawing/2014/main" val="2291599393"/>
+                      </a:ext>
+                    </a:extLst>
+                  </a:tr>
+                  <a:tr h="370840">
+                    <a:tc>
+                      <a:txBody>
+                        <a:bodyPr/>
+                        <a:lstStyle/>
+                        <a:p>
+                          <a:pPr marL="0" marR="0" lvl="0" indent="0" algn="l" defTabSz="914400" rtl="0" eaLnBrk="1" fontAlgn="auto" latinLnBrk="0" hangingPunct="1">
+                            <a:lnSpc>
+                              <a:spcPct val="100000"/>
+                            </a:lnSpc>
+                            <a:spcBef>
+                              <a:spcPts val="0"/>
+                            </a:spcBef>
+                            <a:spcAft>
+                              <a:spcPts val="0"/>
+                            </a:spcAft>
+                            <a:buClrTx/>
+                            <a:buSzTx/>
+                            <a:buFontTx/>
+                            <a:buNone/>
+                            <a:tabLst/>
+                            <a:defRPr/>
+                          </a:pPr>
+                          <a:r>
+                            <a:rPr lang="en-US" dirty="0">
+                              <a:latin typeface="Times New Roman" panose="02020603050405020304" pitchFamily="18" charset="0"/>
+                              <a:cs typeface="Times New Roman" panose="02020603050405020304" pitchFamily="18" charset="0"/>
+                            </a:rPr>
+                            <a:t>Private modulus</a:t>
+                          </a:r>
+                        </a:p>
+                      </a:txBody>
+                      <a:tcPr/>
+                    </a:tc>
+                    <a:tc>
+                      <a:txBody>
+                        <a:bodyPr/>
+                        <a:lstStyle/>
+                        <a:p>
+                          <a:endParaRPr lang="en-US"/>
+                        </a:p>
+                      </a:txBody>
+                      <a:tcPr>
+                        <a:blipFill>
+                          <a:blip r:embed="rId2"/>
+                          <a:stretch>
+                            <a:fillRect l="-100150" t="-209836" r="-600" b="-324590"/>
+                          </a:stretch>
+                        </a:blipFill>
+                      </a:tcPr>
+                    </a:tc>
+                    <a:extLst>
+                      <a:ext uri="{0D108BD9-81ED-4DB2-BD59-A6C34878D82A}">
+                        <a16:rowId xmlns:a16="http://schemas.microsoft.com/office/drawing/2014/main" val="2014279250"/>
+                      </a:ext>
+                    </a:extLst>
+                  </a:tr>
+                  <a:tr h="378587">
+                    <a:tc>
+                      <a:txBody>
+                        <a:bodyPr/>
+                        <a:lstStyle/>
+                        <a:p>
+                          <a:pPr marL="0" marR="0" lvl="0" indent="0" algn="l" defTabSz="914400" rtl="0" eaLnBrk="1" fontAlgn="auto" latinLnBrk="0" hangingPunct="1">
+                            <a:lnSpc>
+                              <a:spcPct val="100000"/>
+                            </a:lnSpc>
+                            <a:spcBef>
+                              <a:spcPts val="0"/>
+                            </a:spcBef>
+                            <a:spcAft>
+                              <a:spcPts val="0"/>
+                            </a:spcAft>
+                            <a:buClrTx/>
+                            <a:buSzTx/>
+                            <a:buFontTx/>
+                            <a:buNone/>
+                            <a:tabLst/>
+                            <a:defRPr/>
+                          </a:pPr>
+                          <a:r>
+                            <a:rPr lang="en-US" dirty="0">
+                              <a:latin typeface="Times New Roman" panose="02020603050405020304" pitchFamily="18" charset="0"/>
+                              <a:cs typeface="Times New Roman" panose="02020603050405020304" pitchFamily="18" charset="0"/>
+                            </a:rPr>
+                            <a:t>Public modulus</a:t>
+                          </a:r>
+                        </a:p>
+                      </a:txBody>
+                      <a:tcPr/>
+                    </a:tc>
+                    <a:tc>
+                      <a:txBody>
+                        <a:bodyPr/>
+                        <a:lstStyle/>
+                        <a:p>
+                          <a:endParaRPr lang="en-US"/>
+                        </a:p>
+                      </a:txBody>
+                      <a:tcPr>
+                        <a:blipFill>
+                          <a:blip r:embed="rId2"/>
+                          <a:stretch>
+                            <a:fillRect l="-100150" t="-304839" r="-600" b="-219355"/>
+                          </a:stretch>
+                        </a:blipFill>
+                      </a:tcPr>
+                    </a:tc>
+                    <a:extLst>
+                      <a:ext uri="{0D108BD9-81ED-4DB2-BD59-A6C34878D82A}">
+                        <a16:rowId xmlns:a16="http://schemas.microsoft.com/office/drawing/2014/main" val="2580164137"/>
+                      </a:ext>
+                    </a:extLst>
+                  </a:tr>
+                  <a:tr h="370840">
+                    <a:tc>
+                      <a:txBody>
+                        <a:bodyPr/>
+                        <a:lstStyle/>
+                        <a:p>
+                          <a:pPr marL="0" marR="0" lvl="0" indent="0" algn="l" defTabSz="914400" rtl="0" eaLnBrk="1" fontAlgn="auto" latinLnBrk="0" hangingPunct="1">
+                            <a:lnSpc>
+                              <a:spcPct val="100000"/>
+                            </a:lnSpc>
+                            <a:spcBef>
+                              <a:spcPts val="0"/>
+                            </a:spcBef>
+                            <a:spcAft>
+                              <a:spcPts val="0"/>
+                            </a:spcAft>
+                            <a:buClrTx/>
+                            <a:buSzTx/>
+                            <a:buFontTx/>
+                            <a:buNone/>
+                            <a:tabLst/>
+                            <a:defRPr/>
+                          </a:pPr>
+                          <a:r>
+                            <a:rPr lang="en-US" dirty="0">
+                              <a:latin typeface="Times New Roman" panose="02020603050405020304" pitchFamily="18" charset="0"/>
+                              <a:cs typeface="Times New Roman" panose="02020603050405020304" pitchFamily="18" charset="0"/>
+                            </a:rPr>
+                            <a:t>Ciphertext dimension</a:t>
+                          </a:r>
+                        </a:p>
+                      </a:txBody>
+                      <a:tcPr/>
+                    </a:tc>
+                    <a:tc>
+                      <a:txBody>
+                        <a:bodyPr/>
+                        <a:lstStyle/>
+                        <a:p>
+                          <a:endParaRPr lang="en-US"/>
+                        </a:p>
+                      </a:txBody>
+                      <a:tcPr>
+                        <a:blipFill>
+                          <a:blip r:embed="rId2"/>
+                          <a:stretch>
+                            <a:fillRect l="-100150" t="-411475" r="-600" b="-122951"/>
+                          </a:stretch>
+                        </a:blipFill>
+                      </a:tcPr>
+                    </a:tc>
+                    <a:extLst>
+                      <a:ext uri="{0D108BD9-81ED-4DB2-BD59-A6C34878D82A}">
+                        <a16:rowId xmlns:a16="http://schemas.microsoft.com/office/drawing/2014/main" val="1495231358"/>
+                      </a:ext>
+                    </a:extLst>
+                  </a:tr>
+                  <a:tr h="370840">
+                    <a:tc>
+                      <a:txBody>
+                        <a:bodyPr/>
+                        <a:lstStyle/>
+                        <a:p>
+                          <a:r>
+                            <a:rPr lang="en-US" dirty="0">
+                              <a:latin typeface="Times New Roman" panose="02020603050405020304" pitchFamily="18" charset="0"/>
+                              <a:cs typeface="Times New Roman" panose="02020603050405020304" pitchFamily="18" charset="0"/>
+                            </a:rPr>
+                            <a:t>Secret element</a:t>
+                          </a:r>
+                        </a:p>
+                      </a:txBody>
+                      <a:tcPr/>
+                    </a:tc>
+                    <a:tc>
+                      <a:txBody>
+                        <a:bodyPr/>
+                        <a:lstStyle/>
+                        <a:p>
+                          <a:endParaRPr lang="en-US"/>
+                        </a:p>
+                      </a:txBody>
+                      <a:tcPr>
+                        <a:blipFill>
+                          <a:blip r:embed="rId2"/>
+                          <a:stretch>
+                            <a:fillRect l="-100150" t="-511475" r="-600" b="-22951"/>
+                          </a:stretch>
+                        </a:blipFill>
+                      </a:tcPr>
+                    </a:tc>
+                    <a:extLst>
+                      <a:ext uri="{0D108BD9-81ED-4DB2-BD59-A6C34878D82A}">
+                        <a16:rowId xmlns:a16="http://schemas.microsoft.com/office/drawing/2014/main" val="1717777124"/>
+                      </a:ext>
+                    </a:extLst>
+                  </a:tr>
+                </a:tbl>
+              </a:graphicData>
+            </a:graphic>
+          </p:graphicFrame>
+        </mc:Fallback>
+      </mc:AlternateContent>
+    </p:spTree>
+    <p:extLst>
+      <p:ext uri="{BB962C8B-B14F-4D97-AF65-F5344CB8AC3E}">
+        <p14:creationId xmlns:p14="http://schemas.microsoft.com/office/powerpoint/2010/main" val="640817993"/>
+      </p:ext>
+    </p:extLst>
+  </p:cSld>
+  <p:clrMapOvr>
+    <a:masterClrMapping/>
+  </p:clrMapOvr>
+</p:sld>
+</file>
+
+<file path=ppt/slides/slide18.xml><?xml version="1.0" encoding="utf-8"?>
+<p:sld xmlns:a="http://schemas.openxmlformats.org/drawingml/2006/main" xmlns:r="http://schemas.openxmlformats.org/officeDocument/2006/relationships" xmlns:p="http://schemas.openxmlformats.org/presentationml/2006/main">
+  <p:cSld>
+    <p:spTree>
+      <p:nvGrpSpPr>
+        <p:cNvPr id="1" name="">
+          <a:extLst>
+            <a:ext uri="{FF2B5EF4-FFF2-40B4-BE49-F238E27FC236}">
               <a16:creationId xmlns:a16="http://schemas.microsoft.com/office/drawing/2014/main" id="{54796AC3-B6BF-34D6-2A51-F2496D75AD1F}"/>
             </a:ext>
           </a:extLst>
@@ -13723,7 +14569,7 @@
                   <a:schemeClr val="tx1"/>
                 </a:solidFill>
               </a:rPr>
-              <a:t>11/23/2025</a:t>
+              <a:t>11/24/2025</a:t>
             </a:fld>
             <a:endParaRPr lang="en-US" sz="1600" dirty="0">
               <a:solidFill>
@@ -13792,7 +14638,7 @@
                   <a:schemeClr val="tx1"/>
                 </a:solidFill>
               </a:rPr>
-              <a:t>17</a:t>
+              <a:t>18</a:t>
             </a:fld>
             <a:endParaRPr lang="en-US" sz="1400" dirty="0">
               <a:solidFill>
@@ -13802,8 +14648,8 @@
           </a:p>
         </p:txBody>
       </p:sp>
-      <mc:AlternateContent xmlns:mc="http://schemas.openxmlformats.org/markup-compatibility/2006">
-        <mc:Choice xmlns:a14="http://schemas.microsoft.com/office/drawing/2010/main" Requires="a14">
+      <mc:AlternateContent xmlns:mc="http://schemas.openxmlformats.org/markup-compatibility/2006" xmlns:a14="http://schemas.microsoft.com/office/drawing/2010/main">
+        <mc:Choice Requires="a14">
           <p:graphicFrame>
             <p:nvGraphicFramePr>
               <p:cNvPr id="3" name="Table 2">
@@ -13943,6 +14789,7 @@
                         <a:bodyPr/>
                         <a:lstStyle/>
                         <a:p>
+                          <a:pPr/>
                           <a14:m>
                             <m:oMathPara xmlns:m="http://schemas.openxmlformats.org/officeDocument/2006/math">
                               <m:oMathParaPr>
@@ -15927,7 +16774,7 @@
             </a:graphic>
           </p:graphicFrame>
         </mc:Choice>
-        <mc:Fallback>
+        <mc:Fallback xmlns="">
           <p:graphicFrame>
             <p:nvGraphicFramePr>
               <p:cNvPr id="3" name="Table 2">
@@ -16455,7 +17302,7 @@
 </p:sld>
 </file>
 
-<file path=ppt/slides/slide18.xml><?xml version="1.0" encoding="utf-8"?>
+<file path=ppt/slides/slide19.xml><?xml version="1.0" encoding="utf-8"?>
 <p:sld xmlns:a="http://schemas.openxmlformats.org/drawingml/2006/main" xmlns:r="http://schemas.openxmlformats.org/officeDocument/2006/relationships" xmlns:p="http://schemas.openxmlformats.org/presentationml/2006/main">
   <p:cSld>
     <p:spTree>
@@ -16543,7 +17390,7 @@
                   <a:schemeClr val="tx1"/>
                 </a:solidFill>
               </a:rPr>
-              <a:t>11/23/2025</a:t>
+              <a:t>11/24/2025</a:t>
             </a:fld>
             <a:endParaRPr lang="en-US" sz="1600" dirty="0">
               <a:solidFill>
@@ -16612,7 +17459,7 @@
                   <a:schemeClr val="tx1"/>
                 </a:solidFill>
               </a:rPr>
-              <a:t>18</a:t>
+              <a:t>19</a:t>
             </a:fld>
             <a:endParaRPr lang="en-US" sz="1400" dirty="0">
               <a:solidFill>
@@ -17730,7 +18577,322 @@
 </p:sld>
 </file>
 
-<file path=ppt/slides/slide19.xml><?xml version="1.0" encoding="utf-8"?>
+<file path=ppt/slides/slide2.xml><?xml version="1.0" encoding="utf-8"?>
+<p:sld xmlns:a="http://schemas.openxmlformats.org/drawingml/2006/main" xmlns:r="http://schemas.openxmlformats.org/officeDocument/2006/relationships" xmlns:p="http://schemas.openxmlformats.org/presentationml/2006/main">
+  <p:cSld>
+    <p:spTree>
+      <p:nvGrpSpPr>
+        <p:cNvPr id="1" name=""/>
+        <p:cNvGrpSpPr/>
+        <p:nvPr/>
+      </p:nvGrpSpPr>
+      <p:grpSpPr>
+        <a:xfrm>
+          <a:off x="0" y="0"/>
+          <a:ext cx="0" cy="0"/>
+          <a:chOff x="0" y="0"/>
+          <a:chExt cx="0" cy="0"/>
+        </a:xfrm>
+      </p:grpSpPr>
+      <p:sp>
+        <p:nvSpPr>
+          <p:cNvPr id="2" name="Title 1">
+            <a:extLst>
+              <a:ext uri="{FF2B5EF4-FFF2-40B4-BE49-F238E27FC236}">
+                <a16:creationId xmlns:a16="http://schemas.microsoft.com/office/drawing/2014/main" id="{9908435A-E379-97CD-B488-C7600E775D70}"/>
+              </a:ext>
+            </a:extLst>
+          </p:cNvPr>
+          <p:cNvSpPr>
+            <a:spLocks noGrp="1"/>
+          </p:cNvSpPr>
+          <p:nvPr>
+            <p:ph type="title"/>
+          </p:nvPr>
+        </p:nvSpPr>
+        <p:spPr/>
+        <p:txBody>
+          <a:bodyPr/>
+          <a:lstStyle/>
+          <a:p>
+            <a:r>
+              <a:rPr lang="en-US" b="1" dirty="0">
+                <a:effectLst>
+                  <a:outerShdw blurRad="38100" dist="38100" dir="2700000" algn="tl">
+                    <a:srgbClr val="000000">
+                      <a:alpha val="43137"/>
+                    </a:srgbClr>
+                  </a:outerShdw>
+                </a:effectLst>
+                <a:latin typeface="Times New Roman" panose="02020603050405020304" pitchFamily="18" charset="0"/>
+                <a:cs typeface="Times New Roman" panose="02020603050405020304" pitchFamily="18" charset="0"/>
+              </a:rPr>
+              <a:t>Content</a:t>
+            </a:r>
+          </a:p>
+        </p:txBody>
+      </p:sp>
+      <p:sp>
+        <p:nvSpPr>
+          <p:cNvPr id="3" name="Content Placeholder 2">
+            <a:extLst>
+              <a:ext uri="{FF2B5EF4-FFF2-40B4-BE49-F238E27FC236}">
+                <a16:creationId xmlns:a16="http://schemas.microsoft.com/office/drawing/2014/main" id="{0EE2B071-766A-4F69-8B1F-256BC34580F4}"/>
+              </a:ext>
+            </a:extLst>
+          </p:cNvPr>
+          <p:cNvSpPr>
+            <a:spLocks noGrp="1"/>
+          </p:cNvSpPr>
+          <p:nvPr>
+            <p:ph idx="1"/>
+          </p:nvPr>
+        </p:nvSpPr>
+        <p:spPr/>
+        <p:txBody>
+          <a:bodyPr>
+            <a:normAutofit lnSpcReduction="10000"/>
+          </a:bodyPr>
+          <a:lstStyle/>
+          <a:p>
+            <a:pPr marL="514350" indent="-514350">
+              <a:buFont typeface="+mj-lt"/>
+              <a:buAutoNum type="arabicPeriod"/>
+            </a:pPr>
+            <a:r>
+              <a:rPr lang="en-US" dirty="0">
+                <a:latin typeface="Times New Roman" panose="02020603050405020304" pitchFamily="18" charset="0"/>
+                <a:cs typeface="Times New Roman" panose="02020603050405020304" pitchFamily="18" charset="0"/>
+              </a:rPr>
+              <a:t>Homomorphic encryption (HE): overview</a:t>
+            </a:r>
+          </a:p>
+          <a:p>
+            <a:pPr marL="514350" indent="-514350">
+              <a:buFont typeface="+mj-lt"/>
+              <a:buAutoNum type="arabicPeriod"/>
+            </a:pPr>
+            <a:r>
+              <a:rPr lang="en-US" dirty="0">
+                <a:latin typeface="Times New Roman" panose="02020603050405020304" pitchFamily="18" charset="0"/>
+                <a:cs typeface="Times New Roman" panose="02020603050405020304" pitchFamily="18" charset="0"/>
+              </a:rPr>
+              <a:t>Federated Learning (FL): overview and setup</a:t>
+            </a:r>
+          </a:p>
+          <a:p>
+            <a:pPr marL="514350" indent="-514350">
+              <a:buFont typeface="+mj-lt"/>
+              <a:buAutoNum type="arabicPeriod"/>
+            </a:pPr>
+            <a:r>
+              <a:rPr lang="en-US" dirty="0">
+                <a:latin typeface="Times New Roman" panose="02020603050405020304" pitchFamily="18" charset="0"/>
+                <a:cs typeface="Times New Roman" panose="02020603050405020304" pitchFamily="18" charset="0"/>
+              </a:rPr>
+              <a:t>Encrypted Model Aggregation Workflow</a:t>
+            </a:r>
+          </a:p>
+          <a:p>
+            <a:pPr marL="514350" indent="-514350">
+              <a:buFont typeface="+mj-lt"/>
+              <a:buAutoNum type="arabicPeriod"/>
+            </a:pPr>
+            <a:r>
+              <a:rPr lang="en-US" dirty="0">
+                <a:latin typeface="Times New Roman" panose="02020603050405020304" pitchFamily="18" charset="0"/>
+                <a:cs typeface="Times New Roman" panose="02020603050405020304" pitchFamily="18" charset="0"/>
+              </a:rPr>
+              <a:t>HE importance in FL</a:t>
+            </a:r>
+          </a:p>
+          <a:p>
+            <a:pPr marL="514350" indent="-514350">
+              <a:buFont typeface="+mj-lt"/>
+              <a:buAutoNum type="arabicPeriod"/>
+            </a:pPr>
+            <a:r>
+              <a:rPr lang="en-US" dirty="0">
+                <a:latin typeface="Times New Roman" panose="02020603050405020304" pitchFamily="18" charset="0"/>
+                <a:cs typeface="Times New Roman" panose="02020603050405020304" pitchFamily="18" charset="0"/>
+              </a:rPr>
+              <a:t>Compliance with laws and standards</a:t>
+            </a:r>
+          </a:p>
+          <a:p>
+            <a:pPr marL="514350" indent="-514350">
+              <a:buFont typeface="+mj-lt"/>
+              <a:buAutoNum type="arabicPeriod"/>
+            </a:pPr>
+            <a:r>
+              <a:rPr lang="en-US" dirty="0">
+                <a:latin typeface="Times New Roman" panose="02020603050405020304" pitchFamily="18" charset="0"/>
+                <a:cs typeface="Times New Roman" panose="02020603050405020304" pitchFamily="18" charset="0"/>
+              </a:rPr>
+              <a:t>Security Risks and their solution designs</a:t>
+            </a:r>
+          </a:p>
+          <a:p>
+            <a:pPr marL="514350" indent="-514350">
+              <a:buFont typeface="+mj-lt"/>
+              <a:buAutoNum type="arabicPeriod"/>
+            </a:pPr>
+            <a:r>
+              <a:rPr lang="en-US" dirty="0">
+                <a:latin typeface="Times New Roman" panose="02020603050405020304" pitchFamily="18" charset="0"/>
+                <a:cs typeface="Times New Roman" panose="02020603050405020304" pitchFamily="18" charset="0"/>
+              </a:rPr>
+              <a:t>xMK CKKS: overview, setup, network and problematic</a:t>
+            </a:r>
+          </a:p>
+          <a:p>
+            <a:pPr marL="514350" indent="-514350">
+              <a:buFont typeface="+mj-lt"/>
+              <a:buAutoNum type="arabicPeriod"/>
+            </a:pPr>
+            <a:r>
+              <a:rPr lang="en-US" dirty="0">
+                <a:latin typeface="Times New Roman" panose="02020603050405020304" pitchFamily="18" charset="0"/>
+                <a:cs typeface="Times New Roman" panose="02020603050405020304" pitchFamily="18" charset="0"/>
+              </a:rPr>
+              <a:t>DF-KS: setup, network and issues</a:t>
+            </a:r>
+          </a:p>
+          <a:p>
+            <a:pPr marL="514350" indent="-514350">
+              <a:buFont typeface="+mj-lt"/>
+              <a:buAutoNum type="arabicPeriod"/>
+            </a:pPr>
+            <a:r>
+              <a:rPr lang="en-US" dirty="0">
+                <a:latin typeface="Times New Roman" panose="02020603050405020304" pitchFamily="18" charset="0"/>
+                <a:cs typeface="Times New Roman" panose="02020603050405020304" pitchFamily="18" charset="0"/>
+              </a:rPr>
+              <a:t>Conclusion: summary and future works</a:t>
+            </a:r>
+          </a:p>
+        </p:txBody>
+      </p:sp>
+      <p:sp>
+        <p:nvSpPr>
+          <p:cNvPr id="4" name="Date Placeholder 3">
+            <a:extLst>
+              <a:ext uri="{FF2B5EF4-FFF2-40B4-BE49-F238E27FC236}">
+                <a16:creationId xmlns:a16="http://schemas.microsoft.com/office/drawing/2014/main" id="{E9180634-4EB8-9010-7360-4F77A392323B}"/>
+              </a:ext>
+            </a:extLst>
+          </p:cNvPr>
+          <p:cNvSpPr>
+            <a:spLocks noGrp="1"/>
+          </p:cNvSpPr>
+          <p:nvPr>
+            <p:ph type="dt" sz="half" idx="10"/>
+          </p:nvPr>
+        </p:nvSpPr>
+        <p:spPr/>
+        <p:txBody>
+          <a:bodyPr/>
+          <a:lstStyle/>
+          <a:p>
+            <a:fld id="{B8ADA9AE-1E4E-4CF6-B35A-04249EFC3058}" type="datetime1">
+              <a:rPr lang="en-US" sz="1600" smtClean="0">
+                <a:solidFill>
+                  <a:schemeClr val="tx1"/>
+                </a:solidFill>
+              </a:rPr>
+              <a:t>11/24/2025</a:t>
+            </a:fld>
+            <a:endParaRPr lang="en-US" sz="1600" dirty="0">
+              <a:solidFill>
+                <a:schemeClr val="tx1"/>
+              </a:solidFill>
+            </a:endParaRPr>
+          </a:p>
+        </p:txBody>
+      </p:sp>
+      <p:sp>
+        <p:nvSpPr>
+          <p:cNvPr id="5" name="Footer Placeholder 4">
+            <a:extLst>
+              <a:ext uri="{FF2B5EF4-FFF2-40B4-BE49-F238E27FC236}">
+                <a16:creationId xmlns:a16="http://schemas.microsoft.com/office/drawing/2014/main" id="{C7359127-721E-964B-37B1-FEB269A2698E}"/>
+              </a:ext>
+            </a:extLst>
+          </p:cNvPr>
+          <p:cNvSpPr>
+            <a:spLocks noGrp="1"/>
+          </p:cNvSpPr>
+          <p:nvPr>
+            <p:ph type="ftr" sz="quarter" idx="11"/>
+          </p:nvPr>
+        </p:nvSpPr>
+        <p:spPr/>
+        <p:txBody>
+          <a:bodyPr/>
+          <a:lstStyle/>
+          <a:p>
+            <a:r>
+              <a:rPr lang="en-US" sz="1600">
+                <a:solidFill>
+                  <a:schemeClr val="tx1"/>
+                </a:solidFill>
+              </a:rPr>
+              <a:t>Key switchable HE for FL</a:t>
+            </a:r>
+          </a:p>
+        </p:txBody>
+      </p:sp>
+      <p:sp>
+        <p:nvSpPr>
+          <p:cNvPr id="6" name="Slide Number Placeholder 5">
+            <a:extLst>
+              <a:ext uri="{FF2B5EF4-FFF2-40B4-BE49-F238E27FC236}">
+                <a16:creationId xmlns:a16="http://schemas.microsoft.com/office/drawing/2014/main" id="{95A8831E-6B6D-C702-88E1-2F48D91AD40A}"/>
+              </a:ext>
+            </a:extLst>
+          </p:cNvPr>
+          <p:cNvSpPr>
+            <a:spLocks noGrp="1"/>
+          </p:cNvSpPr>
+          <p:nvPr>
+            <p:ph type="sldNum" sz="quarter" idx="12"/>
+          </p:nvPr>
+        </p:nvSpPr>
+        <p:spPr/>
+        <p:txBody>
+          <a:bodyPr/>
+          <a:lstStyle/>
+          <a:p>
+            <a:fld id="{7F59E849-A344-4026-A8F6-1F4993DF7FB9}" type="slidenum">
+              <a:rPr lang="en-US" sz="1400" smtClean="0">
+                <a:solidFill>
+                  <a:schemeClr val="tx1"/>
+                </a:solidFill>
+              </a:rPr>
+              <a:t>2</a:t>
+            </a:fld>
+            <a:endParaRPr lang="en-US" sz="1400" dirty="0">
+              <a:solidFill>
+                <a:schemeClr val="tx1"/>
+              </a:solidFill>
+            </a:endParaRPr>
+          </a:p>
+        </p:txBody>
+      </p:sp>
+    </p:spTree>
+    <p:extLst>
+      <p:ext uri="{BB962C8B-B14F-4D97-AF65-F5344CB8AC3E}">
+        <p14:creationId xmlns:p14="http://schemas.microsoft.com/office/powerpoint/2010/main" val="2045844611"/>
+      </p:ext>
+    </p:extLst>
+  </p:cSld>
+  <p:clrMapOvr>
+    <a:masterClrMapping/>
+  </p:clrMapOvr>
+</p:sld>
+</file>
+
+<file path=ppt/slides/slide20.xml><?xml version="1.0" encoding="utf-8"?>
 <p:sld xmlns:a="http://schemas.openxmlformats.org/drawingml/2006/main" xmlns:r="http://schemas.openxmlformats.org/officeDocument/2006/relationships" xmlns:p="http://schemas.openxmlformats.org/presentationml/2006/main">
   <p:cSld>
     <p:spTree>
@@ -17818,7 +18980,7 @@
                   <a:schemeClr val="tx1"/>
                 </a:solidFill>
               </a:rPr>
-              <a:t>11/23/2025</a:t>
+              <a:t>11/24/2025</a:t>
             </a:fld>
             <a:endParaRPr lang="en-US" sz="1600" dirty="0">
               <a:solidFill>
@@ -17887,7 +19049,7 @@
                   <a:schemeClr val="tx1"/>
                 </a:solidFill>
               </a:rPr>
-              <a:t>19</a:t>
+              <a:t>20</a:t>
             </a:fld>
             <a:endParaRPr lang="en-US" sz="1400" dirty="0">
               <a:solidFill>
@@ -21624,12 +22786,18 @@
 </p:sld>
 </file>
 
-<file path=ppt/slides/slide2.xml><?xml version="1.0" encoding="utf-8"?>
+<file path=ppt/slides/slide21.xml><?xml version="1.0" encoding="utf-8"?>
 <p:sld xmlns:a="http://schemas.openxmlformats.org/drawingml/2006/main" xmlns:r="http://schemas.openxmlformats.org/officeDocument/2006/relationships" xmlns:p="http://schemas.openxmlformats.org/presentationml/2006/main">
   <p:cSld>
     <p:spTree>
       <p:nvGrpSpPr>
-        <p:cNvPr id="1" name=""/>
+        <p:cNvPr id="1" name="">
+          <a:extLst>
+            <a:ext uri="{FF2B5EF4-FFF2-40B4-BE49-F238E27FC236}">
+              <a16:creationId xmlns:a16="http://schemas.microsoft.com/office/drawing/2014/main" id="{ADB54D95-5642-3F17-06EE-376EF1DB17EC}"/>
+            </a:ext>
+          </a:extLst>
+        </p:cNvPr>
         <p:cNvGrpSpPr/>
         <p:nvPr/>
       </p:nvGrpSpPr>
@@ -21646,7 +22814,7 @@
           <p:cNvPr id="2" name="Title 1">
             <a:extLst>
               <a:ext uri="{FF2B5EF4-FFF2-40B4-BE49-F238E27FC236}">
-                <a16:creationId xmlns:a16="http://schemas.microsoft.com/office/drawing/2014/main" id="{9908435A-E379-97CD-B488-C7600E775D70}"/>
+                <a16:creationId xmlns:a16="http://schemas.microsoft.com/office/drawing/2014/main" id="{0071693E-8CAD-7C38-F66F-7599F3C4DBBB}"/>
               </a:ext>
             </a:extLst>
           </p:cNvPr>
@@ -21674,148 +22842,7 @@
                 <a:latin typeface="Times New Roman" panose="02020603050405020304" pitchFamily="18" charset="0"/>
                 <a:cs typeface="Times New Roman" panose="02020603050405020304" pitchFamily="18" charset="0"/>
               </a:rPr>
-              <a:t>Content</a:t>
-            </a:r>
-          </a:p>
-        </p:txBody>
-      </p:sp>
-      <p:sp>
-        <p:nvSpPr>
-          <p:cNvPr id="3" name="Content Placeholder 2">
-            <a:extLst>
-              <a:ext uri="{FF2B5EF4-FFF2-40B4-BE49-F238E27FC236}">
-                <a16:creationId xmlns:a16="http://schemas.microsoft.com/office/drawing/2014/main" id="{0EE2B071-766A-4F69-8B1F-256BC34580F4}"/>
-              </a:ext>
-            </a:extLst>
-          </p:cNvPr>
-          <p:cNvSpPr>
-            <a:spLocks noGrp="1"/>
-          </p:cNvSpPr>
-          <p:nvPr>
-            <p:ph idx="1"/>
-          </p:nvPr>
-        </p:nvSpPr>
-        <p:spPr/>
-        <p:txBody>
-          <a:bodyPr>
-            <a:normAutofit lnSpcReduction="10000"/>
-          </a:bodyPr>
-          <a:lstStyle/>
-          <a:p>
-            <a:pPr marL="514350" indent="-514350">
-              <a:buFont typeface="+mj-lt"/>
-              <a:buAutoNum type="arabicPeriod"/>
-            </a:pPr>
-            <a:r>
-              <a:rPr lang="en-US" dirty="0">
-                <a:latin typeface="Times New Roman" panose="02020603050405020304" pitchFamily="18" charset="0"/>
-                <a:cs typeface="Times New Roman" panose="02020603050405020304" pitchFamily="18" charset="0"/>
-              </a:rPr>
-              <a:t>Homomorphic encryption (HE): overview</a:t>
-            </a:r>
-          </a:p>
-          <a:p>
-            <a:pPr marL="514350" indent="-514350">
-              <a:buFont typeface="+mj-lt"/>
-              <a:buAutoNum type="arabicPeriod"/>
-            </a:pPr>
-            <a:r>
-              <a:rPr lang="en-US" dirty="0">
-                <a:latin typeface="Times New Roman" panose="02020603050405020304" pitchFamily="18" charset="0"/>
-                <a:cs typeface="Times New Roman" panose="02020603050405020304" pitchFamily="18" charset="0"/>
-              </a:rPr>
-              <a:t>Federated Learning (FL): overview and setup</a:t>
-            </a:r>
-          </a:p>
-          <a:p>
-            <a:pPr marL="514350" indent="-514350">
-              <a:buFont typeface="+mj-lt"/>
-              <a:buAutoNum type="arabicPeriod"/>
-            </a:pPr>
-            <a:r>
-              <a:rPr lang="en-US" dirty="0">
-                <a:latin typeface="Times New Roman" panose="02020603050405020304" pitchFamily="18" charset="0"/>
-                <a:cs typeface="Times New Roman" panose="02020603050405020304" pitchFamily="18" charset="0"/>
-              </a:rPr>
-              <a:t>Encrypted Model Aggregation Workflow</a:t>
-            </a:r>
-          </a:p>
-          <a:p>
-            <a:pPr marL="514350" indent="-514350">
-              <a:buFont typeface="+mj-lt"/>
-              <a:buAutoNum type="arabicPeriod"/>
-            </a:pPr>
-            <a:r>
-              <a:rPr lang="en-US" dirty="0">
-                <a:latin typeface="Times New Roman" panose="02020603050405020304" pitchFamily="18" charset="0"/>
-                <a:cs typeface="Times New Roman" panose="02020603050405020304" pitchFamily="18" charset="0"/>
-              </a:rPr>
-              <a:t>HE importance in FL</a:t>
-            </a:r>
-          </a:p>
-          <a:p>
-            <a:pPr marL="514350" indent="-514350">
-              <a:buFont typeface="+mj-lt"/>
-              <a:buAutoNum type="arabicPeriod"/>
-            </a:pPr>
-            <a:r>
-              <a:rPr lang="en-US" dirty="0">
-                <a:latin typeface="Times New Roman" panose="02020603050405020304" pitchFamily="18" charset="0"/>
-                <a:cs typeface="Times New Roman" panose="02020603050405020304" pitchFamily="18" charset="0"/>
-              </a:rPr>
-              <a:t>Compliance with laws and standards</a:t>
-            </a:r>
-          </a:p>
-          <a:p>
-            <a:pPr marL="514350" indent="-514350">
-              <a:buFont typeface="+mj-lt"/>
-              <a:buAutoNum type="arabicPeriod"/>
-            </a:pPr>
-            <a:r>
-              <a:rPr lang="en-US" dirty="0">
-                <a:latin typeface="Times New Roman" panose="02020603050405020304" pitchFamily="18" charset="0"/>
-                <a:cs typeface="Times New Roman" panose="02020603050405020304" pitchFamily="18" charset="0"/>
-              </a:rPr>
-              <a:t>Security Risks and their solution designs</a:t>
-            </a:r>
-          </a:p>
-          <a:p>
-            <a:pPr marL="514350" indent="-514350">
-              <a:buFont typeface="+mj-lt"/>
-              <a:buAutoNum type="arabicPeriod"/>
-            </a:pPr>
-            <a:r>
-              <a:rPr lang="en-US" dirty="0">
-                <a:latin typeface="Times New Roman" panose="02020603050405020304" pitchFamily="18" charset="0"/>
-                <a:cs typeface="Times New Roman" panose="02020603050405020304" pitchFamily="18" charset="0"/>
-              </a:rPr>
-              <a:t>xMK CKKS: overview, setup, network and problematic</a:t>
-            </a:r>
-          </a:p>
-          <a:p>
-            <a:pPr marL="514350" indent="-514350">
-              <a:buFont typeface="+mj-lt"/>
-              <a:buAutoNum type="arabicPeriod"/>
-            </a:pPr>
-            <a:r>
-              <a:rPr lang="en-US" dirty="0">
-                <a:latin typeface="Times New Roman" panose="02020603050405020304" pitchFamily="18" charset="0"/>
-                <a:cs typeface="Times New Roman" panose="02020603050405020304" pitchFamily="18" charset="0"/>
-              </a:rPr>
-              <a:t>DF-KS: setup, network and issues</a:t>
-            </a:r>
-          </a:p>
-          <a:p>
-            <a:pPr marL="514350" indent="-514350">
-              <a:buFont typeface="+mj-lt"/>
-              <a:buAutoNum type="arabicPeriod"/>
-            </a:pPr>
-            <a:r>
-              <a:rPr lang="en-US" dirty="0">
-                <a:latin typeface="Times New Roman" panose="02020603050405020304" pitchFamily="18" charset="0"/>
-                <a:cs typeface="Times New Roman" panose="02020603050405020304" pitchFamily="18" charset="0"/>
-              </a:rPr>
-              <a:t>Conclusion: summary and future works</a:t>
+              <a:t>8. DF-KS scheme (issue)</a:t>
             </a:r>
           </a:p>
         </p:txBody>
@@ -21825,7 +22852,7 @@
           <p:cNvPr id="4" name="Date Placeholder 3">
             <a:extLst>
               <a:ext uri="{FF2B5EF4-FFF2-40B4-BE49-F238E27FC236}">
-                <a16:creationId xmlns:a16="http://schemas.microsoft.com/office/drawing/2014/main" id="{E9180634-4EB8-9010-7360-4F77A392323B}"/>
+                <a16:creationId xmlns:a16="http://schemas.microsoft.com/office/drawing/2014/main" id="{C1F0296C-DB3B-10E6-6414-70C07CE225BB}"/>
               </a:ext>
             </a:extLst>
           </p:cNvPr>
@@ -21847,7 +22874,7 @@
                   <a:schemeClr val="tx1"/>
                 </a:solidFill>
               </a:rPr>
-              <a:t>11/23/2025</a:t>
+              <a:t>11/24/2025</a:t>
             </a:fld>
             <a:endParaRPr lang="en-US" sz="1600" dirty="0">
               <a:solidFill>
@@ -21862,7 +22889,7 @@
           <p:cNvPr id="5" name="Footer Placeholder 4">
             <a:extLst>
               <a:ext uri="{FF2B5EF4-FFF2-40B4-BE49-F238E27FC236}">
-                <a16:creationId xmlns:a16="http://schemas.microsoft.com/office/drawing/2014/main" id="{C7359127-721E-964B-37B1-FEB269A2698E}"/>
+                <a16:creationId xmlns:a16="http://schemas.microsoft.com/office/drawing/2014/main" id="{BBCB0878-362A-A256-22B3-B348E869C087}"/>
               </a:ext>
             </a:extLst>
           </p:cNvPr>
@@ -21894,7 +22921,7 @@
           <p:cNvPr id="6" name="Slide Number Placeholder 5">
             <a:extLst>
               <a:ext uri="{FF2B5EF4-FFF2-40B4-BE49-F238E27FC236}">
-                <a16:creationId xmlns:a16="http://schemas.microsoft.com/office/drawing/2014/main" id="{95A8831E-6B6D-C702-88E1-2F48D91AD40A}"/>
+                <a16:creationId xmlns:a16="http://schemas.microsoft.com/office/drawing/2014/main" id="{0FE5C190-510C-C918-BCFA-D7ECA7C7AA82}"/>
               </a:ext>
             </a:extLst>
           </p:cNvPr>
@@ -21916,7 +22943,7 @@
                   <a:schemeClr val="tx1"/>
                 </a:solidFill>
               </a:rPr>
-              <a:t>2</a:t>
+              <a:t>21</a:t>
             </a:fld>
             <a:endParaRPr lang="en-US" sz="1400" dirty="0">
               <a:solidFill>
@@ -21926,10 +22953,1153 @@
           </a:p>
         </p:txBody>
       </p:sp>
+      <mc:AlternateContent xmlns:mc="http://schemas.openxmlformats.org/markup-compatibility/2006">
+        <mc:Choice xmlns:a14="http://schemas.microsoft.com/office/drawing/2010/main" Requires="a14">
+          <p:sp>
+            <p:nvSpPr>
+              <p:cNvPr id="7" name="TextBox 6">
+                <a:extLst>
+                  <a:ext uri="{FF2B5EF4-FFF2-40B4-BE49-F238E27FC236}">
+                    <a16:creationId xmlns:a16="http://schemas.microsoft.com/office/drawing/2014/main" id="{DD8946FF-239E-27AD-9FCD-34D4B0A57738}"/>
+                  </a:ext>
+                </a:extLst>
+              </p:cNvPr>
+              <p:cNvSpPr txBox="1"/>
+              <p:nvPr/>
+            </p:nvSpPr>
+            <p:spPr>
+              <a:xfrm>
+                <a:off x="2940670" y="1743235"/>
+                <a:ext cx="3409485" cy="400110"/>
+              </a:xfrm>
+              <a:prstGeom prst="rect">
+                <a:avLst/>
+              </a:prstGeom>
+              <a:noFill/>
+            </p:spPr>
+            <p:txBody>
+              <a:bodyPr wrap="square">
+                <a:spAutoFit/>
+              </a:bodyPr>
+              <a:lstStyle/>
+              <a:p>
+                <a:pPr/>
+                <a14:m>
+                  <m:oMathPara xmlns:m="http://schemas.openxmlformats.org/officeDocument/2006/math">
+                    <m:oMathParaPr>
+                      <m:jc m:val="centerGroup"/>
+                    </m:oMathParaPr>
+                    <m:oMath xmlns:m="http://schemas.openxmlformats.org/officeDocument/2006/math">
+                      <m:r>
+                        <a:rPr lang="en-US" sz="2000" b="1" i="1" smtClean="0">
+                          <a:latin typeface="Cambria Math" panose="02040503050406030204" pitchFamily="18" charset="0"/>
+                        </a:rPr>
+                        <m:t>𝑴</m:t>
+                      </m:r>
+                      <m:r>
+                        <a:rPr lang="en-US" sz="2000" b="1" i="0">
+                          <a:latin typeface="Cambria Math" panose="02040503050406030204" pitchFamily="18" charset="0"/>
+                        </a:rPr>
+                        <m:t>=</m:t>
+                      </m:r>
+                      <m:r>
+                        <a:rPr lang="en-US" sz="2000" b="1" i="0">
+                          <a:latin typeface="Cambria Math" panose="02040503050406030204" pitchFamily="18" charset="0"/>
+                        </a:rPr>
+                        <m:t>𝟐</m:t>
+                      </m:r>
+                      <m:r>
+                        <a:rPr lang="en-US" sz="2000" b="1" i="0">
+                          <a:latin typeface="Cambria Math" panose="02040503050406030204" pitchFamily="18" charset="0"/>
+                        </a:rPr>
+                        <m:t>×</m:t>
+                      </m:r>
+                      <m:r>
+                        <a:rPr lang="en-US" sz="2000" b="1" i="1" smtClean="0">
+                          <a:latin typeface="Cambria Math" panose="02040503050406030204" pitchFamily="18" charset="0"/>
+                        </a:rPr>
+                        <m:t>𝒑𝒐𝒍𝒚</m:t>
+                      </m:r>
+                      <m:d>
+                        <m:dPr>
+                          <m:ctrlPr>
+                            <a:rPr lang="en-US" sz="2000" b="1" i="1">
+                              <a:latin typeface="Cambria Math" panose="02040503050406030204" pitchFamily="18" charset="0"/>
+                            </a:rPr>
+                          </m:ctrlPr>
+                        </m:dPr>
+                        <m:e>
+                          <m:r>
+                            <a:rPr lang="en-US" sz="2000" b="1" i="1">
+                              <a:latin typeface="Cambria Math" panose="02040503050406030204" pitchFamily="18" charset="0"/>
+                            </a:rPr>
+                            <m:t>𝝀</m:t>
+                          </m:r>
+                        </m:e>
+                      </m:d>
+                      <m:r>
+                        <a:rPr lang="en-US" sz="2000" b="1" i="0">
+                          <a:latin typeface="Cambria Math" panose="02040503050406030204" pitchFamily="18" charset="0"/>
+                        </a:rPr>
+                        <m:t>×</m:t>
+                      </m:r>
+                      <m:d>
+                        <m:dPr>
+                          <m:ctrlPr>
+                            <a:rPr lang="en-US" sz="2000" b="1" i="1">
+                              <a:latin typeface="Cambria Math" panose="02040503050406030204" pitchFamily="18" charset="0"/>
+                            </a:rPr>
+                          </m:ctrlPr>
+                        </m:dPr>
+                        <m:e>
+                          <m:r>
+                            <a:rPr lang="en-US" sz="2000" b="1" i="1">
+                              <a:latin typeface="Cambria Math" panose="02040503050406030204" pitchFamily="18" charset="0"/>
+                            </a:rPr>
+                            <m:t>𝒅</m:t>
+                          </m:r>
+                          <m:r>
+                            <a:rPr lang="en-US" sz="2000" b="1" i="0">
+                              <a:latin typeface="Cambria Math" panose="02040503050406030204" pitchFamily="18" charset="0"/>
+                            </a:rPr>
+                            <m:t>+</m:t>
+                          </m:r>
+                          <m:r>
+                            <a:rPr lang="en-US" sz="2000" b="1" i="0">
+                              <a:latin typeface="Cambria Math" panose="02040503050406030204" pitchFamily="18" charset="0"/>
+                            </a:rPr>
+                            <m:t>𝟏</m:t>
+                          </m:r>
+                        </m:e>
+                      </m:d>
+                    </m:oMath>
+                  </m:oMathPara>
+                </a14:m>
+                <a:endParaRPr lang="en-US" sz="2000" b="1" dirty="0"/>
+              </a:p>
+            </p:txBody>
+          </p:sp>
+        </mc:Choice>
+        <mc:Fallback>
+          <p:sp>
+            <p:nvSpPr>
+              <p:cNvPr id="7" name="TextBox 6">
+                <a:extLst>
+                  <a:ext uri="{FF2B5EF4-FFF2-40B4-BE49-F238E27FC236}">
+                    <a16:creationId xmlns:a16="http://schemas.microsoft.com/office/drawing/2014/main" id="{DD8946FF-239E-27AD-9FCD-34D4B0A57738}"/>
+                  </a:ext>
+                </a:extLst>
+              </p:cNvPr>
+              <p:cNvSpPr txBox="1">
+                <a:spLocks noRot="1" noChangeAspect="1" noMove="1" noResize="1" noEditPoints="1" noAdjustHandles="1" noChangeArrowheads="1" noChangeShapeType="1" noTextEdit="1"/>
+              </p:cNvSpPr>
+              <p:nvPr/>
+            </p:nvSpPr>
+            <p:spPr>
+              <a:xfrm>
+                <a:off x="2940670" y="1743235"/>
+                <a:ext cx="3409485" cy="400110"/>
+              </a:xfrm>
+              <a:prstGeom prst="rect">
+                <a:avLst/>
+              </a:prstGeom>
+              <a:blipFill>
+                <a:blip r:embed="rId2"/>
+                <a:stretch>
+                  <a:fillRect b="-13636"/>
+                </a:stretch>
+              </a:blipFill>
+            </p:spPr>
+            <p:txBody>
+              <a:bodyPr/>
+              <a:lstStyle/>
+              <a:p>
+                <a:r>
+                  <a:rPr lang="en-US">
+                    <a:noFill/>
+                  </a:rPr>
+                  <a:t> </a:t>
+                </a:r>
+              </a:p>
+            </p:txBody>
+          </p:sp>
+        </mc:Fallback>
+      </mc:AlternateContent>
+      <mc:AlternateContent xmlns:mc="http://schemas.openxmlformats.org/markup-compatibility/2006">
+        <mc:Choice xmlns:a14="http://schemas.microsoft.com/office/drawing/2010/main" Requires="a14">
+          <p:sp>
+            <p:nvSpPr>
+              <p:cNvPr id="9" name="TextBox 8">
+                <a:extLst>
+                  <a:ext uri="{FF2B5EF4-FFF2-40B4-BE49-F238E27FC236}">
+                    <a16:creationId xmlns:a16="http://schemas.microsoft.com/office/drawing/2014/main" id="{E6F527D3-3C59-FECD-97B1-8C8EC90CE134}"/>
+                  </a:ext>
+                </a:extLst>
+              </p:cNvPr>
+              <p:cNvSpPr txBox="1"/>
+              <p:nvPr/>
+            </p:nvSpPr>
+            <p:spPr>
+              <a:xfrm>
+                <a:off x="991530" y="2740445"/>
+                <a:ext cx="6094140" cy="950517"/>
+              </a:xfrm>
+              <a:prstGeom prst="rect">
+                <a:avLst/>
+              </a:prstGeom>
+              <a:noFill/>
+            </p:spPr>
+            <p:txBody>
+              <a:bodyPr wrap="square">
+                <a:spAutoFit/>
+              </a:bodyPr>
+              <a:lstStyle/>
+              <a:p>
+                <a:pPr marL="0" marR="0" indent="360045" algn="just">
+                  <a:lnSpc>
+                    <a:spcPct val="150000"/>
+                  </a:lnSpc>
+                  <a:spcAft>
+                    <a:spcPts val="600"/>
+                  </a:spcAft>
+                  <a:buNone/>
+                </a:pPr>
+                <a14:m>
+                  <m:oMath xmlns:m="http://schemas.openxmlformats.org/officeDocument/2006/math">
+                    <m:sSub>
+                      <m:sSubPr>
+                        <m:ctrlPr>
+                          <a:rPr lang="en-US" sz="1800" i="1" smtClean="0">
+                            <a:effectLst/>
+                            <a:latin typeface="Cambria Math" panose="02040503050406030204" pitchFamily="18" charset="0"/>
+                            <a:ea typeface="Times New Roman" panose="02020603050405020304" pitchFamily="18" charset="0"/>
+                          </a:rPr>
+                        </m:ctrlPr>
+                      </m:sSubPr>
+                      <m:e>
+                        <m:r>
+                          <a:rPr lang="en-US" sz="1800" i="1">
+                            <a:effectLst/>
+                            <a:latin typeface="Cambria Math" panose="02040503050406030204" pitchFamily="18" charset="0"/>
+                            <a:ea typeface="Times New Roman" panose="02020603050405020304" pitchFamily="18" charset="0"/>
+                          </a:rPr>
+                          <m:t>𝐸</m:t>
+                        </m:r>
+                      </m:e>
+                      <m:sub>
+                        <m:r>
+                          <a:rPr lang="en-US" sz="1800" i="1">
+                            <a:effectLst/>
+                            <a:latin typeface="Cambria Math" panose="02040503050406030204" pitchFamily="18" charset="0"/>
+                            <a:ea typeface="Times New Roman" panose="02020603050405020304" pitchFamily="18" charset="0"/>
+                          </a:rPr>
+                          <m:t>1</m:t>
+                        </m:r>
+                      </m:sub>
+                    </m:sSub>
+                    <m:r>
+                      <a:rPr lang="en-US" sz="1800" i="1">
+                        <a:effectLst/>
+                        <a:latin typeface="Cambria Math" panose="02040503050406030204" pitchFamily="18" charset="0"/>
+                        <a:ea typeface="Times New Roman" panose="02020603050405020304" pitchFamily="18" charset="0"/>
+                      </a:rPr>
+                      <m:t>:"</m:t>
+                    </m:r>
+                    <m:r>
+                      <a:rPr lang="en-US" sz="1800" i="1">
+                        <a:effectLst/>
+                        <a:latin typeface="Cambria Math" panose="02040503050406030204" pitchFamily="18" charset="0"/>
+                        <a:ea typeface="Times New Roman" panose="02020603050405020304" pitchFamily="18" charset="0"/>
+                      </a:rPr>
+                      <m:t>𝑜𝑏𝑡𝑎𝑖𝑛</m:t>
+                    </m:r>
+                    <m:r>
+                      <a:rPr lang="en-US" sz="1800" i="1">
+                        <a:effectLst/>
+                        <a:latin typeface="Cambria Math" panose="02040503050406030204" pitchFamily="18" charset="0"/>
+                        <a:ea typeface="Times New Roman" panose="02020603050405020304" pitchFamily="18" charset="0"/>
+                      </a:rPr>
+                      <m:t> </m:t>
+                    </m:r>
+                    <m:r>
+                      <a:rPr lang="en-US" sz="1800" i="1">
+                        <a:effectLst/>
+                        <a:latin typeface="Cambria Math" panose="02040503050406030204" pitchFamily="18" charset="0"/>
+                        <a:ea typeface="Times New Roman" panose="02020603050405020304" pitchFamily="18" charset="0"/>
+                      </a:rPr>
+                      <m:t>𝑎𝑡</m:t>
+                    </m:r>
+                    <m:r>
+                      <a:rPr lang="en-US" sz="1800" i="1">
+                        <a:effectLst/>
+                        <a:latin typeface="Cambria Math" panose="02040503050406030204" pitchFamily="18" charset="0"/>
+                        <a:ea typeface="Times New Roman" panose="02020603050405020304" pitchFamily="18" charset="0"/>
+                      </a:rPr>
+                      <m:t> </m:t>
+                    </m:r>
+                    <m:r>
+                      <a:rPr lang="en-US" sz="1800" i="1">
+                        <a:effectLst/>
+                        <a:latin typeface="Cambria Math" panose="02040503050406030204" pitchFamily="18" charset="0"/>
+                        <a:ea typeface="Times New Roman" panose="02020603050405020304" pitchFamily="18" charset="0"/>
+                      </a:rPr>
+                      <m:t>𝑙𝑒𝑎𝑠𝑡</m:t>
+                    </m:r>
+                    <m:r>
+                      <a:rPr lang="en-US" sz="1800" i="1">
+                        <a:effectLst/>
+                        <a:latin typeface="Cambria Math" panose="02040503050406030204" pitchFamily="18" charset="0"/>
+                        <a:ea typeface="Times New Roman" panose="02020603050405020304" pitchFamily="18" charset="0"/>
+                      </a:rPr>
+                      <m:t> </m:t>
+                    </m:r>
+                    <m:r>
+                      <a:rPr lang="en-US" sz="1800" i="1">
+                        <a:effectLst/>
+                        <a:latin typeface="Cambria Math" panose="02040503050406030204" pitchFamily="18" charset="0"/>
+                        <a:ea typeface="Times New Roman" panose="02020603050405020304" pitchFamily="18" charset="0"/>
+                      </a:rPr>
+                      <m:t>𝑜𝑛𝑒</m:t>
+                    </m:r>
+                    <m:r>
+                      <a:rPr lang="en-US" sz="1800" i="1">
+                        <a:effectLst/>
+                        <a:latin typeface="Cambria Math" panose="02040503050406030204" pitchFamily="18" charset="0"/>
+                        <a:ea typeface="Times New Roman" panose="02020603050405020304" pitchFamily="18" charset="0"/>
+                      </a:rPr>
+                      <m:t> </m:t>
+                    </m:r>
+                    <m:r>
+                      <a:rPr lang="en-US" sz="1800" i="1">
+                        <a:effectLst/>
+                        <a:latin typeface="Cambria Math" panose="02040503050406030204" pitchFamily="18" charset="0"/>
+                        <a:ea typeface="Times New Roman" panose="02020603050405020304" pitchFamily="18" charset="0"/>
+                      </a:rPr>
+                      <m:t>𝑚</m:t>
+                    </m:r>
+                    <m:r>
+                      <a:rPr lang="en-US" sz="1800" i="1">
+                        <a:effectLst/>
+                        <a:latin typeface="Cambria Math" panose="02040503050406030204" pitchFamily="18" charset="0"/>
+                        <a:ea typeface="Times New Roman" panose="02020603050405020304" pitchFamily="18" charset="0"/>
+                      </a:rPr>
+                      <m:t>′"</m:t>
+                    </m:r>
+                  </m:oMath>
+                </a14:m>
+                <a:r>
+                  <a:rPr lang="en-US" sz="1800" dirty="0">
+                    <a:effectLst/>
+                    <a:latin typeface="Times New Roman" panose="02020603050405020304" pitchFamily="18" charset="0"/>
+                    <a:ea typeface="Times New Roman" panose="02020603050405020304" pitchFamily="18" charset="0"/>
+                    <a:cs typeface="Times New Roman" panose="02020603050405020304" pitchFamily="18" charset="0"/>
+                  </a:rPr>
+                  <a:t> </a:t>
+                </a:r>
+              </a:p>
+              <a:p>
+                <a:pPr marL="0" marR="0" indent="360045" algn="just">
+                  <a:lnSpc>
+                    <a:spcPct val="150000"/>
+                  </a:lnSpc>
+                  <a:spcAft>
+                    <a:spcPts val="600"/>
+                  </a:spcAft>
+                  <a:buNone/>
+                </a:pPr>
+                <a14:m>
+                  <m:oMath xmlns:m="http://schemas.openxmlformats.org/officeDocument/2006/math">
+                    <m:sSub>
+                      <m:sSubPr>
+                        <m:ctrlPr>
+                          <a:rPr lang="en-US" sz="1800" i="1">
+                            <a:effectLst/>
+                            <a:latin typeface="Cambria Math" panose="02040503050406030204" pitchFamily="18" charset="0"/>
+                            <a:ea typeface="Times New Roman" panose="02020603050405020304" pitchFamily="18" charset="0"/>
+                          </a:rPr>
+                        </m:ctrlPr>
+                      </m:sSubPr>
+                      <m:e>
+                        <m:r>
+                          <a:rPr lang="en-US" sz="1800" i="1">
+                            <a:effectLst/>
+                            <a:latin typeface="Cambria Math" panose="02040503050406030204" pitchFamily="18" charset="0"/>
+                            <a:ea typeface="Times New Roman" panose="02020603050405020304" pitchFamily="18" charset="0"/>
+                          </a:rPr>
+                          <m:t>𝐸</m:t>
+                        </m:r>
+                      </m:e>
+                      <m:sub>
+                        <m:r>
+                          <a:rPr lang="en-US" sz="1800" i="1">
+                            <a:effectLst/>
+                            <a:latin typeface="Cambria Math" panose="02040503050406030204" pitchFamily="18" charset="0"/>
+                            <a:ea typeface="Times New Roman" panose="02020603050405020304" pitchFamily="18" charset="0"/>
+                          </a:rPr>
+                          <m:t>2</m:t>
+                        </m:r>
+                      </m:sub>
+                    </m:sSub>
+                    <m:r>
+                      <a:rPr lang="en-US" sz="1800" i="1">
+                        <a:effectLst/>
+                        <a:latin typeface="Cambria Math" panose="02040503050406030204" pitchFamily="18" charset="0"/>
+                        <a:ea typeface="Times New Roman" panose="02020603050405020304" pitchFamily="18" charset="0"/>
+                      </a:rPr>
+                      <m:t>:"</m:t>
+                    </m:r>
+                    <m:r>
+                      <a:rPr lang="en-US" sz="1800" i="1">
+                        <a:effectLst/>
+                        <a:latin typeface="Cambria Math" panose="02040503050406030204" pitchFamily="18" charset="0"/>
+                        <a:ea typeface="Times New Roman" panose="02020603050405020304" pitchFamily="18" charset="0"/>
+                      </a:rPr>
+                      <m:t>𝑓𝑖𝑛𝑑𝑖𝑛𝑔</m:t>
+                    </m:r>
+                    <m:r>
+                      <a:rPr lang="en-US" sz="1800" i="1">
+                        <a:effectLst/>
+                        <a:latin typeface="Cambria Math" panose="02040503050406030204" pitchFamily="18" charset="0"/>
+                        <a:ea typeface="Times New Roman" panose="02020603050405020304" pitchFamily="18" charset="0"/>
+                      </a:rPr>
+                      <m:t> </m:t>
+                    </m:r>
+                    <m:r>
+                      <a:rPr lang="en-US" sz="1800" i="1">
+                        <a:effectLst/>
+                        <a:latin typeface="Cambria Math" panose="02040503050406030204" pitchFamily="18" charset="0"/>
+                        <a:ea typeface="Times New Roman" panose="02020603050405020304" pitchFamily="18" charset="0"/>
+                      </a:rPr>
+                      <m:t>𝑎𝑛𝑑</m:t>
+                    </m:r>
+                    <m:r>
+                      <a:rPr lang="en-US" sz="1800" i="1">
+                        <a:effectLst/>
+                        <a:latin typeface="Cambria Math" panose="02040503050406030204" pitchFamily="18" charset="0"/>
+                        <a:ea typeface="Times New Roman" panose="02020603050405020304" pitchFamily="18" charset="0"/>
+                      </a:rPr>
+                      <m:t> </m:t>
+                    </m:r>
+                    <m:r>
+                      <a:rPr lang="en-US" sz="1800" i="1">
+                        <a:effectLst/>
+                        <a:latin typeface="Cambria Math" panose="02040503050406030204" pitchFamily="18" charset="0"/>
+                        <a:ea typeface="Times New Roman" panose="02020603050405020304" pitchFamily="18" charset="0"/>
+                      </a:rPr>
+                      <m:t>𝑖𝑛𝑣𝑒𝑟𝑡𝑖𝑏𝑙𝑒</m:t>
+                    </m:r>
+                    <m:r>
+                      <a:rPr lang="en-US" sz="1800" i="1">
+                        <a:effectLst/>
+                        <a:latin typeface="Cambria Math" panose="02040503050406030204" pitchFamily="18" charset="0"/>
+                        <a:ea typeface="Times New Roman" panose="02020603050405020304" pitchFamily="18" charset="0"/>
+                      </a:rPr>
+                      <m:t> </m:t>
+                    </m:r>
+                    <m:r>
+                      <a:rPr lang="en-US" sz="1800" i="1">
+                        <a:effectLst/>
+                        <a:latin typeface="Cambria Math" panose="02040503050406030204" pitchFamily="18" charset="0"/>
+                        <a:ea typeface="Times New Roman" panose="02020603050405020304" pitchFamily="18" charset="0"/>
+                      </a:rPr>
+                      <m:t>𝑚𝑎𝑡𝑟𝑖𝑥</m:t>
+                    </m:r>
+                    <m:r>
+                      <a:rPr lang="en-US" sz="1800" i="1">
+                        <a:effectLst/>
+                        <a:latin typeface="Cambria Math" panose="02040503050406030204" pitchFamily="18" charset="0"/>
+                        <a:ea typeface="Times New Roman" panose="02020603050405020304" pitchFamily="18" charset="0"/>
+                      </a:rPr>
+                      <m:t> (</m:t>
+                    </m:r>
+                    <m:r>
+                      <a:rPr lang="en-US" sz="1800" i="1">
+                        <a:effectLst/>
+                        <a:latin typeface="Cambria Math" panose="02040503050406030204" pitchFamily="18" charset="0"/>
+                        <a:ea typeface="Times New Roman" panose="02020603050405020304" pitchFamily="18" charset="0"/>
+                      </a:rPr>
+                      <m:t>𝑑</m:t>
+                    </m:r>
+                    <m:r>
+                      <a:rPr lang="en-US" sz="1800" i="1">
+                        <a:effectLst/>
+                        <a:latin typeface="Cambria Math" panose="02040503050406030204" pitchFamily="18" charset="0"/>
+                        <a:ea typeface="Times New Roman" panose="02020603050405020304" pitchFamily="18" charset="0"/>
+                      </a:rPr>
+                      <m:t>×</m:t>
+                    </m:r>
+                    <m:r>
+                      <a:rPr lang="en-US" sz="1800" i="1">
+                        <a:effectLst/>
+                        <a:latin typeface="Cambria Math" panose="02040503050406030204" pitchFamily="18" charset="0"/>
+                        <a:ea typeface="Times New Roman" panose="02020603050405020304" pitchFamily="18" charset="0"/>
+                      </a:rPr>
+                      <m:t>𝑑</m:t>
+                    </m:r>
+                    <m:r>
+                      <a:rPr lang="en-US" sz="1800" i="1">
+                        <a:effectLst/>
+                        <a:latin typeface="Cambria Math" panose="02040503050406030204" pitchFamily="18" charset="0"/>
+                        <a:ea typeface="Times New Roman" panose="02020603050405020304" pitchFamily="18" charset="0"/>
+                      </a:rPr>
+                      <m:t>) </m:t>
+                    </m:r>
+                    <m:r>
+                      <a:rPr lang="en-US" sz="1800" i="1">
+                        <a:effectLst/>
+                        <a:latin typeface="Cambria Math" panose="02040503050406030204" pitchFamily="18" charset="0"/>
+                        <a:ea typeface="Times New Roman" panose="02020603050405020304" pitchFamily="18" charset="0"/>
+                      </a:rPr>
+                      <m:t>𝑖𝑛</m:t>
+                    </m:r>
+                    <m:r>
+                      <a:rPr lang="en-US" sz="1800" i="1">
+                        <a:effectLst/>
+                        <a:latin typeface="Cambria Math" panose="02040503050406030204" pitchFamily="18" charset="0"/>
+                        <a:ea typeface="Times New Roman" panose="02020603050405020304" pitchFamily="18" charset="0"/>
+                      </a:rPr>
+                      <m:t> </m:t>
+                    </m:r>
+                    <m:sSub>
+                      <m:sSubPr>
+                        <m:ctrlPr>
+                          <a:rPr lang="en-US" sz="1800" i="1">
+                            <a:effectLst/>
+                            <a:latin typeface="Cambria Math" panose="02040503050406030204" pitchFamily="18" charset="0"/>
+                            <a:ea typeface="Times New Roman" panose="02020603050405020304" pitchFamily="18" charset="0"/>
+                          </a:rPr>
+                        </m:ctrlPr>
+                      </m:sSubPr>
+                      <m:e>
+                        <m:r>
+                          <a:rPr lang="en-US" sz="1800" i="1">
+                            <a:effectLst/>
+                            <a:latin typeface="Cambria Math" panose="02040503050406030204" pitchFamily="18" charset="0"/>
+                            <a:ea typeface="Times New Roman" panose="02020603050405020304" pitchFamily="18" charset="0"/>
+                          </a:rPr>
+                          <m:t>𝑍</m:t>
+                        </m:r>
+                      </m:e>
+                      <m:sub>
+                        <m:r>
+                          <a:rPr lang="en-US" sz="1800" i="1">
+                            <a:effectLst/>
+                            <a:latin typeface="Cambria Math" panose="02040503050406030204" pitchFamily="18" charset="0"/>
+                            <a:ea typeface="Times New Roman" panose="02020603050405020304" pitchFamily="18" charset="0"/>
+                          </a:rPr>
+                          <m:t>𝑚</m:t>
+                        </m:r>
+                        <m:r>
+                          <a:rPr lang="en-US" sz="1800" i="1">
+                            <a:effectLst/>
+                            <a:latin typeface="Cambria Math" panose="02040503050406030204" pitchFamily="18" charset="0"/>
+                            <a:ea typeface="Times New Roman" panose="02020603050405020304" pitchFamily="18" charset="0"/>
+                          </a:rPr>
+                          <m:t>′</m:t>
+                        </m:r>
+                      </m:sub>
+                    </m:sSub>
+                    <m:r>
+                      <a:rPr lang="en-US" sz="1800" i="1">
+                        <a:effectLst/>
+                        <a:latin typeface="Cambria Math" panose="02040503050406030204" pitchFamily="18" charset="0"/>
+                        <a:ea typeface="Times New Roman" panose="02020603050405020304" pitchFamily="18" charset="0"/>
+                      </a:rPr>
+                      <m:t>"</m:t>
+                    </m:r>
+                  </m:oMath>
+                </a14:m>
+                <a:r>
+                  <a:rPr lang="en-US" sz="1800" dirty="0">
+                    <a:effectLst/>
+                    <a:latin typeface="Times New Roman" panose="02020603050405020304" pitchFamily="18" charset="0"/>
+                    <a:ea typeface="Times New Roman" panose="02020603050405020304" pitchFamily="18" charset="0"/>
+                    <a:cs typeface="Times New Roman" panose="02020603050405020304" pitchFamily="18" charset="0"/>
+                  </a:rPr>
+                  <a:t> </a:t>
+                </a:r>
+              </a:p>
+            </p:txBody>
+          </p:sp>
+        </mc:Choice>
+        <mc:Fallback>
+          <p:sp>
+            <p:nvSpPr>
+              <p:cNvPr id="9" name="TextBox 8">
+                <a:extLst>
+                  <a:ext uri="{FF2B5EF4-FFF2-40B4-BE49-F238E27FC236}">
+                    <a16:creationId xmlns:a16="http://schemas.microsoft.com/office/drawing/2014/main" id="{E6F527D3-3C59-FECD-97B1-8C8EC90CE134}"/>
+                  </a:ext>
+                </a:extLst>
+              </p:cNvPr>
+              <p:cNvSpPr txBox="1">
+                <a:spLocks noRot="1" noChangeAspect="1" noMove="1" noResize="1" noEditPoints="1" noAdjustHandles="1" noChangeArrowheads="1" noChangeShapeType="1" noTextEdit="1"/>
+              </p:cNvSpPr>
+              <p:nvPr/>
+            </p:nvSpPr>
+            <p:spPr>
+              <a:xfrm>
+                <a:off x="991530" y="2740445"/>
+                <a:ext cx="6094140" cy="950517"/>
+              </a:xfrm>
+              <a:prstGeom prst="rect">
+                <a:avLst/>
+              </a:prstGeom>
+              <a:blipFill>
+                <a:blip r:embed="rId3"/>
+                <a:stretch>
+                  <a:fillRect b="-5806"/>
+                </a:stretch>
+              </a:blipFill>
+            </p:spPr>
+            <p:txBody>
+              <a:bodyPr/>
+              <a:lstStyle/>
+              <a:p>
+                <a:r>
+                  <a:rPr lang="en-US">
+                    <a:noFill/>
+                  </a:rPr>
+                  <a:t> </a:t>
+                </a:r>
+              </a:p>
+            </p:txBody>
+          </p:sp>
+        </mc:Fallback>
+      </mc:AlternateContent>
+      <p:sp>
+        <p:nvSpPr>
+          <p:cNvPr id="10" name="TextBox 9">
+            <a:extLst>
+              <a:ext uri="{FF2B5EF4-FFF2-40B4-BE49-F238E27FC236}">
+                <a16:creationId xmlns:a16="http://schemas.microsoft.com/office/drawing/2014/main" id="{8A86FFFA-E42B-FC0D-2DFC-7F2C9E27D929}"/>
+              </a:ext>
+            </a:extLst>
+          </p:cNvPr>
+          <p:cNvSpPr txBox="1"/>
+          <p:nvPr/>
+        </p:nvSpPr>
+        <p:spPr>
+          <a:xfrm>
+            <a:off x="1137424" y="1754975"/>
+            <a:ext cx="1909647" cy="369332"/>
+          </a:xfrm>
+          <a:prstGeom prst="rect">
+            <a:avLst/>
+          </a:prstGeom>
+          <a:noFill/>
+        </p:spPr>
+        <p:txBody>
+          <a:bodyPr wrap="square" rtlCol="0">
+            <a:spAutoFit/>
+          </a:bodyPr>
+          <a:lstStyle/>
+          <a:p>
+            <a:r>
+              <a:rPr lang="en-US" dirty="0">
+                <a:latin typeface="Times New Roman" panose="02020603050405020304" pitchFamily="18" charset="0"/>
+                <a:cs typeface="Times New Roman" panose="02020603050405020304" pitchFamily="18" charset="0"/>
+              </a:rPr>
+              <a:t>If an attacker have</a:t>
+            </a:r>
+          </a:p>
+        </p:txBody>
+      </p:sp>
+      <p:sp>
+        <p:nvSpPr>
+          <p:cNvPr id="11" name="TextBox 10">
+            <a:extLst>
+              <a:ext uri="{FF2B5EF4-FFF2-40B4-BE49-F238E27FC236}">
+                <a16:creationId xmlns:a16="http://schemas.microsoft.com/office/drawing/2014/main" id="{9DABADD3-63EE-DAB2-2A16-3A8ACBF24F80}"/>
+              </a:ext>
+            </a:extLst>
+          </p:cNvPr>
+          <p:cNvSpPr txBox="1"/>
+          <p:nvPr/>
+        </p:nvSpPr>
+        <p:spPr>
+          <a:xfrm>
+            <a:off x="6243753" y="1783606"/>
+            <a:ext cx="3175309" cy="369332"/>
+          </a:xfrm>
+          <a:prstGeom prst="rect">
+            <a:avLst/>
+          </a:prstGeom>
+          <a:noFill/>
+        </p:spPr>
+        <p:txBody>
+          <a:bodyPr wrap="square" rtlCol="0">
+            <a:spAutoFit/>
+          </a:bodyPr>
+          <a:lstStyle/>
+          <a:p>
+            <a:r>
+              <a:rPr lang="en-US" dirty="0">
+                <a:latin typeface="Times New Roman" panose="02020603050405020304" pitchFamily="18" charset="0"/>
+                <a:cs typeface="Times New Roman" panose="02020603050405020304" pitchFamily="18" charset="0"/>
+              </a:rPr>
+              <a:t>Couples of plaintext/ciphertext</a:t>
+            </a:r>
+          </a:p>
+        </p:txBody>
+      </p:sp>
+      <mc:AlternateContent xmlns:mc="http://schemas.openxmlformats.org/markup-compatibility/2006">
+        <mc:Choice xmlns:a14="http://schemas.microsoft.com/office/drawing/2010/main" Requires="a14">
+          <p:sp>
+            <p:nvSpPr>
+              <p:cNvPr id="13" name="TextBox 12">
+                <a:extLst>
+                  <a:ext uri="{FF2B5EF4-FFF2-40B4-BE49-F238E27FC236}">
+                    <a16:creationId xmlns:a16="http://schemas.microsoft.com/office/drawing/2014/main" id="{62DD0BCB-5F77-9F2D-20CA-082BCD17CFFC}"/>
+                  </a:ext>
+                </a:extLst>
+              </p:cNvPr>
+              <p:cNvSpPr txBox="1"/>
+              <p:nvPr/>
+            </p:nvSpPr>
+            <p:spPr>
+              <a:xfrm>
+                <a:off x="1137424" y="2306826"/>
+                <a:ext cx="8281638" cy="369332"/>
+              </a:xfrm>
+              <a:prstGeom prst="rect">
+                <a:avLst/>
+              </a:prstGeom>
+              <a:noFill/>
+            </p:spPr>
+            <p:txBody>
+              <a:bodyPr wrap="square">
+                <a:spAutoFit/>
+              </a:bodyPr>
+              <a:lstStyle/>
+              <a:p>
+                <a:r>
+                  <a:rPr lang="en-US" dirty="0">
+                    <a:latin typeface="Times New Roman" panose="02020603050405020304" pitchFamily="18" charset="0"/>
+                    <a:cs typeface="Times New Roman" panose="02020603050405020304" pitchFamily="18" charset="0"/>
+                  </a:rPr>
+                  <a:t>he can recover the secret key </a:t>
+                </a:r>
+                <a14:m>
+                  <m:oMath xmlns:m="http://schemas.openxmlformats.org/officeDocument/2006/math">
+                    <m:r>
+                      <a:rPr lang="en-US" b="0" i="1" smtClean="0">
+                        <a:latin typeface="Cambria Math" panose="02040503050406030204" pitchFamily="18" charset="0"/>
+                        <a:cs typeface="Times New Roman" panose="02020603050405020304" pitchFamily="18" charset="0"/>
+                      </a:rPr>
+                      <m:t>𝑠</m:t>
+                    </m:r>
+                  </m:oMath>
+                </a14:m>
+                <a:r>
+                  <a:rPr lang="en-US" dirty="0"/>
+                  <a:t> </a:t>
+                </a:r>
+                <a:r>
+                  <a:rPr lang="en-US" dirty="0">
+                    <a:latin typeface="Times New Roman" panose="02020603050405020304" pitchFamily="18" charset="0"/>
+                    <a:cs typeface="Times New Roman" panose="02020603050405020304" pitchFamily="18" charset="0"/>
+                  </a:rPr>
+                  <a:t>if these two independent events are satisfied</a:t>
+                </a:r>
+              </a:p>
+            </p:txBody>
+          </p:sp>
+        </mc:Choice>
+        <mc:Fallback>
+          <p:sp>
+            <p:nvSpPr>
+              <p:cNvPr id="13" name="TextBox 12">
+                <a:extLst>
+                  <a:ext uri="{FF2B5EF4-FFF2-40B4-BE49-F238E27FC236}">
+                    <a16:creationId xmlns:a16="http://schemas.microsoft.com/office/drawing/2014/main" id="{62DD0BCB-5F77-9F2D-20CA-082BCD17CFFC}"/>
+                  </a:ext>
+                </a:extLst>
+              </p:cNvPr>
+              <p:cNvSpPr txBox="1">
+                <a:spLocks noRot="1" noChangeAspect="1" noMove="1" noResize="1" noEditPoints="1" noAdjustHandles="1" noChangeArrowheads="1" noChangeShapeType="1" noTextEdit="1"/>
+              </p:cNvSpPr>
+              <p:nvPr/>
+            </p:nvSpPr>
+            <p:spPr>
+              <a:xfrm>
+                <a:off x="1137424" y="2306826"/>
+                <a:ext cx="8281638" cy="369332"/>
+              </a:xfrm>
+              <a:prstGeom prst="rect">
+                <a:avLst/>
+              </a:prstGeom>
+              <a:blipFill>
+                <a:blip r:embed="rId4"/>
+                <a:stretch>
+                  <a:fillRect l="-663" t="-9836" b="-22951"/>
+                </a:stretch>
+              </a:blipFill>
+            </p:spPr>
+            <p:txBody>
+              <a:bodyPr/>
+              <a:lstStyle/>
+              <a:p>
+                <a:r>
+                  <a:rPr lang="en-US">
+                    <a:noFill/>
+                  </a:rPr>
+                  <a:t> </a:t>
+                </a:r>
+              </a:p>
+            </p:txBody>
+          </p:sp>
+        </mc:Fallback>
+      </mc:AlternateContent>
+      <p:sp>
+        <p:nvSpPr>
+          <p:cNvPr id="14" name="Left Brace 13">
+            <a:extLst>
+              <a:ext uri="{FF2B5EF4-FFF2-40B4-BE49-F238E27FC236}">
+                <a16:creationId xmlns:a16="http://schemas.microsoft.com/office/drawing/2014/main" id="{8F04445C-24FA-10F2-1C79-157FA39F33BF}"/>
+              </a:ext>
+            </a:extLst>
+          </p:cNvPr>
+          <p:cNvSpPr/>
+          <p:nvPr/>
+        </p:nvSpPr>
+        <p:spPr>
+          <a:xfrm>
+            <a:off x="1137424" y="2821259"/>
+            <a:ext cx="223025" cy="869703"/>
+          </a:xfrm>
+          <a:prstGeom prst="leftBrace">
+            <a:avLst/>
+          </a:prstGeom>
+        </p:spPr>
+        <p:style>
+          <a:lnRef idx="1">
+            <a:schemeClr val="accent1"/>
+          </a:lnRef>
+          <a:fillRef idx="0">
+            <a:schemeClr val="accent1"/>
+          </a:fillRef>
+          <a:effectRef idx="0">
+            <a:schemeClr val="accent1"/>
+          </a:effectRef>
+          <a:fontRef idx="minor">
+            <a:schemeClr val="tx1"/>
+          </a:fontRef>
+        </p:style>
+        <p:txBody>
+          <a:bodyPr rtlCol="0" anchor="ctr"/>
+          <a:lstStyle/>
+          <a:p>
+            <a:pPr algn="ctr"/>
+            <a:endParaRPr lang="en-US"/>
+          </a:p>
+        </p:txBody>
+      </p:sp>
+      <mc:AlternateContent xmlns:mc="http://schemas.openxmlformats.org/markup-compatibility/2006">
+        <mc:Choice xmlns:a14="http://schemas.microsoft.com/office/drawing/2010/main" Requires="a14">
+          <p:sp>
+            <p:nvSpPr>
+              <p:cNvPr id="16" name="TextBox 15">
+                <a:extLst>
+                  <a:ext uri="{FF2B5EF4-FFF2-40B4-BE49-F238E27FC236}">
+                    <a16:creationId xmlns:a16="http://schemas.microsoft.com/office/drawing/2014/main" id="{6BC0D285-2B5D-2D12-0110-51BA0CB64FF6}"/>
+                  </a:ext>
+                </a:extLst>
+              </p:cNvPr>
+              <p:cNvSpPr txBox="1"/>
+              <p:nvPr/>
+            </p:nvSpPr>
+            <p:spPr>
+              <a:xfrm>
+                <a:off x="2541547" y="4181843"/>
+                <a:ext cx="7404412" cy="461665"/>
+              </a:xfrm>
+              <a:prstGeom prst="rect">
+                <a:avLst/>
+              </a:prstGeom>
+              <a:noFill/>
+            </p:spPr>
+            <p:txBody>
+              <a:bodyPr wrap="square">
+                <a:spAutoFit/>
+              </a:bodyPr>
+              <a:lstStyle/>
+              <a:p>
+                <a:pPr/>
+                <a14:m>
+                  <m:oMathPara xmlns:m="http://schemas.openxmlformats.org/officeDocument/2006/math">
+                    <m:oMathParaPr>
+                      <m:jc m:val="centerGroup"/>
+                    </m:oMathParaPr>
+                    <m:oMath xmlns:m="http://schemas.openxmlformats.org/officeDocument/2006/math">
+                      <m:r>
+                        <a:rPr lang="en-US" sz="2400" i="1" smtClean="0">
+                          <a:latin typeface="Cambria Math" panose="02040503050406030204" pitchFamily="18" charset="0"/>
+                        </a:rPr>
+                        <m:t>𝑃</m:t>
+                      </m:r>
+                      <m:d>
+                        <m:dPr>
+                          <m:ctrlPr>
+                            <a:rPr lang="en-US" sz="2400" i="1">
+                              <a:latin typeface="Cambria Math" panose="02040503050406030204" pitchFamily="18" charset="0"/>
+                            </a:rPr>
+                          </m:ctrlPr>
+                        </m:dPr>
+                        <m:e>
+                          <m:r>
+                            <a:rPr lang="en-US" sz="2400" b="0" i="1" smtClean="0">
+                              <a:latin typeface="Cambria Math" panose="02040503050406030204" pitchFamily="18" charset="0"/>
+                            </a:rPr>
+                            <m:t>𝑘𝑒𝑦</m:t>
+                          </m:r>
+                          <m:r>
+                            <a:rPr lang="en-US" sz="2400" b="0" i="1" smtClean="0">
+                              <a:latin typeface="Cambria Math" panose="02040503050406030204" pitchFamily="18" charset="0"/>
+                            </a:rPr>
+                            <m:t> </m:t>
+                          </m:r>
+                          <m:r>
+                            <a:rPr lang="en-US" sz="2400" b="0" i="1" smtClean="0">
+                              <a:latin typeface="Cambria Math" panose="02040503050406030204" pitchFamily="18" charset="0"/>
+                            </a:rPr>
+                            <m:t>𝑟𝑒𝑐𝑜𝑣𝑒𝑟𝑦</m:t>
+                          </m:r>
+                        </m:e>
+                      </m:d>
+                      <m:r>
+                        <a:rPr lang="en-US" sz="2400" b="0" i="1" smtClean="0">
+                          <a:latin typeface="Cambria Math" panose="02040503050406030204" pitchFamily="18" charset="0"/>
+                        </a:rPr>
+                        <m:t>=</m:t>
+                      </m:r>
+                      <m:r>
+                        <a:rPr lang="en-US" sz="2400" b="0" i="1" smtClean="0">
+                          <a:latin typeface="Cambria Math" panose="02040503050406030204" pitchFamily="18" charset="0"/>
+                        </a:rPr>
+                        <m:t>𝑃</m:t>
+                      </m:r>
+                      <m:d>
+                        <m:dPr>
+                          <m:ctrlPr>
+                            <a:rPr lang="en-US" sz="2400" b="0" i="1" smtClean="0">
+                              <a:latin typeface="Cambria Math" panose="02040503050406030204" pitchFamily="18" charset="0"/>
+                            </a:rPr>
+                          </m:ctrlPr>
+                        </m:dPr>
+                        <m:e>
+                          <m:sSub>
+                            <m:sSubPr>
+                              <m:ctrlPr>
+                                <a:rPr lang="en-US" sz="2400" i="1">
+                                  <a:latin typeface="Cambria Math" panose="02040503050406030204" pitchFamily="18" charset="0"/>
+                                </a:rPr>
+                              </m:ctrlPr>
+                            </m:sSubPr>
+                            <m:e>
+                              <m:r>
+                                <a:rPr lang="en-US" sz="2400" i="1">
+                                  <a:latin typeface="Cambria Math" panose="02040503050406030204" pitchFamily="18" charset="0"/>
+                                </a:rPr>
+                                <m:t>𝐸</m:t>
+                              </m:r>
+                            </m:e>
+                            <m:sub>
+                              <m:r>
+                                <a:rPr lang="en-US" sz="2400">
+                                  <a:latin typeface="Cambria Math" panose="02040503050406030204" pitchFamily="18" charset="0"/>
+                                </a:rPr>
+                                <m:t>1</m:t>
+                              </m:r>
+                            </m:sub>
+                          </m:sSub>
+                          <m:r>
+                            <a:rPr lang="en-US" sz="2400" i="1" smtClean="0">
+                              <a:latin typeface="Cambria Math" panose="02040503050406030204" pitchFamily="18" charset="0"/>
+                              <a:ea typeface="Cambria Math" panose="02040503050406030204" pitchFamily="18" charset="0"/>
+                            </a:rPr>
+                            <m:t>∩</m:t>
+                          </m:r>
+                          <m:sSub>
+                            <m:sSubPr>
+                              <m:ctrlPr>
+                                <a:rPr lang="en-US" sz="2400" i="1">
+                                  <a:latin typeface="Cambria Math" panose="02040503050406030204" pitchFamily="18" charset="0"/>
+                                </a:rPr>
+                              </m:ctrlPr>
+                            </m:sSubPr>
+                            <m:e>
+                              <m:r>
+                                <a:rPr lang="en-US" sz="2400" i="1">
+                                  <a:latin typeface="Cambria Math" panose="02040503050406030204" pitchFamily="18" charset="0"/>
+                                </a:rPr>
+                                <m:t>𝐸</m:t>
+                              </m:r>
+                            </m:e>
+                            <m:sub>
+                              <m:r>
+                                <a:rPr lang="en-US" sz="2400">
+                                  <a:latin typeface="Cambria Math" panose="02040503050406030204" pitchFamily="18" charset="0"/>
+                                </a:rPr>
+                                <m:t>2</m:t>
+                              </m:r>
+                            </m:sub>
+                          </m:sSub>
+                        </m:e>
+                      </m:d>
+                      <m:r>
+                        <a:rPr lang="en-US" sz="2400" b="0" i="1" smtClean="0">
+                          <a:latin typeface="Cambria Math" panose="02040503050406030204" pitchFamily="18" charset="0"/>
+                        </a:rPr>
+                        <m:t>=</m:t>
+                      </m:r>
+                      <m:r>
+                        <a:rPr lang="en-US" sz="2400" i="1" smtClean="0">
+                          <a:latin typeface="Cambria Math" panose="02040503050406030204" pitchFamily="18" charset="0"/>
+                        </a:rPr>
+                        <m:t>𝑃</m:t>
+                      </m:r>
+                      <m:d>
+                        <m:dPr>
+                          <m:ctrlPr>
+                            <a:rPr lang="en-US" sz="2400" i="1">
+                              <a:latin typeface="Cambria Math" panose="02040503050406030204" pitchFamily="18" charset="0"/>
+                            </a:rPr>
+                          </m:ctrlPr>
+                        </m:dPr>
+                        <m:e>
+                          <m:sSub>
+                            <m:sSubPr>
+                              <m:ctrlPr>
+                                <a:rPr lang="en-US" sz="2400" i="1">
+                                  <a:latin typeface="Cambria Math" panose="02040503050406030204" pitchFamily="18" charset="0"/>
+                                </a:rPr>
+                              </m:ctrlPr>
+                            </m:sSubPr>
+                            <m:e>
+                              <m:r>
+                                <a:rPr lang="en-US" sz="2400" i="1">
+                                  <a:latin typeface="Cambria Math" panose="02040503050406030204" pitchFamily="18" charset="0"/>
+                                </a:rPr>
+                                <m:t>𝐸</m:t>
+                              </m:r>
+                            </m:e>
+                            <m:sub>
+                              <m:r>
+                                <a:rPr lang="en-US" sz="2400" i="0">
+                                  <a:latin typeface="Cambria Math" panose="02040503050406030204" pitchFamily="18" charset="0"/>
+                                </a:rPr>
+                                <m:t>1</m:t>
+                              </m:r>
+                            </m:sub>
+                          </m:sSub>
+                        </m:e>
+                      </m:d>
+                      <m:r>
+                        <a:rPr lang="en-US" sz="2400" i="0">
+                          <a:latin typeface="Cambria Math" panose="02040503050406030204" pitchFamily="18" charset="0"/>
+                        </a:rPr>
+                        <m:t>×</m:t>
+                      </m:r>
+                      <m:r>
+                        <a:rPr lang="en-US" sz="2400" i="1">
+                          <a:latin typeface="Cambria Math" panose="02040503050406030204" pitchFamily="18" charset="0"/>
+                        </a:rPr>
+                        <m:t>𝑃</m:t>
+                      </m:r>
+                      <m:d>
+                        <m:dPr>
+                          <m:ctrlPr>
+                            <a:rPr lang="en-US" sz="2400" i="1">
+                              <a:latin typeface="Cambria Math" panose="02040503050406030204" pitchFamily="18" charset="0"/>
+                            </a:rPr>
+                          </m:ctrlPr>
+                        </m:dPr>
+                        <m:e>
+                          <m:sSub>
+                            <m:sSubPr>
+                              <m:ctrlPr>
+                                <a:rPr lang="en-US" sz="2400" i="1">
+                                  <a:latin typeface="Cambria Math" panose="02040503050406030204" pitchFamily="18" charset="0"/>
+                                </a:rPr>
+                              </m:ctrlPr>
+                            </m:sSubPr>
+                            <m:e>
+                              <m:r>
+                                <a:rPr lang="en-US" sz="2400" i="1">
+                                  <a:latin typeface="Cambria Math" panose="02040503050406030204" pitchFamily="18" charset="0"/>
+                                </a:rPr>
+                                <m:t>𝐸</m:t>
+                              </m:r>
+                            </m:e>
+                            <m:sub>
+                              <m:r>
+                                <a:rPr lang="en-US" sz="2400" i="0">
+                                  <a:latin typeface="Cambria Math" panose="02040503050406030204" pitchFamily="18" charset="0"/>
+                                </a:rPr>
+                                <m:t>2</m:t>
+                              </m:r>
+                            </m:sub>
+                          </m:sSub>
+                        </m:e>
+                      </m:d>
+                    </m:oMath>
+                  </m:oMathPara>
+                </a14:m>
+                <a:endParaRPr lang="en-US" sz="2400" dirty="0"/>
+              </a:p>
+            </p:txBody>
+          </p:sp>
+        </mc:Choice>
+        <mc:Fallback>
+          <p:sp>
+            <p:nvSpPr>
+              <p:cNvPr id="16" name="TextBox 15">
+                <a:extLst>
+                  <a:ext uri="{FF2B5EF4-FFF2-40B4-BE49-F238E27FC236}">
+                    <a16:creationId xmlns:a16="http://schemas.microsoft.com/office/drawing/2014/main" id="{6BC0D285-2B5D-2D12-0110-51BA0CB64FF6}"/>
+                  </a:ext>
+                </a:extLst>
+              </p:cNvPr>
+              <p:cNvSpPr txBox="1">
+                <a:spLocks noRot="1" noChangeAspect="1" noMove="1" noResize="1" noEditPoints="1" noAdjustHandles="1" noChangeArrowheads="1" noChangeShapeType="1" noTextEdit="1"/>
+              </p:cNvSpPr>
+              <p:nvPr/>
+            </p:nvSpPr>
+            <p:spPr>
+              <a:xfrm>
+                <a:off x="2541547" y="4181843"/>
+                <a:ext cx="7404412" cy="461665"/>
+              </a:xfrm>
+              <a:prstGeom prst="rect">
+                <a:avLst/>
+              </a:prstGeom>
+              <a:blipFill>
+                <a:blip r:embed="rId5"/>
+                <a:stretch>
+                  <a:fillRect b="-17105"/>
+                </a:stretch>
+              </a:blipFill>
+            </p:spPr>
+            <p:txBody>
+              <a:bodyPr/>
+              <a:lstStyle/>
+              <a:p>
+                <a:r>
+                  <a:rPr lang="en-US">
+                    <a:noFill/>
+                  </a:rPr>
+                  <a:t> </a:t>
+                </a:r>
+              </a:p>
+            </p:txBody>
+          </p:sp>
+        </mc:Fallback>
+      </mc:AlternateContent>
     </p:spTree>
     <p:extLst>
       <p:ext uri="{BB962C8B-B14F-4D97-AF65-F5344CB8AC3E}">
-        <p14:creationId xmlns:p14="http://schemas.microsoft.com/office/powerpoint/2010/main" val="2045844611"/>
+        <p14:creationId xmlns:p14="http://schemas.microsoft.com/office/powerpoint/2010/main" val="4048112115"/>
       </p:ext>
     </p:extLst>
   </p:cSld>
@@ -21939,7 +24109,7 @@
 </p:sld>
 </file>
 
-<file path=ppt/slides/slide20.xml><?xml version="1.0" encoding="utf-8"?>
+<file path=ppt/slides/slide22.xml><?xml version="1.0" encoding="utf-8"?>
 <p:sld xmlns:a="http://schemas.openxmlformats.org/drawingml/2006/main" xmlns:r="http://schemas.openxmlformats.org/officeDocument/2006/relationships" xmlns:p="http://schemas.openxmlformats.org/presentationml/2006/main">
   <p:cSld>
     <p:spTree>
@@ -22027,7 +24197,7 @@
                   <a:schemeClr val="tx1"/>
                 </a:solidFill>
               </a:rPr>
-              <a:t>11/23/2025</a:t>
+              <a:t>11/24/2025</a:t>
             </a:fld>
             <a:endParaRPr lang="en-US" sz="1600" dirty="0">
               <a:solidFill>
@@ -22096,7 +24266,7 @@
                   <a:schemeClr val="tx1"/>
                 </a:solidFill>
               </a:rPr>
-              <a:t>20</a:t>
+              <a:t>22</a:t>
             </a:fld>
             <a:endParaRPr lang="en-US" sz="1400" dirty="0">
               <a:solidFill>
@@ -22106,6 +24276,947 @@
           </a:p>
         </p:txBody>
       </p:sp>
+      <p:sp>
+        <p:nvSpPr>
+          <p:cNvPr id="3" name="Rectangle 2">
+            <a:extLst>
+              <a:ext uri="{FF2B5EF4-FFF2-40B4-BE49-F238E27FC236}">
+                <a16:creationId xmlns:a16="http://schemas.microsoft.com/office/drawing/2014/main" id="{0DF5CC87-829C-7161-48D2-E12213B11CD9}"/>
+              </a:ext>
+            </a:extLst>
+          </p:cNvPr>
+          <p:cNvSpPr/>
+          <p:nvPr/>
+        </p:nvSpPr>
+        <p:spPr>
+          <a:xfrm>
+            <a:off x="2992370" y="5171562"/>
+            <a:ext cx="6989830" cy="365125"/>
+          </a:xfrm>
+          <a:prstGeom prst="rect">
+            <a:avLst/>
+          </a:prstGeom>
+        </p:spPr>
+        <p:style>
+          <a:lnRef idx="2">
+            <a:schemeClr val="accent1">
+              <a:shade val="15000"/>
+            </a:schemeClr>
+          </a:lnRef>
+          <a:fillRef idx="1">
+            <a:schemeClr val="accent1"/>
+          </a:fillRef>
+          <a:effectRef idx="0">
+            <a:schemeClr val="accent1"/>
+          </a:effectRef>
+          <a:fontRef idx="minor">
+            <a:schemeClr val="lt1"/>
+          </a:fontRef>
+        </p:style>
+        <p:txBody>
+          <a:bodyPr rtlCol="0" anchor="ctr"/>
+          <a:lstStyle/>
+          <a:p>
+            <a:pPr algn="ctr"/>
+            <a:r>
+              <a:rPr lang="en-US" sz="2400" b="1" dirty="0">
+                <a:effectLst>
+                  <a:outerShdw blurRad="38100" dist="38100" dir="2700000" algn="tl">
+                    <a:srgbClr val="000000">
+                      <a:alpha val="43137"/>
+                    </a:srgbClr>
+                  </a:outerShdw>
+                </a:effectLst>
+                <a:latin typeface="Times New Roman" panose="02020603050405020304" pitchFamily="18" charset="0"/>
+                <a:cs typeface="Times New Roman" panose="02020603050405020304" pitchFamily="18" charset="0"/>
+              </a:rPr>
+              <a:t>Vulnerable to couple plaintext/ciphertext attack !!!</a:t>
+            </a:r>
+          </a:p>
+        </p:txBody>
+      </p:sp>
+      <mc:AlternateContent xmlns:mc="http://schemas.openxmlformats.org/markup-compatibility/2006">
+        <mc:Choice xmlns:a14="http://schemas.microsoft.com/office/drawing/2010/main" Requires="a14">
+          <p:sp>
+            <p:nvSpPr>
+              <p:cNvPr id="8" name="TextBox 7">
+                <a:extLst>
+                  <a:ext uri="{FF2B5EF4-FFF2-40B4-BE49-F238E27FC236}">
+                    <a16:creationId xmlns:a16="http://schemas.microsoft.com/office/drawing/2014/main" id="{3ED8EBE1-EAFC-9E05-B000-F61EA565781C}"/>
+                  </a:ext>
+                </a:extLst>
+              </p:cNvPr>
+              <p:cNvSpPr txBox="1"/>
+              <p:nvPr/>
+            </p:nvSpPr>
+            <p:spPr>
+              <a:xfrm>
+                <a:off x="7480146" y="2088145"/>
+                <a:ext cx="3955894" cy="664862"/>
+              </a:xfrm>
+              <a:prstGeom prst="rect">
+                <a:avLst/>
+              </a:prstGeom>
+              <a:noFill/>
+            </p:spPr>
+            <p:txBody>
+              <a:bodyPr wrap="square">
+                <a:spAutoFit/>
+              </a:bodyPr>
+              <a:lstStyle/>
+              <a:p>
+                <a:pPr/>
+                <a14:m>
+                  <m:oMathPara xmlns:m="http://schemas.openxmlformats.org/officeDocument/2006/math">
+                    <m:oMathParaPr>
+                      <m:jc m:val="centerGroup"/>
+                    </m:oMathParaPr>
+                    <m:oMath xmlns:m="http://schemas.openxmlformats.org/officeDocument/2006/math">
+                      <m:r>
+                        <a:rPr lang="en-US" i="1" smtClean="0">
+                          <a:latin typeface="Cambria Math" panose="02040503050406030204" pitchFamily="18" charset="0"/>
+                        </a:rPr>
+                        <m:t>𝑃</m:t>
+                      </m:r>
+                      <m:d>
+                        <m:dPr>
+                          <m:ctrlPr>
+                            <a:rPr lang="en-US" i="1">
+                              <a:latin typeface="Cambria Math" panose="02040503050406030204" pitchFamily="18" charset="0"/>
+                            </a:rPr>
+                          </m:ctrlPr>
+                        </m:dPr>
+                        <m:e>
+                          <m:sSub>
+                            <m:sSubPr>
+                              <m:ctrlPr>
+                                <a:rPr lang="en-US" b="0" i="1" smtClean="0">
+                                  <a:latin typeface="Cambria Math" panose="02040503050406030204" pitchFamily="18" charset="0"/>
+                                </a:rPr>
+                              </m:ctrlPr>
+                            </m:sSubPr>
+                            <m:e>
+                              <m:r>
+                                <a:rPr lang="en-US" b="0" i="1" smtClean="0">
+                                  <a:latin typeface="Cambria Math" panose="02040503050406030204" pitchFamily="18" charset="0"/>
+                                </a:rPr>
+                                <m:t>𝐸</m:t>
+                              </m:r>
+                            </m:e>
+                            <m:sub>
+                              <m:r>
+                                <a:rPr lang="en-US" b="0" i="1" smtClean="0">
+                                  <a:latin typeface="Cambria Math" panose="02040503050406030204" pitchFamily="18" charset="0"/>
+                                </a:rPr>
+                                <m:t>2</m:t>
+                              </m:r>
+                            </m:sub>
+                          </m:sSub>
+                        </m:e>
+                      </m:d>
+                      <m:r>
+                        <a:rPr lang="en-US" i="0">
+                          <a:latin typeface="Cambria Math" panose="02040503050406030204" pitchFamily="18" charset="0"/>
+                        </a:rPr>
+                        <m:t>=</m:t>
+                      </m:r>
+                      <m:nary>
+                        <m:naryPr>
+                          <m:chr m:val="∏"/>
+                          <m:limLoc m:val="subSup"/>
+                          <m:ctrlPr>
+                            <a:rPr lang="en-US" i="1">
+                              <a:latin typeface="Cambria Math" panose="02040503050406030204" pitchFamily="18" charset="0"/>
+                            </a:rPr>
+                          </m:ctrlPr>
+                        </m:naryPr>
+                        <m:sub>
+                          <m:r>
+                            <a:rPr lang="en-US" i="1">
+                              <a:latin typeface="Cambria Math" panose="02040503050406030204" pitchFamily="18" charset="0"/>
+                            </a:rPr>
+                            <m:t>𝑘</m:t>
+                          </m:r>
+                          <m:r>
+                            <a:rPr lang="en-US" i="0">
+                              <a:latin typeface="Cambria Math" panose="02040503050406030204" pitchFamily="18" charset="0"/>
+                            </a:rPr>
+                            <m:t>=1</m:t>
+                          </m:r>
+                        </m:sub>
+                        <m:sup>
+                          <m:r>
+                            <a:rPr lang="en-US" i="1">
+                              <a:latin typeface="Cambria Math" panose="02040503050406030204" pitchFamily="18" charset="0"/>
+                            </a:rPr>
+                            <m:t>𝑑</m:t>
+                          </m:r>
+                        </m:sup>
+                        <m:e>
+                          <m:d>
+                            <m:dPr>
+                              <m:ctrlPr>
+                                <a:rPr lang="en-US" i="1">
+                                  <a:latin typeface="Cambria Math" panose="02040503050406030204" pitchFamily="18" charset="0"/>
+                                </a:rPr>
+                              </m:ctrlPr>
+                            </m:dPr>
+                            <m:e>
+                              <m:r>
+                                <a:rPr lang="en-US" i="0">
+                                  <a:latin typeface="Cambria Math" panose="02040503050406030204" pitchFamily="18" charset="0"/>
+                                </a:rPr>
+                                <m:t>1−</m:t>
+                              </m:r>
+                              <m:sSup>
+                                <m:sSupPr>
+                                  <m:ctrlPr>
+                                    <a:rPr lang="en-US" i="1">
+                                      <a:latin typeface="Cambria Math" panose="02040503050406030204" pitchFamily="18" charset="0"/>
+                                    </a:rPr>
+                                  </m:ctrlPr>
+                                </m:sSupPr>
+                                <m:e>
+                                  <m:r>
+                                    <a:rPr lang="en-US" i="0">
+                                      <a:latin typeface="Cambria Math" panose="02040503050406030204" pitchFamily="18" charset="0"/>
+                                    </a:rPr>
+                                    <m:t>2</m:t>
+                                  </m:r>
+                                </m:e>
+                                <m:sup>
+                                  <m:r>
+                                    <a:rPr lang="en-US" i="0">
+                                      <a:latin typeface="Cambria Math" panose="02040503050406030204" pitchFamily="18" charset="0"/>
+                                    </a:rPr>
+                                    <m:t>−</m:t>
+                                  </m:r>
+                                  <m:r>
+                                    <a:rPr lang="en-US" i="1">
+                                      <a:latin typeface="Cambria Math" panose="02040503050406030204" pitchFamily="18" charset="0"/>
+                                    </a:rPr>
+                                    <m:t>𝑘</m:t>
+                                  </m:r>
+                                </m:sup>
+                              </m:sSup>
+                            </m:e>
+                          </m:d>
+                        </m:e>
+                      </m:nary>
+                      <m:r>
+                        <a:rPr lang="en-US" i="1" smtClean="0">
+                          <a:latin typeface="Cambria Math" panose="02040503050406030204" pitchFamily="18" charset="0"/>
+                          <a:ea typeface="Cambria Math" panose="02040503050406030204" pitchFamily="18" charset="0"/>
+                        </a:rPr>
+                        <m:t>≈</m:t>
+                      </m:r>
+                      <m:r>
+                        <a:rPr lang="en-US" b="0" i="1" smtClean="0">
+                          <a:latin typeface="Cambria Math" panose="02040503050406030204" pitchFamily="18" charset="0"/>
+                          <a:ea typeface="Cambria Math" panose="02040503050406030204" pitchFamily="18" charset="0"/>
+                        </a:rPr>
+                        <m:t>29%</m:t>
+                      </m:r>
+                    </m:oMath>
+                  </m:oMathPara>
+                </a14:m>
+                <a:endParaRPr lang="en-US" dirty="0"/>
+              </a:p>
+            </p:txBody>
+          </p:sp>
+        </mc:Choice>
+        <mc:Fallback>
+          <p:sp>
+            <p:nvSpPr>
+              <p:cNvPr id="8" name="TextBox 7">
+                <a:extLst>
+                  <a:ext uri="{FF2B5EF4-FFF2-40B4-BE49-F238E27FC236}">
+                    <a16:creationId xmlns:a16="http://schemas.microsoft.com/office/drawing/2014/main" id="{3ED8EBE1-EAFC-9E05-B000-F61EA565781C}"/>
+                  </a:ext>
+                </a:extLst>
+              </p:cNvPr>
+              <p:cNvSpPr txBox="1">
+                <a:spLocks noRot="1" noChangeAspect="1" noMove="1" noResize="1" noEditPoints="1" noAdjustHandles="1" noChangeArrowheads="1" noChangeShapeType="1" noTextEdit="1"/>
+              </p:cNvSpPr>
+              <p:nvPr/>
+            </p:nvSpPr>
+            <p:spPr>
+              <a:xfrm>
+                <a:off x="7480146" y="2088145"/>
+                <a:ext cx="3955894" cy="664862"/>
+              </a:xfrm>
+              <a:prstGeom prst="rect">
+                <a:avLst/>
+              </a:prstGeom>
+              <a:blipFill>
+                <a:blip r:embed="rId2"/>
+                <a:stretch>
+                  <a:fillRect/>
+                </a:stretch>
+              </a:blipFill>
+            </p:spPr>
+            <p:txBody>
+              <a:bodyPr/>
+              <a:lstStyle/>
+              <a:p>
+                <a:r>
+                  <a:rPr lang="en-US">
+                    <a:noFill/>
+                  </a:rPr>
+                  <a:t> </a:t>
+                </a:r>
+              </a:p>
+            </p:txBody>
+          </p:sp>
+        </mc:Fallback>
+      </mc:AlternateContent>
+      <mc:AlternateContent xmlns:mc="http://schemas.openxmlformats.org/markup-compatibility/2006">
+        <mc:Choice xmlns:a14="http://schemas.microsoft.com/office/drawing/2010/main" Requires="a14">
+          <p:sp>
+            <p:nvSpPr>
+              <p:cNvPr id="10" name="TextBox 9">
+                <a:extLst>
+                  <a:ext uri="{FF2B5EF4-FFF2-40B4-BE49-F238E27FC236}">
+                    <a16:creationId xmlns:a16="http://schemas.microsoft.com/office/drawing/2014/main" id="{0298804A-8CEF-1786-2AB3-890A2EA9AFF5}"/>
+                  </a:ext>
+                </a:extLst>
+              </p:cNvPr>
+              <p:cNvSpPr txBox="1"/>
+              <p:nvPr/>
+            </p:nvSpPr>
+            <p:spPr>
+              <a:xfrm>
+                <a:off x="1182029" y="1934225"/>
+                <a:ext cx="4045104" cy="972702"/>
+              </a:xfrm>
+              <a:prstGeom prst="rect">
+                <a:avLst/>
+              </a:prstGeom>
+              <a:noFill/>
+            </p:spPr>
+            <p:txBody>
+              <a:bodyPr wrap="square">
+                <a:spAutoFit/>
+              </a:bodyPr>
+              <a:lstStyle/>
+              <a:p>
+                <a:pPr/>
+                <a14:m>
+                  <m:oMathPara xmlns:m="http://schemas.openxmlformats.org/officeDocument/2006/math">
+                    <m:oMathParaPr>
+                      <m:jc m:val="centerGroup"/>
+                    </m:oMathParaPr>
+                    <m:oMath xmlns:m="http://schemas.openxmlformats.org/officeDocument/2006/math">
+                      <m:r>
+                        <a:rPr lang="en-US" i="1" smtClean="0">
+                          <a:latin typeface="Cambria Math" panose="02040503050406030204" pitchFamily="18" charset="0"/>
+                        </a:rPr>
+                        <m:t>𝑃</m:t>
+                      </m:r>
+                      <m:d>
+                        <m:dPr>
+                          <m:ctrlPr>
+                            <a:rPr lang="en-US" i="1">
+                              <a:latin typeface="Cambria Math" panose="02040503050406030204" pitchFamily="18" charset="0"/>
+                            </a:rPr>
+                          </m:ctrlPr>
+                        </m:dPr>
+                        <m:e>
+                          <m:sSub>
+                            <m:sSubPr>
+                              <m:ctrlPr>
+                                <a:rPr lang="en-US" i="1">
+                                  <a:latin typeface="Cambria Math" panose="02040503050406030204" pitchFamily="18" charset="0"/>
+                                </a:rPr>
+                              </m:ctrlPr>
+                            </m:sSubPr>
+                            <m:e>
+                              <m:r>
+                                <a:rPr lang="en-US" i="1">
+                                  <a:latin typeface="Cambria Math" panose="02040503050406030204" pitchFamily="18" charset="0"/>
+                                </a:rPr>
+                                <m:t>𝐸</m:t>
+                              </m:r>
+                            </m:e>
+                            <m:sub>
+                              <m:r>
+                                <a:rPr lang="en-US" i="0">
+                                  <a:latin typeface="Cambria Math" panose="02040503050406030204" pitchFamily="18" charset="0"/>
+                                </a:rPr>
+                                <m:t>1</m:t>
+                              </m:r>
+                            </m:sub>
+                          </m:sSub>
+                        </m:e>
+                      </m:d>
+                      <m:r>
+                        <a:rPr lang="en-US" i="0">
+                          <a:latin typeface="Cambria Math" panose="02040503050406030204" pitchFamily="18" charset="0"/>
+                        </a:rPr>
+                        <m:t>=</m:t>
+                      </m:r>
+                      <m:d>
+                        <m:dPr>
+                          <m:begChr m:val="["/>
+                          <m:endChr m:val="]"/>
+                          <m:ctrlPr>
+                            <a:rPr lang="en-US" i="1">
+                              <a:latin typeface="Cambria Math" panose="02040503050406030204" pitchFamily="18" charset="0"/>
+                            </a:rPr>
+                          </m:ctrlPr>
+                        </m:dPr>
+                        <m:e>
+                          <m:r>
+                            <a:rPr lang="en-US" i="0">
+                              <a:latin typeface="Cambria Math" panose="02040503050406030204" pitchFamily="18" charset="0"/>
+                            </a:rPr>
+                            <m:t>1−</m:t>
+                          </m:r>
+                          <m:sSup>
+                            <m:sSupPr>
+                              <m:ctrlPr>
+                                <a:rPr lang="en-US" i="1">
+                                  <a:latin typeface="Cambria Math" panose="02040503050406030204" pitchFamily="18" charset="0"/>
+                                </a:rPr>
+                              </m:ctrlPr>
+                            </m:sSupPr>
+                            <m:e>
+                              <m:d>
+                                <m:dPr>
+                                  <m:ctrlPr>
+                                    <a:rPr lang="en-US" i="1">
+                                      <a:latin typeface="Cambria Math" panose="02040503050406030204" pitchFamily="18" charset="0"/>
+                                    </a:rPr>
+                                  </m:ctrlPr>
+                                </m:dPr>
+                                <m:e>
+                                  <m:r>
+                                    <a:rPr lang="en-US" i="0">
+                                      <a:latin typeface="Cambria Math" panose="02040503050406030204" pitchFamily="18" charset="0"/>
+                                    </a:rPr>
+                                    <m:t>1−</m:t>
+                                  </m:r>
+                                  <m:f>
+                                    <m:fPr>
+                                      <m:ctrlPr>
+                                        <a:rPr lang="en-US" i="1">
+                                          <a:latin typeface="Cambria Math" panose="02040503050406030204" pitchFamily="18" charset="0"/>
+                                        </a:rPr>
+                                      </m:ctrlPr>
+                                    </m:fPr>
+                                    <m:num>
+                                      <m:r>
+                                        <a:rPr lang="en-US" i="0">
+                                          <a:latin typeface="Cambria Math" panose="02040503050406030204" pitchFamily="18" charset="0"/>
+                                        </a:rPr>
+                                        <m:t>6</m:t>
+                                      </m:r>
+                                    </m:num>
+                                    <m:den>
+                                      <m:sSup>
+                                        <m:sSupPr>
+                                          <m:ctrlPr>
+                                            <a:rPr lang="en-US" i="1">
+                                              <a:latin typeface="Cambria Math" panose="02040503050406030204" pitchFamily="18" charset="0"/>
+                                            </a:rPr>
+                                          </m:ctrlPr>
+                                        </m:sSupPr>
+                                        <m:e>
+                                          <m:r>
+                                            <a:rPr lang="en-US" i="1">
+                                              <a:latin typeface="Cambria Math" panose="02040503050406030204" pitchFamily="18" charset="0"/>
+                                            </a:rPr>
+                                            <m:t>𝜋</m:t>
+                                          </m:r>
+                                        </m:e>
+                                        <m:sup>
+                                          <m:r>
+                                            <a:rPr lang="en-US" i="0">
+                                              <a:latin typeface="Cambria Math" panose="02040503050406030204" pitchFamily="18" charset="0"/>
+                                            </a:rPr>
+                                            <m:t>2</m:t>
+                                          </m:r>
+                                        </m:sup>
+                                      </m:sSup>
+                                    </m:den>
+                                  </m:f>
+                                </m:e>
+                              </m:d>
+                            </m:e>
+                            <m:sup>
+                              <m:sSup>
+                                <m:sSupPr>
+                                  <m:ctrlPr>
+                                    <a:rPr lang="en-US" i="1">
+                                      <a:latin typeface="Cambria Math" panose="02040503050406030204" pitchFamily="18" charset="0"/>
+                                    </a:rPr>
+                                  </m:ctrlPr>
+                                </m:sSupPr>
+                                <m:e>
+                                  <m:r>
+                                    <a:rPr lang="en-US" i="1">
+                                      <a:latin typeface="Cambria Math" panose="02040503050406030204" pitchFamily="18" charset="0"/>
+                                    </a:rPr>
+                                    <m:t>𝜆</m:t>
+                                  </m:r>
+                                </m:e>
+                                <m:sup>
+                                  <m:r>
+                                    <a:rPr lang="en-US" i="0">
+                                      <a:latin typeface="Cambria Math" panose="02040503050406030204" pitchFamily="18" charset="0"/>
+                                    </a:rPr>
+                                    <m:t>2</m:t>
+                                  </m:r>
+                                </m:sup>
+                              </m:sSup>
+                            </m:sup>
+                          </m:sSup>
+                        </m:e>
+                      </m:d>
+                      <m:r>
+                        <a:rPr lang="en-US" i="1" smtClean="0">
+                          <a:latin typeface="Cambria Math" panose="02040503050406030204" pitchFamily="18" charset="0"/>
+                          <a:ea typeface="Cambria Math" panose="02040503050406030204" pitchFamily="18" charset="0"/>
+                        </a:rPr>
+                        <m:t>≈</m:t>
+                      </m:r>
+                      <m:r>
+                        <a:rPr lang="en-US" b="0" i="1" smtClean="0">
+                          <a:latin typeface="Cambria Math" panose="02040503050406030204" pitchFamily="18" charset="0"/>
+                          <a:ea typeface="Cambria Math" panose="02040503050406030204" pitchFamily="18" charset="0"/>
+                        </a:rPr>
+                        <m:t>100%</m:t>
+                      </m:r>
+                    </m:oMath>
+                  </m:oMathPara>
+                </a14:m>
+                <a:endParaRPr lang="en-US" dirty="0"/>
+              </a:p>
+            </p:txBody>
+          </p:sp>
+        </mc:Choice>
+        <mc:Fallback>
+          <p:sp>
+            <p:nvSpPr>
+              <p:cNvPr id="10" name="TextBox 9">
+                <a:extLst>
+                  <a:ext uri="{FF2B5EF4-FFF2-40B4-BE49-F238E27FC236}">
+                    <a16:creationId xmlns:a16="http://schemas.microsoft.com/office/drawing/2014/main" id="{0298804A-8CEF-1786-2AB3-890A2EA9AFF5}"/>
+                  </a:ext>
+                </a:extLst>
+              </p:cNvPr>
+              <p:cNvSpPr txBox="1">
+                <a:spLocks noRot="1" noChangeAspect="1" noMove="1" noResize="1" noEditPoints="1" noAdjustHandles="1" noChangeArrowheads="1" noChangeShapeType="1" noTextEdit="1"/>
+              </p:cNvSpPr>
+              <p:nvPr/>
+            </p:nvSpPr>
+            <p:spPr>
+              <a:xfrm>
+                <a:off x="1182029" y="1934225"/>
+                <a:ext cx="4045104" cy="972702"/>
+              </a:xfrm>
+              <a:prstGeom prst="rect">
+                <a:avLst/>
+              </a:prstGeom>
+              <a:blipFill>
+                <a:blip r:embed="rId3"/>
+                <a:stretch>
+                  <a:fillRect/>
+                </a:stretch>
+              </a:blipFill>
+            </p:spPr>
+            <p:txBody>
+              <a:bodyPr/>
+              <a:lstStyle/>
+              <a:p>
+                <a:r>
+                  <a:rPr lang="en-US">
+                    <a:noFill/>
+                  </a:rPr>
+                  <a:t> </a:t>
+                </a:r>
+              </a:p>
+            </p:txBody>
+          </p:sp>
+        </mc:Fallback>
+      </mc:AlternateContent>
+      <p:cxnSp>
+        <p:nvCxnSpPr>
+          <p:cNvPr id="12" name="Straight Arrow Connector 11">
+            <a:extLst>
+              <a:ext uri="{FF2B5EF4-FFF2-40B4-BE49-F238E27FC236}">
+                <a16:creationId xmlns:a16="http://schemas.microsoft.com/office/drawing/2014/main" id="{6F090CE8-628D-38BC-1A35-ED590F1D6F47}"/>
+              </a:ext>
+            </a:extLst>
+          </p:cNvPr>
+          <p:cNvCxnSpPr>
+            <a:cxnSpLocks/>
+          </p:cNvCxnSpPr>
+          <p:nvPr/>
+        </p:nvCxnSpPr>
+        <p:spPr>
+          <a:xfrm flipV="1">
+            <a:off x="3204581" y="2829967"/>
+            <a:ext cx="0" cy="816482"/>
+          </a:xfrm>
+          <a:prstGeom prst="straightConnector1">
+            <a:avLst/>
+          </a:prstGeom>
+          <a:ln>
+            <a:tailEnd type="triangle"/>
+          </a:ln>
+        </p:spPr>
+        <p:style>
+          <a:lnRef idx="1">
+            <a:schemeClr val="accent1"/>
+          </a:lnRef>
+          <a:fillRef idx="0">
+            <a:schemeClr val="accent1"/>
+          </a:fillRef>
+          <a:effectRef idx="0">
+            <a:schemeClr val="accent1"/>
+          </a:effectRef>
+          <a:fontRef idx="minor">
+            <a:schemeClr val="tx1"/>
+          </a:fontRef>
+        </p:style>
+      </p:cxnSp>
+      <p:cxnSp>
+        <p:nvCxnSpPr>
+          <p:cNvPr id="13" name="Straight Arrow Connector 12">
+            <a:extLst>
+              <a:ext uri="{FF2B5EF4-FFF2-40B4-BE49-F238E27FC236}">
+                <a16:creationId xmlns:a16="http://schemas.microsoft.com/office/drawing/2014/main" id="{4154E909-E6C9-BED6-D29C-048ACA7A883B}"/>
+              </a:ext>
+            </a:extLst>
+          </p:cNvPr>
+          <p:cNvCxnSpPr>
+            <a:cxnSpLocks/>
+          </p:cNvCxnSpPr>
+          <p:nvPr/>
+        </p:nvCxnSpPr>
+        <p:spPr>
+          <a:xfrm flipV="1">
+            <a:off x="9458093" y="2753007"/>
+            <a:ext cx="0" cy="893442"/>
+          </a:xfrm>
+          <a:prstGeom prst="straightConnector1">
+            <a:avLst/>
+          </a:prstGeom>
+          <a:ln>
+            <a:tailEnd type="triangle"/>
+          </a:ln>
+        </p:spPr>
+        <p:style>
+          <a:lnRef idx="1">
+            <a:schemeClr val="accent1"/>
+          </a:lnRef>
+          <a:fillRef idx="0">
+            <a:schemeClr val="accent1"/>
+          </a:fillRef>
+          <a:effectRef idx="0">
+            <a:schemeClr val="accent1"/>
+          </a:effectRef>
+          <a:fontRef idx="minor">
+            <a:schemeClr val="tx1"/>
+          </a:fontRef>
+        </p:style>
+      </p:cxnSp>
+      <mc:AlternateContent xmlns:mc="http://schemas.openxmlformats.org/markup-compatibility/2006">
+        <mc:Choice xmlns:a14="http://schemas.microsoft.com/office/drawing/2010/main" Requires="a14">
+          <p:sp>
+            <p:nvSpPr>
+              <p:cNvPr id="14" name="TextBox 13">
+                <a:extLst>
+                  <a:ext uri="{FF2B5EF4-FFF2-40B4-BE49-F238E27FC236}">
+                    <a16:creationId xmlns:a16="http://schemas.microsoft.com/office/drawing/2014/main" id="{60F1AE39-6ADA-2197-DE21-77B00B43F73D}"/>
+                  </a:ext>
+                </a:extLst>
+              </p:cNvPr>
+              <p:cNvSpPr txBox="1"/>
+              <p:nvPr/>
+            </p:nvSpPr>
+            <p:spPr>
+              <a:xfrm>
+                <a:off x="838200" y="3686948"/>
+                <a:ext cx="5172308" cy="369332"/>
+              </a:xfrm>
+              <a:prstGeom prst="rect">
+                <a:avLst/>
+              </a:prstGeom>
+              <a:noFill/>
+            </p:spPr>
+            <p:txBody>
+              <a:bodyPr wrap="square" rtlCol="0">
+                <a:spAutoFit/>
+              </a:bodyPr>
+              <a:lstStyle/>
+              <a:p>
+                <a:r>
+                  <a:rPr lang="en-US" dirty="0">
+                    <a:latin typeface="Times New Roman" panose="02020603050405020304" pitchFamily="18" charset="0"/>
+                    <a:cs typeface="Times New Roman" panose="02020603050405020304" pitchFamily="18" charset="0"/>
+                  </a:rPr>
+                  <a:t>This formula is reference (Vogel, 2010), take  </a:t>
+                </a:r>
+                <a14:m>
+                  <m:oMath xmlns:m="http://schemas.openxmlformats.org/officeDocument/2006/math">
+                    <m:r>
+                      <m:rPr>
+                        <m:sty m:val="p"/>
+                      </m:rPr>
+                      <a:rPr lang="el-GR" i="1" smtClean="0">
+                        <a:latin typeface="Cambria Math" panose="02040503050406030204" pitchFamily="18" charset="0"/>
+                      </a:rPr>
+                      <m:t>λ</m:t>
+                    </m:r>
+                    <m:r>
+                      <a:rPr lang="en-US" b="0" i="1" smtClean="0">
+                        <a:latin typeface="Cambria Math" panose="02040503050406030204" pitchFamily="18" charset="0"/>
+                      </a:rPr>
+                      <m:t>=10</m:t>
+                    </m:r>
+                  </m:oMath>
+                </a14:m>
+                <a:endParaRPr lang="en-US" dirty="0"/>
+              </a:p>
+            </p:txBody>
+          </p:sp>
+        </mc:Choice>
+        <mc:Fallback>
+          <p:sp>
+            <p:nvSpPr>
+              <p:cNvPr id="14" name="TextBox 13">
+                <a:extLst>
+                  <a:ext uri="{FF2B5EF4-FFF2-40B4-BE49-F238E27FC236}">
+                    <a16:creationId xmlns:a16="http://schemas.microsoft.com/office/drawing/2014/main" id="{60F1AE39-6ADA-2197-DE21-77B00B43F73D}"/>
+                  </a:ext>
+                </a:extLst>
+              </p:cNvPr>
+              <p:cNvSpPr txBox="1">
+                <a:spLocks noRot="1" noChangeAspect="1" noMove="1" noResize="1" noEditPoints="1" noAdjustHandles="1" noChangeArrowheads="1" noChangeShapeType="1" noTextEdit="1"/>
+              </p:cNvSpPr>
+              <p:nvPr/>
+            </p:nvSpPr>
+            <p:spPr>
+              <a:xfrm>
+                <a:off x="838200" y="3686948"/>
+                <a:ext cx="5172308" cy="369332"/>
+              </a:xfrm>
+              <a:prstGeom prst="rect">
+                <a:avLst/>
+              </a:prstGeom>
+              <a:blipFill>
+                <a:blip r:embed="rId4"/>
+                <a:stretch>
+                  <a:fillRect l="-1061" t="-11667" b="-25000"/>
+                </a:stretch>
+              </a:blipFill>
+            </p:spPr>
+            <p:txBody>
+              <a:bodyPr/>
+              <a:lstStyle/>
+              <a:p>
+                <a:r>
+                  <a:rPr lang="en-US">
+                    <a:noFill/>
+                  </a:rPr>
+                  <a:t> </a:t>
+                </a:r>
+              </a:p>
+            </p:txBody>
+          </p:sp>
+        </mc:Fallback>
+      </mc:AlternateContent>
+      <p:sp>
+        <p:nvSpPr>
+          <p:cNvPr id="15" name="TextBox 14">
+            <a:extLst>
+              <a:ext uri="{FF2B5EF4-FFF2-40B4-BE49-F238E27FC236}">
+                <a16:creationId xmlns:a16="http://schemas.microsoft.com/office/drawing/2014/main" id="{82299B3A-564B-260C-5C5F-2610FFC60640}"/>
+              </a:ext>
+            </a:extLst>
+          </p:cNvPr>
+          <p:cNvSpPr txBox="1"/>
+          <p:nvPr/>
+        </p:nvSpPr>
+        <p:spPr>
+          <a:xfrm>
+            <a:off x="7092179" y="3683623"/>
+            <a:ext cx="4549694" cy="369332"/>
+          </a:xfrm>
+          <a:prstGeom prst="rect">
+            <a:avLst/>
+          </a:prstGeom>
+          <a:noFill/>
+        </p:spPr>
+        <p:txBody>
+          <a:bodyPr wrap="square" rtlCol="0">
+            <a:spAutoFit/>
+          </a:bodyPr>
+          <a:lstStyle/>
+          <a:p>
+            <a:r>
+              <a:rPr lang="en-US" dirty="0">
+                <a:latin typeface="Times New Roman" panose="02020603050405020304" pitchFamily="18" charset="0"/>
+                <a:cs typeface="Times New Roman" panose="02020603050405020304" pitchFamily="18" charset="0"/>
+              </a:rPr>
+              <a:t>Ask me after presentation if interested why </a:t>
+            </a:r>
+            <a:r>
+              <a:rPr lang="en-US" dirty="0">
+                <a:latin typeface="Times New Roman" panose="02020603050405020304" pitchFamily="18" charset="0"/>
+                <a:cs typeface="Times New Roman" panose="02020603050405020304" pitchFamily="18" charset="0"/>
+                <a:sym typeface="Wingdings" panose="05000000000000000000" pitchFamily="2" charset="2"/>
+              </a:rPr>
+              <a:t> </a:t>
+            </a:r>
+            <a:endParaRPr lang="en-US" dirty="0">
+              <a:latin typeface="Times New Roman" panose="02020603050405020304" pitchFamily="18" charset="0"/>
+              <a:cs typeface="Times New Roman" panose="02020603050405020304" pitchFamily="18" charset="0"/>
+            </a:endParaRPr>
+          </a:p>
+        </p:txBody>
+      </p:sp>
+      <mc:AlternateContent xmlns:mc="http://schemas.openxmlformats.org/markup-compatibility/2006">
+        <mc:Choice xmlns:a14="http://schemas.microsoft.com/office/drawing/2010/main" Requires="a14">
+          <p:sp>
+            <p:nvSpPr>
+              <p:cNvPr id="19" name="TextBox 18">
+                <a:extLst>
+                  <a:ext uri="{FF2B5EF4-FFF2-40B4-BE49-F238E27FC236}">
+                    <a16:creationId xmlns:a16="http://schemas.microsoft.com/office/drawing/2014/main" id="{7D4B93EA-91F1-48A7-3CA2-305785641B23}"/>
+                  </a:ext>
+                </a:extLst>
+              </p:cNvPr>
+              <p:cNvSpPr txBox="1"/>
+              <p:nvPr/>
+            </p:nvSpPr>
+            <p:spPr>
+              <a:xfrm>
+                <a:off x="5046920" y="4392399"/>
+                <a:ext cx="2880730" cy="369332"/>
+              </a:xfrm>
+              <a:prstGeom prst="rect">
+                <a:avLst/>
+              </a:prstGeom>
+              <a:noFill/>
+            </p:spPr>
+            <p:txBody>
+              <a:bodyPr wrap="square">
+                <a:spAutoFit/>
+              </a:bodyPr>
+              <a:lstStyle/>
+              <a:p>
+                <a:pPr/>
+                <a14:m>
+                  <m:oMathPara xmlns:m="http://schemas.openxmlformats.org/officeDocument/2006/math">
+                    <m:oMathParaPr>
+                      <m:jc m:val="centerGroup"/>
+                    </m:oMathParaPr>
+                    <m:oMath xmlns:m="http://schemas.openxmlformats.org/officeDocument/2006/math">
+                      <m:r>
+                        <a:rPr lang="en-US" sz="1800" i="1" smtClean="0">
+                          <a:latin typeface="Cambria Math" panose="02040503050406030204" pitchFamily="18" charset="0"/>
+                        </a:rPr>
+                        <m:t>𝑃</m:t>
+                      </m:r>
+                      <m:d>
+                        <m:dPr>
+                          <m:ctrlPr>
+                            <a:rPr lang="en-US" sz="1800" i="1">
+                              <a:latin typeface="Cambria Math" panose="02040503050406030204" pitchFamily="18" charset="0"/>
+                            </a:rPr>
+                          </m:ctrlPr>
+                        </m:dPr>
+                        <m:e>
+                          <m:r>
+                            <a:rPr lang="en-US" sz="1800" b="0" i="1" smtClean="0">
+                              <a:latin typeface="Cambria Math" panose="02040503050406030204" pitchFamily="18" charset="0"/>
+                            </a:rPr>
+                            <m:t>𝑘𝑒𝑦</m:t>
+                          </m:r>
+                          <m:r>
+                            <a:rPr lang="en-US" sz="1800" b="0" i="1" smtClean="0">
+                              <a:latin typeface="Cambria Math" panose="02040503050406030204" pitchFamily="18" charset="0"/>
+                            </a:rPr>
+                            <m:t> </m:t>
+                          </m:r>
+                          <m:r>
+                            <a:rPr lang="en-US" sz="1800" b="0" i="1" smtClean="0">
+                              <a:latin typeface="Cambria Math" panose="02040503050406030204" pitchFamily="18" charset="0"/>
+                            </a:rPr>
+                            <m:t>𝑟𝑒𝑐𝑜𝑣𝑒𝑟𝑦</m:t>
+                          </m:r>
+                        </m:e>
+                      </m:d>
+                      <m:r>
+                        <a:rPr lang="en-US" i="1">
+                          <a:latin typeface="Cambria Math" panose="02040503050406030204" pitchFamily="18" charset="0"/>
+                          <a:ea typeface="Cambria Math" panose="02040503050406030204" pitchFamily="18" charset="0"/>
+                        </a:rPr>
+                        <m:t>≈</m:t>
+                      </m:r>
+                      <m:r>
+                        <a:rPr lang="en-US" b="0" i="1" smtClean="0">
+                          <a:latin typeface="Cambria Math" panose="02040503050406030204" pitchFamily="18" charset="0"/>
+                          <a:ea typeface="Cambria Math" panose="02040503050406030204" pitchFamily="18" charset="0"/>
+                        </a:rPr>
+                        <m:t>29%</m:t>
+                      </m:r>
+                    </m:oMath>
+                  </m:oMathPara>
+                </a14:m>
+                <a:endParaRPr lang="en-US" dirty="0"/>
+              </a:p>
+            </p:txBody>
+          </p:sp>
+        </mc:Choice>
+        <mc:Fallback>
+          <p:sp>
+            <p:nvSpPr>
+              <p:cNvPr id="19" name="TextBox 18">
+                <a:extLst>
+                  <a:ext uri="{FF2B5EF4-FFF2-40B4-BE49-F238E27FC236}">
+                    <a16:creationId xmlns:a16="http://schemas.microsoft.com/office/drawing/2014/main" id="{7D4B93EA-91F1-48A7-3CA2-305785641B23}"/>
+                  </a:ext>
+                </a:extLst>
+              </p:cNvPr>
+              <p:cNvSpPr txBox="1">
+                <a:spLocks noRot="1" noChangeAspect="1" noMove="1" noResize="1" noEditPoints="1" noAdjustHandles="1" noChangeArrowheads="1" noChangeShapeType="1" noTextEdit="1"/>
+              </p:cNvSpPr>
+              <p:nvPr/>
+            </p:nvSpPr>
+            <p:spPr>
+              <a:xfrm>
+                <a:off x="5046920" y="4392399"/>
+                <a:ext cx="2880730" cy="369332"/>
+              </a:xfrm>
+              <a:prstGeom prst="rect">
+                <a:avLst/>
+              </a:prstGeom>
+              <a:blipFill>
+                <a:blip r:embed="rId5"/>
+                <a:stretch>
+                  <a:fillRect b="-13333"/>
+                </a:stretch>
+              </a:blipFill>
+            </p:spPr>
+            <p:txBody>
+              <a:bodyPr/>
+              <a:lstStyle/>
+              <a:p>
+                <a:r>
+                  <a:rPr lang="en-US">
+                    <a:noFill/>
+                  </a:rPr>
+                  <a:t> </a:t>
+                </a:r>
+              </a:p>
+            </p:txBody>
+          </p:sp>
+        </mc:Fallback>
+      </mc:AlternateContent>
     </p:spTree>
     <p:extLst>
       <p:ext uri="{BB962C8B-B14F-4D97-AF65-F5344CB8AC3E}">
@@ -22119,7 +25230,7 @@
 </p:sld>
 </file>
 
-<file path=ppt/slides/slide21.xml><?xml version="1.0" encoding="utf-8"?>
+<file path=ppt/slides/slide23.xml><?xml version="1.0" encoding="utf-8"?>
 <p:sld xmlns:a="http://schemas.openxmlformats.org/drawingml/2006/main" xmlns:r="http://schemas.openxmlformats.org/officeDocument/2006/relationships" xmlns:p="http://schemas.openxmlformats.org/presentationml/2006/main">
   <p:cSld>
     <p:spTree>
@@ -22207,7 +25318,7 @@
                   <a:schemeClr val="tx1"/>
                 </a:solidFill>
               </a:rPr>
-              <a:t>11/23/2025</a:t>
+              <a:t>11/24/2025</a:t>
             </a:fld>
             <a:endParaRPr lang="en-US" sz="1600" dirty="0">
               <a:solidFill>
@@ -22276,7 +25387,7 @@
                   <a:schemeClr val="tx1"/>
                 </a:solidFill>
               </a:rPr>
-              <a:t>21</a:t>
+              <a:t>23</a:t>
             </a:fld>
             <a:endParaRPr lang="en-US" sz="1400" dirty="0">
               <a:solidFill>
@@ -22570,7 +25681,7 @@
 </p:sld>
 </file>
 
-<file path=ppt/slides/slide22.xml><?xml version="1.0" encoding="utf-8"?>
+<file path=ppt/slides/slide24.xml><?xml version="1.0" encoding="utf-8"?>
 <p:sld xmlns:a="http://schemas.openxmlformats.org/drawingml/2006/main" xmlns:r="http://schemas.openxmlformats.org/officeDocument/2006/relationships" xmlns:p="http://schemas.openxmlformats.org/presentationml/2006/main">
   <p:cSld>
     <p:spTree>
@@ -22658,7 +25769,7 @@
                   <a:schemeClr val="tx1"/>
                 </a:solidFill>
               </a:rPr>
-              <a:t>11/23/2025</a:t>
+              <a:t>11/24/2025</a:t>
             </a:fld>
             <a:endParaRPr lang="en-US" sz="1600" dirty="0">
               <a:solidFill>
@@ -22727,7 +25838,7 @@
                   <a:schemeClr val="tx1"/>
                 </a:solidFill>
               </a:rPr>
-              <a:t>22</a:t>
+              <a:t>24</a:t>
             </a:fld>
             <a:endParaRPr lang="en-US" sz="1400" dirty="0">
               <a:solidFill>
@@ -23014,7 +26125,7 @@
 </p:sld>
 </file>
 
-<file path=ppt/slides/slide23.xml><?xml version="1.0" encoding="utf-8"?>
+<file path=ppt/slides/slide25.xml><?xml version="1.0" encoding="utf-8"?>
 <p:sld xmlns:a="http://schemas.openxmlformats.org/drawingml/2006/main" xmlns:r="http://schemas.openxmlformats.org/officeDocument/2006/relationships" xmlns:p="http://schemas.openxmlformats.org/presentationml/2006/main">
   <p:cSld>
     <p:spTree>
@@ -23149,7 +26260,7 @@
                   <a:schemeClr val="tx1"/>
                 </a:solidFill>
               </a:rPr>
-              <a:t>11/23/2025</a:t>
+              <a:t>11/24/2025</a:t>
             </a:fld>
             <a:endParaRPr lang="en-US" sz="1600" dirty="0">
               <a:solidFill>
@@ -23218,7 +26329,7 @@
                   <a:schemeClr val="tx1"/>
                 </a:solidFill>
               </a:rPr>
-              <a:t>23</a:t>
+              <a:t>25</a:t>
             </a:fld>
             <a:endParaRPr lang="en-US" sz="1400" dirty="0">
               <a:solidFill>
@@ -23329,7 +26440,7 @@
                   <a:schemeClr val="tx1"/>
                 </a:solidFill>
               </a:rPr>
-              <a:t>11/23/2025</a:t>
+              <a:t>11/24/2025</a:t>
             </a:fld>
             <a:endParaRPr lang="en-US" sz="1600" dirty="0">
               <a:solidFill>
@@ -23958,7 +27069,7 @@
                   <a:schemeClr val="tx1"/>
                 </a:solidFill>
               </a:rPr>
-              <a:t>11/23/2025</a:t>
+              <a:t>11/24/2025</a:t>
             </a:fld>
             <a:endParaRPr lang="en-US" sz="1600" dirty="0">
               <a:solidFill>
@@ -24231,7 +27342,7 @@
                   <a:schemeClr val="tx1"/>
                 </a:solidFill>
               </a:rPr>
-              <a:t>11/23/2025</a:t>
+              <a:t>11/24/2025</a:t>
             </a:fld>
             <a:endParaRPr lang="en-US" sz="1600" dirty="0">
               <a:solidFill>
@@ -24780,7 +27891,7 @@
                   <a:schemeClr val="tx1"/>
                 </a:solidFill>
               </a:rPr>
-              <a:t>11/23/2025</a:t>
+              <a:t>11/24/2025</a:t>
             </a:fld>
             <a:endParaRPr lang="en-US" sz="1600" dirty="0">
               <a:solidFill>
@@ -25001,7 +28112,7 @@
                   <a:schemeClr val="tx1"/>
                 </a:solidFill>
               </a:rPr>
-              <a:t>11/23/2025</a:t>
+              <a:t>11/24/2025</a:t>
             </a:fld>
             <a:endParaRPr lang="en-US" sz="1600" dirty="0">
               <a:solidFill>
@@ -25443,7 +28554,7 @@
                   <a:schemeClr val="tx1"/>
                 </a:solidFill>
               </a:rPr>
-              <a:t>11/23/2025</a:t>
+              <a:t>11/24/2025</a:t>
             </a:fld>
             <a:endParaRPr lang="en-US" sz="1600" dirty="0">
               <a:solidFill>
@@ -26210,7 +29321,7 @@
                   <a:schemeClr val="tx1"/>
                 </a:solidFill>
               </a:rPr>
-              <a:t>11/23/2025</a:t>
+              <a:t>11/24/2025</a:t>
             </a:fld>
             <a:endParaRPr lang="en-US" sz="1600" dirty="0">
               <a:solidFill>

</xml_diff>